<commit_message>
started work on new resources
</commit_message>
<xml_diff>
--- a/Pycraft data files/current/Background ideas for Pycraft Reimagined.pptx
+++ b/Pycraft data files/current/Background ideas for Pycraft Reimagined.pptx
@@ -10,6 +10,21 @@
     <p:sldId id="257" r:id="rId4"/>
     <p:sldId id="258" r:id="rId5"/>
     <p:sldId id="260" r:id="rId6"/>
+    <p:sldId id="274" r:id="rId7"/>
+    <p:sldId id="261" r:id="rId8"/>
+    <p:sldId id="262" r:id="rId9"/>
+    <p:sldId id="275" r:id="rId10"/>
+    <p:sldId id="263" r:id="rId11"/>
+    <p:sldId id="264" r:id="rId12"/>
+    <p:sldId id="265" r:id="rId13"/>
+    <p:sldId id="266" r:id="rId14"/>
+    <p:sldId id="267" r:id="rId15"/>
+    <p:sldId id="268" r:id="rId16"/>
+    <p:sldId id="269" r:id="rId17"/>
+    <p:sldId id="270" r:id="rId18"/>
+    <p:sldId id="271" r:id="rId19"/>
+    <p:sldId id="272" r:id="rId20"/>
+    <p:sldId id="273" r:id="rId21"/>
   </p:sldIdLst>
   <p:sldSz cx="12192000" cy="6858000"/>
   <p:notesSz cx="6858000" cy="9144000"/>
@@ -265,7 +280,7 @@
           <a:p>
             <a:fld id="{2268D07C-359D-43C3-800B-3286632F6833}" type="datetimeFigureOut">
               <a:rPr lang="en-GB" smtClean="0"/>
-              <a:t>02/10/2023</a:t>
+              <a:t>05/10/2023</a:t>
             </a:fld>
             <a:endParaRPr lang="en-GB"/>
           </a:p>
@@ -465,7 +480,7 @@
           <a:p>
             <a:fld id="{2268D07C-359D-43C3-800B-3286632F6833}" type="datetimeFigureOut">
               <a:rPr lang="en-GB" smtClean="0"/>
-              <a:t>02/10/2023</a:t>
+              <a:t>05/10/2023</a:t>
             </a:fld>
             <a:endParaRPr lang="en-GB"/>
           </a:p>
@@ -675,7 +690,7 @@
           <a:p>
             <a:fld id="{2268D07C-359D-43C3-800B-3286632F6833}" type="datetimeFigureOut">
               <a:rPr lang="en-GB" smtClean="0"/>
-              <a:t>02/10/2023</a:t>
+              <a:t>05/10/2023</a:t>
             </a:fld>
             <a:endParaRPr lang="en-GB"/>
           </a:p>
@@ -875,7 +890,7 @@
           <a:p>
             <a:fld id="{2268D07C-359D-43C3-800B-3286632F6833}" type="datetimeFigureOut">
               <a:rPr lang="en-GB" smtClean="0"/>
-              <a:t>02/10/2023</a:t>
+              <a:t>05/10/2023</a:t>
             </a:fld>
             <a:endParaRPr lang="en-GB"/>
           </a:p>
@@ -1151,7 +1166,7 @@
           <a:p>
             <a:fld id="{2268D07C-359D-43C3-800B-3286632F6833}" type="datetimeFigureOut">
               <a:rPr lang="en-GB" smtClean="0"/>
-              <a:t>02/10/2023</a:t>
+              <a:t>05/10/2023</a:t>
             </a:fld>
             <a:endParaRPr lang="en-GB"/>
           </a:p>
@@ -1419,7 +1434,7 @@
           <a:p>
             <a:fld id="{2268D07C-359D-43C3-800B-3286632F6833}" type="datetimeFigureOut">
               <a:rPr lang="en-GB" smtClean="0"/>
-              <a:t>02/10/2023</a:t>
+              <a:t>05/10/2023</a:t>
             </a:fld>
             <a:endParaRPr lang="en-GB"/>
           </a:p>
@@ -1834,7 +1849,7 @@
           <a:p>
             <a:fld id="{2268D07C-359D-43C3-800B-3286632F6833}" type="datetimeFigureOut">
               <a:rPr lang="en-GB" smtClean="0"/>
-              <a:t>02/10/2023</a:t>
+              <a:t>05/10/2023</a:t>
             </a:fld>
             <a:endParaRPr lang="en-GB"/>
           </a:p>
@@ -1976,7 +1991,7 @@
           <a:p>
             <a:fld id="{2268D07C-359D-43C3-800B-3286632F6833}" type="datetimeFigureOut">
               <a:rPr lang="en-GB" smtClean="0"/>
-              <a:t>02/10/2023</a:t>
+              <a:t>05/10/2023</a:t>
             </a:fld>
             <a:endParaRPr lang="en-GB"/>
           </a:p>
@@ -2089,7 +2104,7 @@
           <a:p>
             <a:fld id="{2268D07C-359D-43C3-800B-3286632F6833}" type="datetimeFigureOut">
               <a:rPr lang="en-GB" smtClean="0"/>
-              <a:t>02/10/2023</a:t>
+              <a:t>05/10/2023</a:t>
             </a:fld>
             <a:endParaRPr lang="en-GB"/>
           </a:p>
@@ -2402,7 +2417,7 @@
           <a:p>
             <a:fld id="{2268D07C-359D-43C3-800B-3286632F6833}" type="datetimeFigureOut">
               <a:rPr lang="en-GB" smtClean="0"/>
-              <a:t>02/10/2023</a:t>
+              <a:t>05/10/2023</a:t>
             </a:fld>
             <a:endParaRPr lang="en-GB"/>
           </a:p>
@@ -2691,7 +2706,7 @@
           <a:p>
             <a:fld id="{2268D07C-359D-43C3-800B-3286632F6833}" type="datetimeFigureOut">
               <a:rPr lang="en-GB" smtClean="0"/>
-              <a:t>02/10/2023</a:t>
+              <a:t>05/10/2023</a:t>
             </a:fld>
             <a:endParaRPr lang="en-GB"/>
           </a:p>
@@ -2934,7 +2949,7 @@
           <a:p>
             <a:fld id="{2268D07C-359D-43C3-800B-3286632F6833}" type="datetimeFigureOut">
               <a:rPr lang="en-GB" smtClean="0"/>
-              <a:t>02/10/2023</a:t>
+              <a:t>05/10/2023</a:t>
             </a:fld>
             <a:endParaRPr lang="en-GB"/>
           </a:p>
@@ -3898,6 +3913,666 @@
 </p:sld>
 </file>
 
+<file path=ppt/slides/slide10.xml><?xml version="1.0" encoding="utf-8"?>
+<p:sld xmlns:a="http://schemas.openxmlformats.org/drawingml/2006/main" xmlns:r="http://schemas.openxmlformats.org/officeDocument/2006/relationships" xmlns:p="http://schemas.openxmlformats.org/presentationml/2006/main">
+  <p:cSld>
+    <p:spTree>
+      <p:nvGrpSpPr>
+        <p:cNvPr id="1" name=""/>
+        <p:cNvGrpSpPr/>
+        <p:nvPr/>
+      </p:nvGrpSpPr>
+      <p:grpSpPr>
+        <a:xfrm>
+          <a:off x="0" y="0"/>
+          <a:ext cx="0" cy="0"/>
+          <a:chOff x="0" y="0"/>
+          <a:chExt cx="0" cy="0"/>
+        </a:xfrm>
+      </p:grpSpPr>
+      <p:pic>
+        <p:nvPicPr>
+          <p:cNvPr id="3" name="Picture 2">
+            <a:extLst>
+              <a:ext uri="{FF2B5EF4-FFF2-40B4-BE49-F238E27FC236}">
+                <a16:creationId xmlns:a16="http://schemas.microsoft.com/office/drawing/2014/main" id="{48126AE8-085C-558D-694D-DFB2CC1BCA22}"/>
+              </a:ext>
+            </a:extLst>
+          </p:cNvPr>
+          <p:cNvPicPr>
+            <a:picLocks noChangeAspect="1"/>
+          </p:cNvPicPr>
+          <p:nvPr/>
+        </p:nvPicPr>
+        <p:blipFill>
+          <a:blip r:embed="rId2">
+            <a:extLst>
+              <a:ext uri="{28A0092B-C50C-407E-A947-70E740481C1C}">
+                <a14:useLocalDpi xmlns:a14="http://schemas.microsoft.com/office/drawing/2010/main" val="0"/>
+              </a:ext>
+            </a:extLst>
+          </a:blip>
+          <a:stretch>
+            <a:fillRect/>
+          </a:stretch>
+        </p:blipFill>
+        <p:spPr>
+          <a:xfrm>
+            <a:off x="3014205" y="2206646"/>
+            <a:ext cx="6163590" cy="2444708"/>
+          </a:xfrm>
+          <a:prstGeom prst="rect">
+            <a:avLst/>
+          </a:prstGeom>
+        </p:spPr>
+      </p:pic>
+    </p:spTree>
+    <p:extLst>
+      <p:ext uri="{BB962C8B-B14F-4D97-AF65-F5344CB8AC3E}">
+        <p14:creationId xmlns:p14="http://schemas.microsoft.com/office/powerpoint/2010/main" val="3673453931"/>
+      </p:ext>
+    </p:extLst>
+  </p:cSld>
+  <p:clrMapOvr>
+    <a:masterClrMapping/>
+  </p:clrMapOvr>
+</p:sld>
+</file>
+
+<file path=ppt/slides/slide11.xml><?xml version="1.0" encoding="utf-8"?>
+<p:sld xmlns:a="http://schemas.openxmlformats.org/drawingml/2006/main" xmlns:r="http://schemas.openxmlformats.org/officeDocument/2006/relationships" xmlns:p="http://schemas.openxmlformats.org/presentationml/2006/main">
+  <p:cSld>
+    <p:spTree>
+      <p:nvGrpSpPr>
+        <p:cNvPr id="1" name=""/>
+        <p:cNvGrpSpPr/>
+        <p:nvPr/>
+      </p:nvGrpSpPr>
+      <p:grpSpPr>
+        <a:xfrm>
+          <a:off x="0" y="0"/>
+          <a:ext cx="0" cy="0"/>
+          <a:chOff x="0" y="0"/>
+          <a:chExt cx="0" cy="0"/>
+        </a:xfrm>
+      </p:grpSpPr>
+      <p:pic>
+        <p:nvPicPr>
+          <p:cNvPr id="3" name="Picture 2">
+            <a:extLst>
+              <a:ext uri="{FF2B5EF4-FFF2-40B4-BE49-F238E27FC236}">
+                <a16:creationId xmlns:a16="http://schemas.microsoft.com/office/drawing/2014/main" id="{56D9FEBE-F670-3EF0-ADE6-696C2A27BD4E}"/>
+              </a:ext>
+            </a:extLst>
+          </p:cNvPr>
+          <p:cNvPicPr>
+            <a:picLocks noChangeAspect="1"/>
+          </p:cNvPicPr>
+          <p:nvPr/>
+        </p:nvPicPr>
+        <p:blipFill>
+          <a:blip r:embed="rId2">
+            <a:extLst>
+              <a:ext uri="{28A0092B-C50C-407E-A947-70E740481C1C}">
+                <a14:useLocalDpi xmlns:a14="http://schemas.microsoft.com/office/drawing/2010/main" val="0"/>
+              </a:ext>
+            </a:extLst>
+          </a:blip>
+          <a:stretch>
+            <a:fillRect/>
+          </a:stretch>
+        </p:blipFill>
+        <p:spPr>
+          <a:xfrm>
+            <a:off x="0" y="1007559"/>
+            <a:ext cx="12192000" cy="4842881"/>
+          </a:xfrm>
+          <a:prstGeom prst="rect">
+            <a:avLst/>
+          </a:prstGeom>
+        </p:spPr>
+      </p:pic>
+    </p:spTree>
+    <p:extLst>
+      <p:ext uri="{BB962C8B-B14F-4D97-AF65-F5344CB8AC3E}">
+        <p14:creationId xmlns:p14="http://schemas.microsoft.com/office/powerpoint/2010/main" val="94890027"/>
+      </p:ext>
+    </p:extLst>
+  </p:cSld>
+  <p:clrMapOvr>
+    <a:masterClrMapping/>
+  </p:clrMapOvr>
+</p:sld>
+</file>
+
+<file path=ppt/slides/slide12.xml><?xml version="1.0" encoding="utf-8"?>
+<p:sld xmlns:a="http://schemas.openxmlformats.org/drawingml/2006/main" xmlns:r="http://schemas.openxmlformats.org/officeDocument/2006/relationships" xmlns:p="http://schemas.openxmlformats.org/presentationml/2006/main">
+  <p:cSld>
+    <p:spTree>
+      <p:nvGrpSpPr>
+        <p:cNvPr id="1" name=""/>
+        <p:cNvGrpSpPr/>
+        <p:nvPr/>
+      </p:nvGrpSpPr>
+      <p:grpSpPr>
+        <a:xfrm>
+          <a:off x="0" y="0"/>
+          <a:ext cx="0" cy="0"/>
+          <a:chOff x="0" y="0"/>
+          <a:chExt cx="0" cy="0"/>
+        </a:xfrm>
+      </p:grpSpPr>
+      <p:pic>
+        <p:nvPicPr>
+          <p:cNvPr id="3" name="Picture 2">
+            <a:extLst>
+              <a:ext uri="{FF2B5EF4-FFF2-40B4-BE49-F238E27FC236}">
+                <a16:creationId xmlns:a16="http://schemas.microsoft.com/office/drawing/2014/main" id="{4BF04D9A-2C30-3348-BCE4-2DF09C06174F}"/>
+              </a:ext>
+            </a:extLst>
+          </p:cNvPr>
+          <p:cNvPicPr>
+            <a:picLocks noChangeAspect="1"/>
+          </p:cNvPicPr>
+          <p:nvPr/>
+        </p:nvPicPr>
+        <p:blipFill>
+          <a:blip r:embed="rId2">
+            <a:extLst>
+              <a:ext uri="{28A0092B-C50C-407E-A947-70E740481C1C}">
+                <a14:useLocalDpi xmlns:a14="http://schemas.microsoft.com/office/drawing/2010/main" val="0"/>
+              </a:ext>
+            </a:extLst>
+          </a:blip>
+          <a:stretch>
+            <a:fillRect/>
+          </a:stretch>
+        </p:blipFill>
+        <p:spPr>
+          <a:xfrm>
+            <a:off x="3611664" y="2807154"/>
+            <a:ext cx="4968671" cy="1243692"/>
+          </a:xfrm>
+          <a:prstGeom prst="rect">
+            <a:avLst/>
+          </a:prstGeom>
+        </p:spPr>
+      </p:pic>
+    </p:spTree>
+    <p:extLst>
+      <p:ext uri="{BB962C8B-B14F-4D97-AF65-F5344CB8AC3E}">
+        <p14:creationId xmlns:p14="http://schemas.microsoft.com/office/powerpoint/2010/main" val="4019192603"/>
+      </p:ext>
+    </p:extLst>
+  </p:cSld>
+  <p:clrMapOvr>
+    <a:masterClrMapping/>
+  </p:clrMapOvr>
+</p:sld>
+</file>
+
+<file path=ppt/slides/slide13.xml><?xml version="1.0" encoding="utf-8"?>
+<p:sld xmlns:a="http://schemas.openxmlformats.org/drawingml/2006/main" xmlns:r="http://schemas.openxmlformats.org/officeDocument/2006/relationships" xmlns:p="http://schemas.openxmlformats.org/presentationml/2006/main">
+  <p:cSld>
+    <p:spTree>
+      <p:nvGrpSpPr>
+        <p:cNvPr id="1" name=""/>
+        <p:cNvGrpSpPr/>
+        <p:nvPr/>
+      </p:nvGrpSpPr>
+      <p:grpSpPr>
+        <a:xfrm>
+          <a:off x="0" y="0"/>
+          <a:ext cx="0" cy="0"/>
+          <a:chOff x="0" y="0"/>
+          <a:chExt cx="0" cy="0"/>
+        </a:xfrm>
+      </p:grpSpPr>
+      <p:pic>
+        <p:nvPicPr>
+          <p:cNvPr id="3" name="Picture 2">
+            <a:extLst>
+              <a:ext uri="{FF2B5EF4-FFF2-40B4-BE49-F238E27FC236}">
+                <a16:creationId xmlns:a16="http://schemas.microsoft.com/office/drawing/2014/main" id="{0B0756B9-0002-7B9D-1429-2C22BBBB9EBE}"/>
+              </a:ext>
+            </a:extLst>
+          </p:cNvPr>
+          <p:cNvPicPr>
+            <a:picLocks noChangeAspect="1"/>
+          </p:cNvPicPr>
+          <p:nvPr/>
+        </p:nvPicPr>
+        <p:blipFill>
+          <a:blip r:embed="rId2">
+            <a:extLst>
+              <a:ext uri="{28A0092B-C50C-407E-A947-70E740481C1C}">
+                <a14:useLocalDpi xmlns:a14="http://schemas.microsoft.com/office/drawing/2010/main" val="0"/>
+              </a:ext>
+            </a:extLst>
+          </a:blip>
+          <a:stretch>
+            <a:fillRect/>
+          </a:stretch>
+        </p:blipFill>
+        <p:spPr>
+          <a:xfrm>
+            <a:off x="3493886" y="998724"/>
+            <a:ext cx="5204228" cy="4860552"/>
+          </a:xfrm>
+          <a:prstGeom prst="rect">
+            <a:avLst/>
+          </a:prstGeom>
+        </p:spPr>
+      </p:pic>
+    </p:spTree>
+    <p:extLst>
+      <p:ext uri="{BB962C8B-B14F-4D97-AF65-F5344CB8AC3E}">
+        <p14:creationId xmlns:p14="http://schemas.microsoft.com/office/powerpoint/2010/main" val="1528842542"/>
+      </p:ext>
+    </p:extLst>
+  </p:cSld>
+  <p:clrMapOvr>
+    <a:masterClrMapping/>
+  </p:clrMapOvr>
+</p:sld>
+</file>
+
+<file path=ppt/slides/slide14.xml><?xml version="1.0" encoding="utf-8"?>
+<p:sld xmlns:a="http://schemas.openxmlformats.org/drawingml/2006/main" xmlns:r="http://schemas.openxmlformats.org/officeDocument/2006/relationships" xmlns:p="http://schemas.openxmlformats.org/presentationml/2006/main">
+  <p:cSld>
+    <p:spTree>
+      <p:nvGrpSpPr>
+        <p:cNvPr id="1" name=""/>
+        <p:cNvGrpSpPr/>
+        <p:nvPr/>
+      </p:nvGrpSpPr>
+      <p:grpSpPr>
+        <a:xfrm>
+          <a:off x="0" y="0"/>
+          <a:ext cx="0" cy="0"/>
+          <a:chOff x="0" y="0"/>
+          <a:chExt cx="0" cy="0"/>
+        </a:xfrm>
+      </p:grpSpPr>
+      <p:pic>
+        <p:nvPicPr>
+          <p:cNvPr id="3" name="Picture 2">
+            <a:extLst>
+              <a:ext uri="{FF2B5EF4-FFF2-40B4-BE49-F238E27FC236}">
+                <a16:creationId xmlns:a16="http://schemas.microsoft.com/office/drawing/2014/main" id="{655997BA-ADE0-A5BE-D802-F7F5428DBFC0}"/>
+              </a:ext>
+            </a:extLst>
+          </p:cNvPr>
+          <p:cNvPicPr>
+            <a:picLocks noChangeAspect="1"/>
+          </p:cNvPicPr>
+          <p:nvPr/>
+        </p:nvPicPr>
+        <p:blipFill>
+          <a:blip r:embed="rId2">
+            <a:extLst>
+              <a:ext uri="{28A0092B-C50C-407E-A947-70E740481C1C}">
+                <a14:useLocalDpi xmlns:a14="http://schemas.microsoft.com/office/drawing/2010/main" val="0"/>
+              </a:ext>
+            </a:extLst>
+          </a:blip>
+          <a:stretch>
+            <a:fillRect/>
+          </a:stretch>
+        </p:blipFill>
+        <p:spPr>
+          <a:xfrm>
+            <a:off x="3665724" y="1001792"/>
+            <a:ext cx="4860552" cy="4854415"/>
+          </a:xfrm>
+          <a:prstGeom prst="rect">
+            <a:avLst/>
+          </a:prstGeom>
+        </p:spPr>
+      </p:pic>
+    </p:spTree>
+    <p:extLst>
+      <p:ext uri="{BB962C8B-B14F-4D97-AF65-F5344CB8AC3E}">
+        <p14:creationId xmlns:p14="http://schemas.microsoft.com/office/powerpoint/2010/main" val="1510975494"/>
+      </p:ext>
+    </p:extLst>
+  </p:cSld>
+  <p:clrMapOvr>
+    <a:masterClrMapping/>
+  </p:clrMapOvr>
+</p:sld>
+</file>
+
+<file path=ppt/slides/slide15.xml><?xml version="1.0" encoding="utf-8"?>
+<p:sld xmlns:a="http://schemas.openxmlformats.org/drawingml/2006/main" xmlns:r="http://schemas.openxmlformats.org/officeDocument/2006/relationships" xmlns:p="http://schemas.openxmlformats.org/presentationml/2006/main">
+  <p:cSld>
+    <p:spTree>
+      <p:nvGrpSpPr>
+        <p:cNvPr id="1" name=""/>
+        <p:cNvGrpSpPr/>
+        <p:nvPr/>
+      </p:nvGrpSpPr>
+      <p:grpSpPr>
+        <a:xfrm>
+          <a:off x="0" y="0"/>
+          <a:ext cx="0" cy="0"/>
+          <a:chOff x="0" y="0"/>
+          <a:chExt cx="0" cy="0"/>
+        </a:xfrm>
+      </p:grpSpPr>
+      <p:pic>
+        <p:nvPicPr>
+          <p:cNvPr id="3" name="Picture 2">
+            <a:extLst>
+              <a:ext uri="{FF2B5EF4-FFF2-40B4-BE49-F238E27FC236}">
+                <a16:creationId xmlns:a16="http://schemas.microsoft.com/office/drawing/2014/main" id="{6D1AA91A-1E23-2CC1-F59B-CCFB01B9B207}"/>
+              </a:ext>
+            </a:extLst>
+          </p:cNvPr>
+          <p:cNvPicPr>
+            <a:picLocks noChangeAspect="1"/>
+          </p:cNvPicPr>
+          <p:nvPr/>
+        </p:nvPicPr>
+        <p:blipFill>
+          <a:blip r:embed="rId2">
+            <a:extLst>
+              <a:ext uri="{28A0092B-C50C-407E-A947-70E740481C1C}">
+                <a14:useLocalDpi xmlns:a14="http://schemas.microsoft.com/office/drawing/2010/main" val="0"/>
+              </a:ext>
+            </a:extLst>
+          </a:blip>
+          <a:stretch>
+            <a:fillRect/>
+          </a:stretch>
+        </p:blipFill>
+        <p:spPr>
+          <a:xfrm>
+            <a:off x="3450336" y="786384"/>
+            <a:ext cx="5291328" cy="5285232"/>
+          </a:xfrm>
+          <a:prstGeom prst="rect">
+            <a:avLst/>
+          </a:prstGeom>
+        </p:spPr>
+      </p:pic>
+    </p:spTree>
+    <p:extLst>
+      <p:ext uri="{BB962C8B-B14F-4D97-AF65-F5344CB8AC3E}">
+        <p14:creationId xmlns:p14="http://schemas.microsoft.com/office/powerpoint/2010/main" val="2091073343"/>
+      </p:ext>
+    </p:extLst>
+  </p:cSld>
+  <p:clrMapOvr>
+    <a:masterClrMapping/>
+  </p:clrMapOvr>
+</p:sld>
+</file>
+
+<file path=ppt/slides/slide16.xml><?xml version="1.0" encoding="utf-8"?>
+<p:sld xmlns:a="http://schemas.openxmlformats.org/drawingml/2006/main" xmlns:r="http://schemas.openxmlformats.org/officeDocument/2006/relationships" xmlns:p="http://schemas.openxmlformats.org/presentationml/2006/main">
+  <p:cSld>
+    <p:spTree>
+      <p:nvGrpSpPr>
+        <p:cNvPr id="1" name=""/>
+        <p:cNvGrpSpPr/>
+        <p:nvPr/>
+      </p:nvGrpSpPr>
+      <p:grpSpPr>
+        <a:xfrm>
+          <a:off x="0" y="0"/>
+          <a:ext cx="0" cy="0"/>
+          <a:chOff x="0" y="0"/>
+          <a:chExt cx="0" cy="0"/>
+        </a:xfrm>
+      </p:grpSpPr>
+      <p:pic>
+        <p:nvPicPr>
+          <p:cNvPr id="6" name="Picture 5">
+            <a:extLst>
+              <a:ext uri="{FF2B5EF4-FFF2-40B4-BE49-F238E27FC236}">
+                <a16:creationId xmlns:a16="http://schemas.microsoft.com/office/drawing/2014/main" id="{180917B0-687A-DAA3-3FF5-0A049759B1E4}"/>
+              </a:ext>
+            </a:extLst>
+          </p:cNvPr>
+          <p:cNvPicPr>
+            <a:picLocks noChangeAspect="1"/>
+          </p:cNvPicPr>
+          <p:nvPr/>
+        </p:nvPicPr>
+        <p:blipFill>
+          <a:blip r:embed="rId2">
+            <a:extLst>
+              <a:ext uri="{28A0092B-C50C-407E-A947-70E740481C1C}">
+                <a14:useLocalDpi xmlns:a14="http://schemas.microsoft.com/office/drawing/2010/main" val="0"/>
+              </a:ext>
+            </a:extLst>
+          </a:blip>
+          <a:stretch>
+            <a:fillRect/>
+          </a:stretch>
+        </p:blipFill>
+        <p:spPr>
+          <a:xfrm>
+            <a:off x="3892105" y="1234250"/>
+            <a:ext cx="4407790" cy="4389500"/>
+          </a:xfrm>
+          <a:prstGeom prst="rect">
+            <a:avLst/>
+          </a:prstGeom>
+        </p:spPr>
+      </p:pic>
+    </p:spTree>
+    <p:extLst>
+      <p:ext uri="{BB962C8B-B14F-4D97-AF65-F5344CB8AC3E}">
+        <p14:creationId xmlns:p14="http://schemas.microsoft.com/office/powerpoint/2010/main" val="3100960146"/>
+      </p:ext>
+    </p:extLst>
+  </p:cSld>
+  <p:clrMapOvr>
+    <a:masterClrMapping/>
+  </p:clrMapOvr>
+</p:sld>
+</file>
+
+<file path=ppt/slides/slide17.xml><?xml version="1.0" encoding="utf-8"?>
+<p:sld xmlns:a="http://schemas.openxmlformats.org/drawingml/2006/main" xmlns:r="http://schemas.openxmlformats.org/officeDocument/2006/relationships" xmlns:p="http://schemas.openxmlformats.org/presentationml/2006/main">
+  <p:cSld>
+    <p:spTree>
+      <p:nvGrpSpPr>
+        <p:cNvPr id="1" name=""/>
+        <p:cNvGrpSpPr/>
+        <p:nvPr/>
+      </p:nvGrpSpPr>
+      <p:grpSpPr>
+        <a:xfrm>
+          <a:off x="0" y="0"/>
+          <a:ext cx="0" cy="0"/>
+          <a:chOff x="0" y="0"/>
+          <a:chExt cx="0" cy="0"/>
+        </a:xfrm>
+      </p:grpSpPr>
+      <p:pic>
+        <p:nvPicPr>
+          <p:cNvPr id="3" name="Picture 2">
+            <a:extLst>
+              <a:ext uri="{FF2B5EF4-FFF2-40B4-BE49-F238E27FC236}">
+                <a16:creationId xmlns:a16="http://schemas.microsoft.com/office/drawing/2014/main" id="{72014563-7783-A6DF-65F0-E688F1861D4E}"/>
+              </a:ext>
+            </a:extLst>
+          </p:cNvPr>
+          <p:cNvPicPr>
+            <a:picLocks noChangeAspect="1"/>
+          </p:cNvPicPr>
+          <p:nvPr/>
+        </p:nvPicPr>
+        <p:blipFill>
+          <a:blip r:embed="rId2">
+            <a:extLst>
+              <a:ext uri="{28A0092B-C50C-407E-A947-70E740481C1C}">
+                <a14:useLocalDpi xmlns:a14="http://schemas.microsoft.com/office/drawing/2010/main" val="0"/>
+              </a:ext>
+            </a:extLst>
+          </a:blip>
+          <a:stretch>
+            <a:fillRect/>
+          </a:stretch>
+        </p:blipFill>
+        <p:spPr>
+          <a:xfrm>
+            <a:off x="2667000" y="0"/>
+            <a:ext cx="6858000" cy="6858000"/>
+          </a:xfrm>
+          <a:prstGeom prst="rect">
+            <a:avLst/>
+          </a:prstGeom>
+        </p:spPr>
+      </p:pic>
+    </p:spTree>
+    <p:extLst>
+      <p:ext uri="{BB962C8B-B14F-4D97-AF65-F5344CB8AC3E}">
+        <p14:creationId xmlns:p14="http://schemas.microsoft.com/office/powerpoint/2010/main" val="3630987067"/>
+      </p:ext>
+    </p:extLst>
+  </p:cSld>
+  <p:clrMapOvr>
+    <a:masterClrMapping/>
+  </p:clrMapOvr>
+</p:sld>
+</file>
+
+<file path=ppt/slides/slide18.xml><?xml version="1.0" encoding="utf-8"?>
+<p:sld xmlns:a="http://schemas.openxmlformats.org/drawingml/2006/main" xmlns:r="http://schemas.openxmlformats.org/officeDocument/2006/relationships" xmlns:p="http://schemas.openxmlformats.org/presentationml/2006/main">
+  <p:cSld>
+    <p:spTree>
+      <p:nvGrpSpPr>
+        <p:cNvPr id="1" name=""/>
+        <p:cNvGrpSpPr/>
+        <p:nvPr/>
+      </p:nvGrpSpPr>
+      <p:grpSpPr>
+        <a:xfrm>
+          <a:off x="0" y="0"/>
+          <a:ext cx="0" cy="0"/>
+          <a:chOff x="0" y="0"/>
+          <a:chExt cx="0" cy="0"/>
+        </a:xfrm>
+      </p:grpSpPr>
+      <p:pic>
+        <p:nvPicPr>
+          <p:cNvPr id="3" name="Picture 2">
+            <a:extLst>
+              <a:ext uri="{FF2B5EF4-FFF2-40B4-BE49-F238E27FC236}">
+                <a16:creationId xmlns:a16="http://schemas.microsoft.com/office/drawing/2014/main" id="{9ED7CD52-6389-BC2B-397E-9DD0281CE277}"/>
+              </a:ext>
+            </a:extLst>
+          </p:cNvPr>
+          <p:cNvPicPr>
+            <a:picLocks noChangeAspect="1"/>
+          </p:cNvPicPr>
+          <p:nvPr/>
+        </p:nvPicPr>
+        <p:blipFill>
+          <a:blip r:embed="rId2">
+            <a:extLst>
+              <a:ext uri="{28A0092B-C50C-407E-A947-70E740481C1C}">
+                <a14:useLocalDpi xmlns:a14="http://schemas.microsoft.com/office/drawing/2010/main" val="0"/>
+              </a:ext>
+            </a:extLst>
+          </a:blip>
+          <a:stretch>
+            <a:fillRect/>
+          </a:stretch>
+        </p:blipFill>
+        <p:spPr>
+          <a:xfrm>
+            <a:off x="4437744" y="1770744"/>
+            <a:ext cx="3316511" cy="3316511"/>
+          </a:xfrm>
+          <a:prstGeom prst="rect">
+            <a:avLst/>
+          </a:prstGeom>
+        </p:spPr>
+      </p:pic>
+    </p:spTree>
+    <p:extLst>
+      <p:ext uri="{BB962C8B-B14F-4D97-AF65-F5344CB8AC3E}">
+        <p14:creationId xmlns:p14="http://schemas.microsoft.com/office/powerpoint/2010/main" val="2942169427"/>
+      </p:ext>
+    </p:extLst>
+  </p:cSld>
+  <p:clrMapOvr>
+    <a:masterClrMapping/>
+  </p:clrMapOvr>
+</p:sld>
+</file>
+
+<file path=ppt/slides/slide19.xml><?xml version="1.0" encoding="utf-8"?>
+<p:sld xmlns:a="http://schemas.openxmlformats.org/drawingml/2006/main" xmlns:r="http://schemas.openxmlformats.org/officeDocument/2006/relationships" xmlns:p="http://schemas.openxmlformats.org/presentationml/2006/main">
+  <p:cSld>
+    <p:spTree>
+      <p:nvGrpSpPr>
+        <p:cNvPr id="1" name=""/>
+        <p:cNvGrpSpPr/>
+        <p:nvPr/>
+      </p:nvGrpSpPr>
+      <p:grpSpPr>
+        <a:xfrm>
+          <a:off x="0" y="0"/>
+          <a:ext cx="0" cy="0"/>
+          <a:chOff x="0" y="0"/>
+          <a:chExt cx="0" cy="0"/>
+        </a:xfrm>
+      </p:grpSpPr>
+      <p:pic>
+        <p:nvPicPr>
+          <p:cNvPr id="3" name="Picture 2">
+            <a:extLst>
+              <a:ext uri="{FF2B5EF4-FFF2-40B4-BE49-F238E27FC236}">
+                <a16:creationId xmlns:a16="http://schemas.microsoft.com/office/drawing/2014/main" id="{AC2F3FF2-E3E9-B0C5-74E3-F6F67C5D193F}"/>
+              </a:ext>
+            </a:extLst>
+          </p:cNvPr>
+          <p:cNvPicPr>
+            <a:picLocks noChangeAspect="1"/>
+          </p:cNvPicPr>
+          <p:nvPr/>
+        </p:nvPicPr>
+        <p:blipFill>
+          <a:blip r:embed="rId2">
+            <a:extLst>
+              <a:ext uri="{28A0092B-C50C-407E-A947-70E740481C1C}">
+                <a14:useLocalDpi xmlns:a14="http://schemas.microsoft.com/office/drawing/2010/main" val="0"/>
+              </a:ext>
+            </a:extLst>
+          </a:blip>
+          <a:stretch>
+            <a:fillRect/>
+          </a:stretch>
+        </p:blipFill>
+        <p:spPr>
+          <a:xfrm>
+            <a:off x="2764247" y="2593775"/>
+            <a:ext cx="6663506" cy="1670449"/>
+          </a:xfrm>
+          <a:prstGeom prst="rect">
+            <a:avLst/>
+          </a:prstGeom>
+        </p:spPr>
+      </p:pic>
+    </p:spTree>
+    <p:extLst>
+      <p:ext uri="{BB962C8B-B14F-4D97-AF65-F5344CB8AC3E}">
+        <p14:creationId xmlns:p14="http://schemas.microsoft.com/office/powerpoint/2010/main" val="498953789"/>
+      </p:ext>
+    </p:extLst>
+  </p:cSld>
+  <p:clrMapOvr>
+    <a:masterClrMapping/>
+  </p:clrMapOvr>
+</p:sld>
+</file>
+
 <file path=ppt/slides/slide2.xml><?xml version="1.0" encoding="utf-8"?>
 <p:sld xmlns:a="http://schemas.openxmlformats.org/drawingml/2006/main" xmlns:r="http://schemas.openxmlformats.org/officeDocument/2006/relationships" xmlns:p="http://schemas.openxmlformats.org/presentationml/2006/main">
   <p:cSld>
@@ -4453,6 +5128,72 @@
     <p:extLst>
       <p:ext uri="{BB962C8B-B14F-4D97-AF65-F5344CB8AC3E}">
         <p14:creationId xmlns:p14="http://schemas.microsoft.com/office/powerpoint/2010/main" val="3203914496"/>
+      </p:ext>
+    </p:extLst>
+  </p:cSld>
+  <p:clrMapOvr>
+    <a:masterClrMapping/>
+  </p:clrMapOvr>
+</p:sld>
+</file>
+
+<file path=ppt/slides/slide20.xml><?xml version="1.0" encoding="utf-8"?>
+<p:sld xmlns:a="http://schemas.openxmlformats.org/drawingml/2006/main" xmlns:r="http://schemas.openxmlformats.org/officeDocument/2006/relationships" xmlns:p="http://schemas.openxmlformats.org/presentationml/2006/main">
+  <p:cSld>
+    <p:spTree>
+      <p:nvGrpSpPr>
+        <p:cNvPr id="1" name=""/>
+        <p:cNvGrpSpPr/>
+        <p:nvPr/>
+      </p:nvGrpSpPr>
+      <p:grpSpPr>
+        <a:xfrm>
+          <a:off x="0" y="0"/>
+          <a:ext cx="0" cy="0"/>
+          <a:chOff x="0" y="0"/>
+          <a:chExt cx="0" cy="0"/>
+        </a:xfrm>
+      </p:grpSpPr>
+      <p:pic>
+        <p:nvPicPr>
+          <p:cNvPr id="3" name="Picture 2">
+            <a:extLst>
+              <a:ext uri="{FF2B5EF4-FFF2-40B4-BE49-F238E27FC236}">
+                <a16:creationId xmlns:a16="http://schemas.microsoft.com/office/drawing/2014/main" id="{3B361C56-5E9A-61E3-DB0D-B2EE946122CA}"/>
+              </a:ext>
+            </a:extLst>
+          </p:cNvPr>
+          <p:cNvPicPr>
+            <a:picLocks noChangeAspect="1"/>
+          </p:cNvPicPr>
+          <p:nvPr/>
+        </p:nvPicPr>
+        <p:blipFill>
+          <a:blip r:embed="rId2">
+            <a:extLst>
+              <a:ext uri="{28A0092B-C50C-407E-A947-70E740481C1C}">
+                <a14:useLocalDpi xmlns:a14="http://schemas.microsoft.com/office/drawing/2010/main" val="0"/>
+              </a:ext>
+            </a:extLst>
+          </a:blip>
+          <a:stretch>
+            <a:fillRect/>
+          </a:stretch>
+        </p:blipFill>
+        <p:spPr>
+          <a:xfrm>
+            <a:off x="3667575" y="997486"/>
+            <a:ext cx="4856849" cy="4863028"/>
+          </a:xfrm>
+          <a:prstGeom prst="rect">
+            <a:avLst/>
+          </a:prstGeom>
+        </p:spPr>
+      </p:pic>
+    </p:spTree>
+    <p:extLst>
+      <p:ext uri="{BB962C8B-B14F-4D97-AF65-F5344CB8AC3E}">
+        <p14:creationId xmlns:p14="http://schemas.microsoft.com/office/powerpoint/2010/main" val="1193373210"/>
       </p:ext>
     </p:extLst>
   </p:cSld>
@@ -5886,6 +6627,511 @@
     <p:extLst>
       <p:ext uri="{BB962C8B-B14F-4D97-AF65-F5344CB8AC3E}">
         <p14:creationId xmlns:p14="http://schemas.microsoft.com/office/powerpoint/2010/main" val="1602894922"/>
+      </p:ext>
+    </p:extLst>
+  </p:cSld>
+  <p:clrMapOvr>
+    <a:masterClrMapping/>
+  </p:clrMapOvr>
+</p:sld>
+</file>
+
+<file path=ppt/slides/slide6.xml><?xml version="1.0" encoding="utf-8"?>
+<p:sld xmlns:a="http://schemas.openxmlformats.org/drawingml/2006/main" xmlns:r="http://schemas.openxmlformats.org/officeDocument/2006/relationships" xmlns:p="http://schemas.openxmlformats.org/presentationml/2006/main">
+  <p:cSld>
+    <p:spTree>
+      <p:nvGrpSpPr>
+        <p:cNvPr id="1" name=""/>
+        <p:cNvGrpSpPr/>
+        <p:nvPr/>
+      </p:nvGrpSpPr>
+      <p:grpSpPr>
+        <a:xfrm>
+          <a:off x="0" y="0"/>
+          <a:ext cx="0" cy="0"/>
+          <a:chOff x="0" y="0"/>
+          <a:chExt cx="0" cy="0"/>
+        </a:xfrm>
+      </p:grpSpPr>
+      <p:pic>
+        <p:nvPicPr>
+          <p:cNvPr id="3" name="Picture 2">
+            <a:extLst>
+              <a:ext uri="{FF2B5EF4-FFF2-40B4-BE49-F238E27FC236}">
+                <a16:creationId xmlns:a16="http://schemas.microsoft.com/office/drawing/2014/main" id="{33584C75-8C7C-3C96-0FE8-9F5831EE9561}"/>
+              </a:ext>
+            </a:extLst>
+          </p:cNvPr>
+          <p:cNvPicPr>
+            <a:picLocks noChangeAspect="1"/>
+          </p:cNvPicPr>
+          <p:nvPr/>
+        </p:nvPicPr>
+        <p:blipFill>
+          <a:blip r:embed="rId2">
+            <a:extLst>
+              <a:ext uri="{28A0092B-C50C-407E-A947-70E740481C1C}">
+                <a14:useLocalDpi xmlns:a14="http://schemas.microsoft.com/office/drawing/2010/main" val="0"/>
+              </a:ext>
+            </a:extLst>
+          </a:blip>
+          <a:stretch>
+            <a:fillRect/>
+          </a:stretch>
+        </p:blipFill>
+        <p:spPr>
+          <a:xfrm>
+            <a:off x="910054" y="1736027"/>
+            <a:ext cx="10371892" cy="3385946"/>
+          </a:xfrm>
+          <a:prstGeom prst="rect">
+            <a:avLst/>
+          </a:prstGeom>
+        </p:spPr>
+      </p:pic>
+      <p:pic>
+        <p:nvPicPr>
+          <p:cNvPr id="5" name="Picture 4">
+            <a:extLst>
+              <a:ext uri="{FF2B5EF4-FFF2-40B4-BE49-F238E27FC236}">
+                <a16:creationId xmlns:a16="http://schemas.microsoft.com/office/drawing/2014/main" id="{6548080B-CB4B-0ECE-3557-F4739E384804}"/>
+              </a:ext>
+            </a:extLst>
+          </p:cNvPr>
+          <p:cNvPicPr>
+            <a:picLocks noChangeAspect="1"/>
+          </p:cNvPicPr>
+          <p:nvPr/>
+        </p:nvPicPr>
+        <p:blipFill>
+          <a:blip r:embed="rId3">
+            <a:extLst>
+              <a:ext uri="{28A0092B-C50C-407E-A947-70E740481C1C}">
+                <a14:useLocalDpi xmlns:a14="http://schemas.microsoft.com/office/drawing/2010/main" val="0"/>
+              </a:ext>
+            </a:extLst>
+          </a:blip>
+          <a:stretch>
+            <a:fillRect/>
+          </a:stretch>
+        </p:blipFill>
+        <p:spPr>
+          <a:xfrm>
+            <a:off x="2520216" y="847470"/>
+            <a:ext cx="4437433" cy="4447059"/>
+          </a:xfrm>
+          <a:prstGeom prst="rect">
+            <a:avLst/>
+          </a:prstGeom>
+        </p:spPr>
+      </p:pic>
+    </p:spTree>
+    <p:extLst>
+      <p:ext uri="{BB962C8B-B14F-4D97-AF65-F5344CB8AC3E}">
+        <p14:creationId xmlns:p14="http://schemas.microsoft.com/office/powerpoint/2010/main" val="2023822288"/>
+      </p:ext>
+    </p:extLst>
+  </p:cSld>
+  <p:clrMapOvr>
+    <a:masterClrMapping/>
+  </p:clrMapOvr>
+</p:sld>
+</file>
+
+<file path=ppt/slides/slide7.xml><?xml version="1.0" encoding="utf-8"?>
+<p:sld xmlns:a="http://schemas.openxmlformats.org/drawingml/2006/main" xmlns:r="http://schemas.openxmlformats.org/officeDocument/2006/relationships" xmlns:p="http://schemas.openxmlformats.org/presentationml/2006/main">
+  <p:cSld>
+    <p:spTree>
+      <p:nvGrpSpPr>
+        <p:cNvPr id="1" name=""/>
+        <p:cNvGrpSpPr/>
+        <p:nvPr/>
+      </p:nvGrpSpPr>
+      <p:grpSpPr>
+        <a:xfrm>
+          <a:off x="0" y="0"/>
+          <a:ext cx="0" cy="0"/>
+          <a:chOff x="0" y="0"/>
+          <a:chExt cx="0" cy="0"/>
+        </a:xfrm>
+      </p:grpSpPr>
+      <p:pic>
+        <p:nvPicPr>
+          <p:cNvPr id="3" name="Picture 2">
+            <a:extLst>
+              <a:ext uri="{FF2B5EF4-FFF2-40B4-BE49-F238E27FC236}">
+                <a16:creationId xmlns:a16="http://schemas.microsoft.com/office/drawing/2014/main" id="{1096206F-3AE6-0A71-92B4-C6252042D406}"/>
+              </a:ext>
+            </a:extLst>
+          </p:cNvPr>
+          <p:cNvPicPr>
+            <a:picLocks noChangeAspect="1"/>
+          </p:cNvPicPr>
+          <p:nvPr/>
+        </p:nvPicPr>
+        <p:blipFill>
+          <a:blip r:embed="rId2">
+            <a:extLst>
+              <a:ext uri="{28A0092B-C50C-407E-A947-70E740481C1C}">
+                <a14:useLocalDpi xmlns:a14="http://schemas.microsoft.com/office/drawing/2010/main" val="0"/>
+              </a:ext>
+            </a:extLst>
+          </a:blip>
+          <a:stretch>
+            <a:fillRect/>
+          </a:stretch>
+        </p:blipFill>
+        <p:spPr>
+          <a:xfrm>
+            <a:off x="-2116573" y="1975874"/>
+            <a:ext cx="4876810" cy="2560325"/>
+          </a:xfrm>
+          <a:prstGeom prst="rect">
+            <a:avLst/>
+          </a:prstGeom>
+        </p:spPr>
+      </p:pic>
+      <p:pic>
+        <p:nvPicPr>
+          <p:cNvPr id="7" name="Picture 6">
+            <a:extLst>
+              <a:ext uri="{FF2B5EF4-FFF2-40B4-BE49-F238E27FC236}">
+                <a16:creationId xmlns:a16="http://schemas.microsoft.com/office/drawing/2014/main" id="{5B4EE1D4-1EDC-852B-01C3-356F3CB13DCA}"/>
+              </a:ext>
+            </a:extLst>
+          </p:cNvPr>
+          <p:cNvPicPr>
+            <a:picLocks noChangeAspect="1"/>
+          </p:cNvPicPr>
+          <p:nvPr/>
+        </p:nvPicPr>
+        <p:blipFill rotWithShape="1">
+          <a:blip r:embed="rId3">
+            <a:extLst>
+              <a:ext uri="{28A0092B-C50C-407E-A947-70E740481C1C}">
+                <a14:useLocalDpi xmlns:a14="http://schemas.microsoft.com/office/drawing/2010/main" val="0"/>
+              </a:ext>
+            </a:extLst>
+          </a:blip>
+          <a:srcRect t="21403" b="21637"/>
+          <a:stretch/>
+        </p:blipFill>
+        <p:spPr>
+          <a:xfrm>
+            <a:off x="4766838" y="1460500"/>
+            <a:ext cx="6852462" cy="3911600"/>
+          </a:xfrm>
+          <a:prstGeom prst="rect">
+            <a:avLst/>
+          </a:prstGeom>
+        </p:spPr>
+      </p:pic>
+      <p:sp>
+        <p:nvSpPr>
+          <p:cNvPr id="6" name="Rectangle: Rounded Corners 5">
+            <a:extLst>
+              <a:ext uri="{FF2B5EF4-FFF2-40B4-BE49-F238E27FC236}">
+                <a16:creationId xmlns:a16="http://schemas.microsoft.com/office/drawing/2014/main" id="{C6A038F1-21DA-5786-7990-CC514B1420C3}"/>
+              </a:ext>
+            </a:extLst>
+          </p:cNvPr>
+          <p:cNvSpPr/>
+          <p:nvPr/>
+        </p:nvSpPr>
+        <p:spPr>
+          <a:xfrm>
+            <a:off x="5111274" y="2312473"/>
+            <a:ext cx="6163589" cy="2223726"/>
+          </a:xfrm>
+          <a:prstGeom prst="roundRect">
+            <a:avLst/>
+          </a:prstGeom>
+          <a:solidFill>
+            <a:srgbClr val="1E1E1E">
+              <a:alpha val="50196"/>
+            </a:srgbClr>
+          </a:solidFill>
+          <a:ln>
+            <a:solidFill>
+              <a:srgbClr val="505050"/>
+            </a:solidFill>
+          </a:ln>
+          <a:scene3d>
+            <a:camera prst="orthographicFront"/>
+            <a:lightRig rig="threePt" dir="t"/>
+          </a:scene3d>
+          <a:sp3d>
+            <a:bevelT w="139700" prst="cross"/>
+          </a:sp3d>
+        </p:spPr>
+        <p:style>
+          <a:lnRef idx="2">
+            <a:schemeClr val="accent1">
+              <a:shade val="15000"/>
+            </a:schemeClr>
+          </a:lnRef>
+          <a:fillRef idx="1">
+            <a:schemeClr val="accent1"/>
+          </a:fillRef>
+          <a:effectRef idx="0">
+            <a:schemeClr val="accent1"/>
+          </a:effectRef>
+          <a:fontRef idx="minor">
+            <a:schemeClr val="lt1"/>
+          </a:fontRef>
+        </p:style>
+        <p:txBody>
+          <a:bodyPr rtlCol="0" anchor="ctr"/>
+          <a:lstStyle/>
+          <a:p>
+            <a:pPr algn="ctr"/>
+            <a:r>
+              <a:rPr lang="en-GB" sz="13000" dirty="0">
+                <a:solidFill>
+                  <a:schemeClr val="bg1"/>
+                </a:solidFill>
+                <a:latin typeface="Noto Serif" panose="02020502060505020204" pitchFamily="18" charset="0"/>
+                <a:ea typeface="Noto Serif" panose="02020502060505020204" pitchFamily="18" charset="0"/>
+                <a:cs typeface="Noto Serif" panose="02020502060505020204" pitchFamily="18" charset="0"/>
+              </a:rPr>
+              <a:t>Pycraft</a:t>
+            </a:r>
+          </a:p>
+        </p:txBody>
+      </p:sp>
+    </p:spTree>
+    <p:extLst>
+      <p:ext uri="{BB962C8B-B14F-4D97-AF65-F5344CB8AC3E}">
+        <p14:creationId xmlns:p14="http://schemas.microsoft.com/office/powerpoint/2010/main" val="1816402391"/>
+      </p:ext>
+    </p:extLst>
+  </p:cSld>
+  <p:clrMapOvr>
+    <a:masterClrMapping/>
+  </p:clrMapOvr>
+</p:sld>
+</file>
+
+<file path=ppt/slides/slide8.xml><?xml version="1.0" encoding="utf-8"?>
+<p:sld xmlns:a="http://schemas.openxmlformats.org/drawingml/2006/main" xmlns:r="http://schemas.openxmlformats.org/officeDocument/2006/relationships" xmlns:p="http://schemas.openxmlformats.org/presentationml/2006/main">
+  <p:cSld>
+    <p:spTree>
+      <p:nvGrpSpPr>
+        <p:cNvPr id="1" name=""/>
+        <p:cNvGrpSpPr/>
+        <p:nvPr/>
+      </p:nvGrpSpPr>
+      <p:grpSpPr>
+        <a:xfrm>
+          <a:off x="0" y="0"/>
+          <a:ext cx="0" cy="0"/>
+          <a:chOff x="0" y="0"/>
+          <a:chExt cx="0" cy="0"/>
+        </a:xfrm>
+      </p:grpSpPr>
+      <p:pic>
+        <p:nvPicPr>
+          <p:cNvPr id="3" name="Picture 2">
+            <a:extLst>
+              <a:ext uri="{FF2B5EF4-FFF2-40B4-BE49-F238E27FC236}">
+                <a16:creationId xmlns:a16="http://schemas.microsoft.com/office/drawing/2014/main" id="{0151446F-BD2A-3564-9726-40553ADA2337}"/>
+              </a:ext>
+            </a:extLst>
+          </p:cNvPr>
+          <p:cNvPicPr>
+            <a:picLocks noChangeAspect="1"/>
+          </p:cNvPicPr>
+          <p:nvPr/>
+        </p:nvPicPr>
+        <p:blipFill>
+          <a:blip r:embed="rId2">
+            <a:extLst>
+              <a:ext uri="{28A0092B-C50C-407E-A947-70E740481C1C}">
+                <a14:useLocalDpi xmlns:a14="http://schemas.microsoft.com/office/drawing/2010/main" val="0"/>
+              </a:ext>
+            </a:extLst>
+          </a:blip>
+          <a:stretch>
+            <a:fillRect/>
+          </a:stretch>
+        </p:blipFill>
+        <p:spPr>
+          <a:xfrm>
+            <a:off x="368973" y="239266"/>
+            <a:ext cx="3944120" cy="1655067"/>
+          </a:xfrm>
+          <a:prstGeom prst="rect">
+            <a:avLst/>
+          </a:prstGeom>
+        </p:spPr>
+      </p:pic>
+      <p:sp>
+        <p:nvSpPr>
+          <p:cNvPr id="5" name="Rectangle 4">
+            <a:extLst>
+              <a:ext uri="{FF2B5EF4-FFF2-40B4-BE49-F238E27FC236}">
+                <a16:creationId xmlns:a16="http://schemas.microsoft.com/office/drawing/2014/main" id="{97D66450-5B0C-F242-5674-9433634FD346}"/>
+              </a:ext>
+            </a:extLst>
+          </p:cNvPr>
+          <p:cNvSpPr/>
+          <p:nvPr/>
+        </p:nvSpPr>
+        <p:spPr>
+          <a:xfrm>
+            <a:off x="2767753" y="2317136"/>
+            <a:ext cx="6163589" cy="2223725"/>
+          </a:xfrm>
+          <a:prstGeom prst="rect">
+            <a:avLst/>
+          </a:prstGeom>
+          <a:solidFill>
+            <a:srgbClr val="1E1E1E"/>
+          </a:solidFill>
+          <a:ln>
+            <a:solidFill>
+              <a:srgbClr val="1E1E1E"/>
+            </a:solidFill>
+          </a:ln>
+        </p:spPr>
+        <p:style>
+          <a:lnRef idx="2">
+            <a:schemeClr val="accent1">
+              <a:shade val="15000"/>
+            </a:schemeClr>
+          </a:lnRef>
+          <a:fillRef idx="1">
+            <a:schemeClr val="accent1"/>
+          </a:fillRef>
+          <a:effectRef idx="0">
+            <a:schemeClr val="accent1"/>
+          </a:effectRef>
+          <a:fontRef idx="minor">
+            <a:schemeClr val="lt1"/>
+          </a:fontRef>
+        </p:style>
+        <p:txBody>
+          <a:bodyPr rtlCol="0" anchor="ctr"/>
+          <a:lstStyle/>
+          <a:p>
+            <a:pPr algn="ctr"/>
+            <a:endParaRPr lang="en-GB"/>
+          </a:p>
+        </p:txBody>
+      </p:sp>
+      <p:sp>
+        <p:nvSpPr>
+          <p:cNvPr id="4" name="Rectangle: Rounded Corners 3">
+            <a:extLst>
+              <a:ext uri="{FF2B5EF4-FFF2-40B4-BE49-F238E27FC236}">
+                <a16:creationId xmlns:a16="http://schemas.microsoft.com/office/drawing/2014/main" id="{7F3C5827-42C6-487F-ABF9-E82477F144BE}"/>
+              </a:ext>
+            </a:extLst>
+          </p:cNvPr>
+          <p:cNvSpPr/>
+          <p:nvPr/>
+        </p:nvSpPr>
+        <p:spPr>
+          <a:xfrm>
+            <a:off x="2767753" y="2317136"/>
+            <a:ext cx="6163589" cy="2223726"/>
+          </a:xfrm>
+          <a:prstGeom prst="roundRect">
+            <a:avLst/>
+          </a:prstGeom>
+          <a:solidFill>
+            <a:srgbClr val="1E1E1E"/>
+          </a:solidFill>
+          <a:ln>
+            <a:solidFill>
+              <a:srgbClr val="505050"/>
+            </a:solidFill>
+          </a:ln>
+          <a:scene3d>
+            <a:camera prst="orthographicFront"/>
+            <a:lightRig rig="threePt" dir="t"/>
+          </a:scene3d>
+          <a:sp3d>
+            <a:bevelT w="139700" prst="cross"/>
+          </a:sp3d>
+        </p:spPr>
+        <p:style>
+          <a:lnRef idx="2">
+            <a:schemeClr val="accent1">
+              <a:shade val="15000"/>
+            </a:schemeClr>
+          </a:lnRef>
+          <a:fillRef idx="1">
+            <a:schemeClr val="accent1"/>
+          </a:fillRef>
+          <a:effectRef idx="0">
+            <a:schemeClr val="accent1"/>
+          </a:effectRef>
+          <a:fontRef idx="minor">
+            <a:schemeClr val="lt1"/>
+          </a:fontRef>
+        </p:style>
+        <p:txBody>
+          <a:bodyPr rtlCol="0" anchor="ctr"/>
+          <a:lstStyle/>
+          <a:p>
+            <a:pPr algn="ctr"/>
+            <a:r>
+              <a:rPr lang="en-GB" sz="13000" dirty="0">
+                <a:solidFill>
+                  <a:schemeClr val="bg1"/>
+                </a:solidFill>
+                <a:latin typeface="Noto Serif" panose="02020502060505020204" pitchFamily="18" charset="0"/>
+                <a:ea typeface="Noto Serif" panose="02020502060505020204" pitchFamily="18" charset="0"/>
+                <a:cs typeface="Noto Serif" panose="02020502060505020204" pitchFamily="18" charset="0"/>
+              </a:rPr>
+              <a:t>Pycraft</a:t>
+            </a:r>
+          </a:p>
+        </p:txBody>
+      </p:sp>
+    </p:spTree>
+    <p:extLst>
+      <p:ext uri="{BB962C8B-B14F-4D97-AF65-F5344CB8AC3E}">
+        <p14:creationId xmlns:p14="http://schemas.microsoft.com/office/powerpoint/2010/main" val="3130343794"/>
+      </p:ext>
+    </p:extLst>
+  </p:cSld>
+  <p:clrMapOvr>
+    <a:masterClrMapping/>
+  </p:clrMapOvr>
+</p:sld>
+</file>
+
+<file path=ppt/slides/slide9.xml><?xml version="1.0" encoding="utf-8"?>
+<p:sld xmlns:a="http://schemas.openxmlformats.org/drawingml/2006/main" xmlns:r="http://schemas.openxmlformats.org/officeDocument/2006/relationships" xmlns:p="http://schemas.openxmlformats.org/presentationml/2006/main">
+  <p:cSld>
+    <p:bg>
+      <p:bgPr>
+        <a:solidFill>
+          <a:srgbClr val="FF0000"/>
+        </a:solidFill>
+        <a:effectLst/>
+      </p:bgPr>
+    </p:bg>
+    <p:spTree>
+      <p:nvGrpSpPr>
+        <p:cNvPr id="1" name=""/>
+        <p:cNvGrpSpPr/>
+        <p:nvPr/>
+      </p:nvGrpSpPr>
+      <p:grpSpPr>
+        <a:xfrm>
+          <a:off x="0" y="0"/>
+          <a:ext cx="0" cy="0"/>
+          <a:chOff x="0" y="0"/>
+          <a:chExt cx="0" cy="0"/>
+        </a:xfrm>
+      </p:grpSpPr>
+    </p:spTree>
+    <p:extLst>
+      <p:ext uri="{BB962C8B-B14F-4D97-AF65-F5344CB8AC3E}">
+        <p14:creationId xmlns:p14="http://schemas.microsoft.com/office/powerpoint/2010/main" val="3871932749"/>
       </p:ext>
     </p:extLst>
   </p:cSld>

</xml_diff>

<commit_message>
new font based resources
</commit_message>
<xml_diff>
--- a/Pycraft data files/current/Background ideas for Pycraft Reimagined.pptx
+++ b/Pycraft data files/current/Background ideas for Pycraft Reimagined.pptx
@@ -13,18 +13,19 @@
     <p:sldId id="274" r:id="rId7"/>
     <p:sldId id="261" r:id="rId8"/>
     <p:sldId id="262" r:id="rId9"/>
-    <p:sldId id="275" r:id="rId10"/>
-    <p:sldId id="263" r:id="rId11"/>
-    <p:sldId id="264" r:id="rId12"/>
-    <p:sldId id="265" r:id="rId13"/>
-    <p:sldId id="266" r:id="rId14"/>
+    <p:sldId id="263" r:id="rId10"/>
+    <p:sldId id="264" r:id="rId11"/>
+    <p:sldId id="265" r:id="rId12"/>
+    <p:sldId id="266" r:id="rId13"/>
+    <p:sldId id="276" r:id="rId14"/>
     <p:sldId id="267" r:id="rId15"/>
     <p:sldId id="268" r:id="rId16"/>
     <p:sldId id="269" r:id="rId17"/>
     <p:sldId id="270" r:id="rId18"/>
     <p:sldId id="271" r:id="rId19"/>
     <p:sldId id="272" r:id="rId20"/>
-    <p:sldId id="273" r:id="rId21"/>
+    <p:sldId id="275" r:id="rId21"/>
+    <p:sldId id="273" r:id="rId22"/>
   </p:sldIdLst>
   <p:sldSz cx="12192000" cy="6858000"/>
   <p:notesSz cx="6858000" cy="9144000"/>
@@ -280,7 +281,7 @@
           <a:p>
             <a:fld id="{2268D07C-359D-43C3-800B-3286632F6833}" type="datetimeFigureOut">
               <a:rPr lang="en-GB" smtClean="0"/>
-              <a:t>05/10/2023</a:t>
+              <a:t>06/10/2023</a:t>
             </a:fld>
             <a:endParaRPr lang="en-GB"/>
           </a:p>
@@ -480,7 +481,7 @@
           <a:p>
             <a:fld id="{2268D07C-359D-43C3-800B-3286632F6833}" type="datetimeFigureOut">
               <a:rPr lang="en-GB" smtClean="0"/>
-              <a:t>05/10/2023</a:t>
+              <a:t>06/10/2023</a:t>
             </a:fld>
             <a:endParaRPr lang="en-GB"/>
           </a:p>
@@ -690,7 +691,7 @@
           <a:p>
             <a:fld id="{2268D07C-359D-43C3-800B-3286632F6833}" type="datetimeFigureOut">
               <a:rPr lang="en-GB" smtClean="0"/>
-              <a:t>05/10/2023</a:t>
+              <a:t>06/10/2023</a:t>
             </a:fld>
             <a:endParaRPr lang="en-GB"/>
           </a:p>
@@ -890,7 +891,7 @@
           <a:p>
             <a:fld id="{2268D07C-359D-43C3-800B-3286632F6833}" type="datetimeFigureOut">
               <a:rPr lang="en-GB" smtClean="0"/>
-              <a:t>05/10/2023</a:t>
+              <a:t>06/10/2023</a:t>
             </a:fld>
             <a:endParaRPr lang="en-GB"/>
           </a:p>
@@ -1166,7 +1167,7 @@
           <a:p>
             <a:fld id="{2268D07C-359D-43C3-800B-3286632F6833}" type="datetimeFigureOut">
               <a:rPr lang="en-GB" smtClean="0"/>
-              <a:t>05/10/2023</a:t>
+              <a:t>06/10/2023</a:t>
             </a:fld>
             <a:endParaRPr lang="en-GB"/>
           </a:p>
@@ -1434,7 +1435,7 @@
           <a:p>
             <a:fld id="{2268D07C-359D-43C3-800B-3286632F6833}" type="datetimeFigureOut">
               <a:rPr lang="en-GB" smtClean="0"/>
-              <a:t>05/10/2023</a:t>
+              <a:t>06/10/2023</a:t>
             </a:fld>
             <a:endParaRPr lang="en-GB"/>
           </a:p>
@@ -1849,7 +1850,7 @@
           <a:p>
             <a:fld id="{2268D07C-359D-43C3-800B-3286632F6833}" type="datetimeFigureOut">
               <a:rPr lang="en-GB" smtClean="0"/>
-              <a:t>05/10/2023</a:t>
+              <a:t>06/10/2023</a:t>
             </a:fld>
             <a:endParaRPr lang="en-GB"/>
           </a:p>
@@ -1991,7 +1992,7 @@
           <a:p>
             <a:fld id="{2268D07C-359D-43C3-800B-3286632F6833}" type="datetimeFigureOut">
               <a:rPr lang="en-GB" smtClean="0"/>
-              <a:t>05/10/2023</a:t>
+              <a:t>06/10/2023</a:t>
             </a:fld>
             <a:endParaRPr lang="en-GB"/>
           </a:p>
@@ -2104,7 +2105,7 @@
           <a:p>
             <a:fld id="{2268D07C-359D-43C3-800B-3286632F6833}" type="datetimeFigureOut">
               <a:rPr lang="en-GB" smtClean="0"/>
-              <a:t>05/10/2023</a:t>
+              <a:t>06/10/2023</a:t>
             </a:fld>
             <a:endParaRPr lang="en-GB"/>
           </a:p>
@@ -2417,7 +2418,7 @@
           <a:p>
             <a:fld id="{2268D07C-359D-43C3-800B-3286632F6833}" type="datetimeFigureOut">
               <a:rPr lang="en-GB" smtClean="0"/>
-              <a:t>05/10/2023</a:t>
+              <a:t>06/10/2023</a:t>
             </a:fld>
             <a:endParaRPr lang="en-GB"/>
           </a:p>
@@ -2706,7 +2707,7 @@
           <a:p>
             <a:fld id="{2268D07C-359D-43C3-800B-3286632F6833}" type="datetimeFigureOut">
               <a:rPr lang="en-GB" smtClean="0"/>
-              <a:t>05/10/2023</a:t>
+              <a:t>06/10/2023</a:t>
             </a:fld>
             <a:endParaRPr lang="en-GB"/>
           </a:p>
@@ -2949,7 +2950,7 @@
           <a:p>
             <a:fld id="{2268D07C-359D-43C3-800B-3286632F6833}" type="datetimeFigureOut">
               <a:rPr lang="en-GB" smtClean="0"/>
-              <a:t>05/10/2023</a:t>
+              <a:t>06/10/2023</a:t>
             </a:fld>
             <a:endParaRPr lang="en-GB"/>
           </a:p>
@@ -3935,7 +3936,7 @@
           <p:cNvPr id="3" name="Picture 2">
             <a:extLst>
               <a:ext uri="{FF2B5EF4-FFF2-40B4-BE49-F238E27FC236}">
-                <a16:creationId xmlns:a16="http://schemas.microsoft.com/office/drawing/2014/main" id="{48126AE8-085C-558D-694D-DFB2CC1BCA22}"/>
+                <a16:creationId xmlns:a16="http://schemas.microsoft.com/office/drawing/2014/main" id="{56D9FEBE-F670-3EF0-ADE6-696C2A27BD4E}"/>
               </a:ext>
             </a:extLst>
           </p:cNvPr>
@@ -3958,8 +3959,8 @@
         </p:blipFill>
         <p:spPr>
           <a:xfrm>
-            <a:off x="3014205" y="2206646"/>
-            <a:ext cx="6163590" cy="2444708"/>
+            <a:off x="0" y="1007559"/>
+            <a:ext cx="12192000" cy="4842881"/>
           </a:xfrm>
           <a:prstGeom prst="rect">
             <a:avLst/>
@@ -3969,7 +3970,7 @@
     </p:spTree>
     <p:extLst>
       <p:ext uri="{BB962C8B-B14F-4D97-AF65-F5344CB8AC3E}">
-        <p14:creationId xmlns:p14="http://schemas.microsoft.com/office/powerpoint/2010/main" val="3673453931"/>
+        <p14:creationId xmlns:p14="http://schemas.microsoft.com/office/powerpoint/2010/main" val="94890027"/>
       </p:ext>
     </p:extLst>
   </p:cSld>
@@ -4001,7 +4002,7 @@
           <p:cNvPr id="3" name="Picture 2">
             <a:extLst>
               <a:ext uri="{FF2B5EF4-FFF2-40B4-BE49-F238E27FC236}">
-                <a16:creationId xmlns:a16="http://schemas.microsoft.com/office/drawing/2014/main" id="{56D9FEBE-F670-3EF0-ADE6-696C2A27BD4E}"/>
+                <a16:creationId xmlns:a16="http://schemas.microsoft.com/office/drawing/2014/main" id="{4BF04D9A-2C30-3348-BCE4-2DF09C06174F}"/>
               </a:ext>
             </a:extLst>
           </p:cNvPr>
@@ -4024,8 +4025,8 @@
         </p:blipFill>
         <p:spPr>
           <a:xfrm>
-            <a:off x="0" y="1007559"/>
-            <a:ext cx="12192000" cy="4842881"/>
+            <a:off x="732998" y="1249287"/>
+            <a:ext cx="4968671" cy="1243692"/>
           </a:xfrm>
           <a:prstGeom prst="rect">
             <a:avLst/>
@@ -4035,7 +4036,7 @@
     </p:spTree>
     <p:extLst>
       <p:ext uri="{BB962C8B-B14F-4D97-AF65-F5344CB8AC3E}">
-        <p14:creationId xmlns:p14="http://schemas.microsoft.com/office/powerpoint/2010/main" val="94890027"/>
+        <p14:creationId xmlns:p14="http://schemas.microsoft.com/office/powerpoint/2010/main" val="4019192603"/>
       </p:ext>
     </p:extLst>
   </p:cSld>
@@ -4067,7 +4068,7 @@
           <p:cNvPr id="3" name="Picture 2">
             <a:extLst>
               <a:ext uri="{FF2B5EF4-FFF2-40B4-BE49-F238E27FC236}">
-                <a16:creationId xmlns:a16="http://schemas.microsoft.com/office/drawing/2014/main" id="{4BF04D9A-2C30-3348-BCE4-2DF09C06174F}"/>
+                <a16:creationId xmlns:a16="http://schemas.microsoft.com/office/drawing/2014/main" id="{0B0756B9-0002-7B9D-1429-2C22BBBB9EBE}"/>
               </a:ext>
             </a:extLst>
           </p:cNvPr>
@@ -4090,18 +4091,140 @@
         </p:blipFill>
         <p:spPr>
           <a:xfrm>
-            <a:off x="3611664" y="2807154"/>
-            <a:ext cx="4968671" cy="1243692"/>
+            <a:off x="0" y="998724"/>
+            <a:ext cx="5204228" cy="4860552"/>
           </a:xfrm>
           <a:prstGeom prst="rect">
             <a:avLst/>
           </a:prstGeom>
         </p:spPr>
       </p:pic>
+      <p:sp>
+        <p:nvSpPr>
+          <p:cNvPr id="2" name="Rectangle 1">
+            <a:extLst>
+              <a:ext uri="{FF2B5EF4-FFF2-40B4-BE49-F238E27FC236}">
+                <a16:creationId xmlns:a16="http://schemas.microsoft.com/office/drawing/2014/main" id="{BFA30666-8E48-B784-E63F-A686C205ADD5}"/>
+              </a:ext>
+            </a:extLst>
+          </p:cNvPr>
+          <p:cNvSpPr/>
+          <p:nvPr/>
+        </p:nvSpPr>
+        <p:spPr>
+          <a:xfrm>
+            <a:off x="6096000" y="998724"/>
+            <a:ext cx="5204228" cy="4860551"/>
+          </a:xfrm>
+          <a:prstGeom prst="rect">
+            <a:avLst/>
+          </a:prstGeom>
+          <a:solidFill>
+            <a:srgbClr val="242424"/>
+          </a:solidFill>
+          <a:ln>
+            <a:solidFill>
+              <a:srgbClr val="1E1E1E"/>
+            </a:solidFill>
+          </a:ln>
+        </p:spPr>
+        <p:style>
+          <a:lnRef idx="2">
+            <a:schemeClr val="accent1">
+              <a:shade val="15000"/>
+            </a:schemeClr>
+          </a:lnRef>
+          <a:fillRef idx="1">
+            <a:schemeClr val="accent1"/>
+          </a:fillRef>
+          <a:effectRef idx="0">
+            <a:schemeClr val="accent1"/>
+          </a:effectRef>
+          <a:fontRef idx="minor">
+            <a:schemeClr val="lt1"/>
+          </a:fontRef>
+        </p:style>
+        <p:txBody>
+          <a:bodyPr rtlCol="0" anchor="ctr"/>
+          <a:lstStyle/>
+          <a:p>
+            <a:pPr algn="ctr"/>
+            <a:r>
+              <a:rPr lang="en-GB" sz="41300" b="1" dirty="0">
+                <a:solidFill>
+                  <a:srgbClr val="1E1E1E"/>
+                </a:solidFill>
+                <a:latin typeface="Noto Serif" panose="02020502060505020204" pitchFamily="18" charset="0"/>
+                <a:ea typeface="Noto Serif" panose="02020502060505020204" pitchFamily="18" charset="0"/>
+                <a:cs typeface="Noto Serif" panose="02020502060505020204" pitchFamily="18" charset="0"/>
+              </a:rPr>
+              <a:t>#</a:t>
+            </a:r>
+            <a:endParaRPr lang="en-GB" b="1" dirty="0">
+              <a:solidFill>
+                <a:srgbClr val="1E1E1E"/>
+              </a:solidFill>
+              <a:latin typeface="Noto Serif" panose="02020502060505020204" pitchFamily="18" charset="0"/>
+              <a:ea typeface="Noto Serif" panose="02020502060505020204" pitchFamily="18" charset="0"/>
+              <a:cs typeface="Noto Serif" panose="02020502060505020204" pitchFamily="18" charset="0"/>
+            </a:endParaRPr>
+          </a:p>
+        </p:txBody>
+      </p:sp>
+      <p:sp>
+        <p:nvSpPr>
+          <p:cNvPr id="4" name="TextBox 3">
+            <a:extLst>
+              <a:ext uri="{FF2B5EF4-FFF2-40B4-BE49-F238E27FC236}">
+                <a16:creationId xmlns:a16="http://schemas.microsoft.com/office/drawing/2014/main" id="{3E2C672C-F803-E516-A0F7-1BCF8B0F6AD2}"/>
+              </a:ext>
+            </a:extLst>
+          </p:cNvPr>
+          <p:cNvSpPr txBox="1"/>
+          <p:nvPr/>
+        </p:nvSpPr>
+        <p:spPr>
+          <a:xfrm>
+            <a:off x="7122201" y="2934211"/>
+            <a:ext cx="3151825" cy="769441"/>
+          </a:xfrm>
+          <a:prstGeom prst="rect">
+            <a:avLst/>
+          </a:prstGeom>
+          <a:noFill/>
+        </p:spPr>
+        <p:txBody>
+          <a:bodyPr wrap="none" rtlCol="0">
+            <a:spAutoFit/>
+          </a:bodyPr>
+          <a:lstStyle/>
+          <a:p>
+            <a:r>
+              <a:rPr lang="en-GB" sz="4400" dirty="0">
+                <a:solidFill>
+                  <a:schemeClr val="bg1"/>
+                </a:solidFill>
+                <a:latin typeface="Noto Serif" panose="02020502060505020204" pitchFamily="18" charset="0"/>
+                <a:ea typeface="Noto Serif" panose="02020502060505020204" pitchFamily="18" charset="0"/>
+                <a:cs typeface="Noto Serif" panose="02020502060505020204" pitchFamily="18" charset="0"/>
+              </a:rPr>
+              <a:t>PycraftDev</a:t>
+            </a:r>
+            <a:endParaRPr lang="en-GB" sz="2800" dirty="0">
+              <a:solidFill>
+                <a:schemeClr val="bg1"/>
+              </a:solidFill>
+              <a:latin typeface="Noto Serif" panose="02020502060505020204" pitchFamily="18" charset="0"/>
+              <a:ea typeface="Noto Serif" panose="02020502060505020204" pitchFamily="18" charset="0"/>
+              <a:cs typeface="Noto Serif" panose="02020502060505020204" pitchFamily="18" charset="0"/>
+            </a:endParaRPr>
+          </a:p>
+        </p:txBody>
+      </p:sp>
     </p:spTree>
     <p:extLst>
       <p:ext uri="{BB962C8B-B14F-4D97-AF65-F5344CB8AC3E}">
-        <p14:creationId xmlns:p14="http://schemas.microsoft.com/office/powerpoint/2010/main" val="4019192603"/>
+        <p14:creationId xmlns:p14="http://schemas.microsoft.com/office/powerpoint/2010/main" val="1528842542"/>
       </p:ext>
     </p:extLst>
   </p:cSld>
@@ -4156,7 +4279,7 @@
         </p:blipFill>
         <p:spPr>
           <a:xfrm>
-            <a:off x="3493886" y="998724"/>
+            <a:off x="0" y="998724"/>
             <a:ext cx="5204228" cy="4860552"/>
           </a:xfrm>
           <a:prstGeom prst="rect">
@@ -4164,10 +4287,132 @@
           </a:prstGeom>
         </p:spPr>
       </p:pic>
+      <p:sp>
+        <p:nvSpPr>
+          <p:cNvPr id="2" name="Rectangle: Rounded Corners 1">
+            <a:extLst>
+              <a:ext uri="{FF2B5EF4-FFF2-40B4-BE49-F238E27FC236}">
+                <a16:creationId xmlns:a16="http://schemas.microsoft.com/office/drawing/2014/main" id="{BFA30666-8E48-B784-E63F-A686C205ADD5}"/>
+              </a:ext>
+            </a:extLst>
+          </p:cNvPr>
+          <p:cNvSpPr/>
+          <p:nvPr/>
+        </p:nvSpPr>
+        <p:spPr>
+          <a:xfrm>
+            <a:off x="6096000" y="998724"/>
+            <a:ext cx="5204228" cy="4860551"/>
+          </a:xfrm>
+          <a:prstGeom prst="roundRect">
+            <a:avLst/>
+          </a:prstGeom>
+          <a:solidFill>
+            <a:srgbClr val="242424"/>
+          </a:solidFill>
+          <a:ln>
+            <a:solidFill>
+              <a:srgbClr val="1E1E1E"/>
+            </a:solidFill>
+          </a:ln>
+        </p:spPr>
+        <p:style>
+          <a:lnRef idx="2">
+            <a:schemeClr val="accent1">
+              <a:shade val="15000"/>
+            </a:schemeClr>
+          </a:lnRef>
+          <a:fillRef idx="1">
+            <a:schemeClr val="accent1"/>
+          </a:fillRef>
+          <a:effectRef idx="0">
+            <a:schemeClr val="accent1"/>
+          </a:effectRef>
+          <a:fontRef idx="minor">
+            <a:schemeClr val="lt1"/>
+          </a:fontRef>
+        </p:style>
+        <p:txBody>
+          <a:bodyPr rtlCol="0" anchor="ctr"/>
+          <a:lstStyle/>
+          <a:p>
+            <a:pPr algn="ctr"/>
+            <a:r>
+              <a:rPr lang="en-GB" sz="41300" b="1" dirty="0">
+                <a:solidFill>
+                  <a:srgbClr val="1E1E1E"/>
+                </a:solidFill>
+                <a:latin typeface="Noto Serif" panose="02020502060505020204" pitchFamily="18" charset="0"/>
+                <a:ea typeface="Noto Serif" panose="02020502060505020204" pitchFamily="18" charset="0"/>
+                <a:cs typeface="Noto Serif" panose="02020502060505020204" pitchFamily="18" charset="0"/>
+              </a:rPr>
+              <a:t>#</a:t>
+            </a:r>
+            <a:endParaRPr lang="en-GB" b="1" dirty="0">
+              <a:solidFill>
+                <a:srgbClr val="1E1E1E"/>
+              </a:solidFill>
+              <a:latin typeface="Noto Serif" panose="02020502060505020204" pitchFamily="18" charset="0"/>
+              <a:ea typeface="Noto Serif" panose="02020502060505020204" pitchFamily="18" charset="0"/>
+              <a:cs typeface="Noto Serif" panose="02020502060505020204" pitchFamily="18" charset="0"/>
+            </a:endParaRPr>
+          </a:p>
+        </p:txBody>
+      </p:sp>
+      <p:sp>
+        <p:nvSpPr>
+          <p:cNvPr id="4" name="TextBox 3">
+            <a:extLst>
+              <a:ext uri="{FF2B5EF4-FFF2-40B4-BE49-F238E27FC236}">
+                <a16:creationId xmlns:a16="http://schemas.microsoft.com/office/drawing/2014/main" id="{3E2C672C-F803-E516-A0F7-1BCF8B0F6AD2}"/>
+              </a:ext>
+            </a:extLst>
+          </p:cNvPr>
+          <p:cNvSpPr txBox="1"/>
+          <p:nvPr/>
+        </p:nvSpPr>
+        <p:spPr>
+          <a:xfrm>
+            <a:off x="7122201" y="2934211"/>
+            <a:ext cx="3151825" cy="769441"/>
+          </a:xfrm>
+          <a:prstGeom prst="rect">
+            <a:avLst/>
+          </a:prstGeom>
+          <a:noFill/>
+        </p:spPr>
+        <p:txBody>
+          <a:bodyPr wrap="none" rtlCol="0">
+            <a:spAutoFit/>
+          </a:bodyPr>
+          <a:lstStyle/>
+          <a:p>
+            <a:r>
+              <a:rPr lang="en-GB" sz="4400" dirty="0">
+                <a:solidFill>
+                  <a:schemeClr val="bg1"/>
+                </a:solidFill>
+                <a:latin typeface="Noto Serif" panose="02020502060505020204" pitchFamily="18" charset="0"/>
+                <a:ea typeface="Noto Serif" panose="02020502060505020204" pitchFamily="18" charset="0"/>
+                <a:cs typeface="Noto Serif" panose="02020502060505020204" pitchFamily="18" charset="0"/>
+              </a:rPr>
+              <a:t>PycraftDev</a:t>
+            </a:r>
+            <a:endParaRPr lang="en-GB" sz="2800" dirty="0">
+              <a:solidFill>
+                <a:schemeClr val="bg1"/>
+              </a:solidFill>
+              <a:latin typeface="Noto Serif" panose="02020502060505020204" pitchFamily="18" charset="0"/>
+              <a:ea typeface="Noto Serif" panose="02020502060505020204" pitchFamily="18" charset="0"/>
+              <a:cs typeface="Noto Serif" panose="02020502060505020204" pitchFamily="18" charset="0"/>
+            </a:endParaRPr>
+          </a:p>
+        </p:txBody>
+      </p:sp>
     </p:spTree>
     <p:extLst>
       <p:ext uri="{BB962C8B-B14F-4D97-AF65-F5344CB8AC3E}">
-        <p14:creationId xmlns:p14="http://schemas.microsoft.com/office/powerpoint/2010/main" val="1528842542"/>
+        <p14:creationId xmlns:p14="http://schemas.microsoft.com/office/powerpoint/2010/main" val="2449411376"/>
       </p:ext>
     </p:extLst>
   </p:cSld>
@@ -4354,8 +4599,80 @@
         </p:blipFill>
         <p:spPr>
           <a:xfrm>
-            <a:off x="3892105" y="1234250"/>
+            <a:off x="0" y="0"/>
             <a:ext cx="4407790" cy="4389500"/>
+          </a:xfrm>
+          <a:prstGeom prst="rect">
+            <a:avLst/>
+          </a:prstGeom>
+        </p:spPr>
+      </p:pic>
+      <p:pic>
+        <p:nvPicPr>
+          <p:cNvPr id="3" name="Picture 2">
+            <a:extLst>
+              <a:ext uri="{FF2B5EF4-FFF2-40B4-BE49-F238E27FC236}">
+                <a16:creationId xmlns:a16="http://schemas.microsoft.com/office/drawing/2014/main" id="{6D23B6A6-8BD8-127F-2F6F-20255901C0DF}"/>
+              </a:ext>
+            </a:extLst>
+          </p:cNvPr>
+          <p:cNvPicPr>
+            <a:picLocks noChangeAspect="1"/>
+          </p:cNvPicPr>
+          <p:nvPr/>
+        </p:nvPicPr>
+        <p:blipFill>
+          <a:blip r:embed="rId3">
+            <a:extLst>
+              <a:ext uri="{28A0092B-C50C-407E-A947-70E740481C1C}">
+                <a14:useLocalDpi xmlns:a14="http://schemas.microsoft.com/office/drawing/2010/main" val="0"/>
+              </a:ext>
+            </a:extLst>
+          </a:blip>
+          <a:stretch>
+            <a:fillRect/>
+          </a:stretch>
+        </p:blipFill>
+        <p:spPr>
+          <a:xfrm>
+            <a:off x="6959150" y="1205470"/>
+            <a:ext cx="4437433" cy="4447059"/>
+          </a:xfrm>
+          <a:prstGeom prst="rect">
+            <a:avLst/>
+          </a:prstGeom>
+        </p:spPr>
+      </p:pic>
+      <p:pic>
+        <p:nvPicPr>
+          <p:cNvPr id="5" name="Picture 4">
+            <a:extLst>
+              <a:ext uri="{FF2B5EF4-FFF2-40B4-BE49-F238E27FC236}">
+                <a16:creationId xmlns:a16="http://schemas.microsoft.com/office/drawing/2014/main" id="{6DAC1F12-5C4F-9A0E-A400-11E6DFE490D5}"/>
+              </a:ext>
+            </a:extLst>
+          </p:cNvPr>
+          <p:cNvPicPr>
+            <a:picLocks noChangeAspect="1"/>
+          </p:cNvPicPr>
+          <p:nvPr/>
+        </p:nvPicPr>
+        <p:blipFill>
+          <a:blip r:embed="rId4">
+            <a:extLst>
+              <a:ext uri="{28A0092B-C50C-407E-A947-70E740481C1C}">
+                <a14:useLocalDpi xmlns:a14="http://schemas.microsoft.com/office/drawing/2010/main" val="0"/>
+              </a:ext>
+            </a:extLst>
+          </a:blip>
+          <a:stretch>
+            <a:fillRect/>
+          </a:stretch>
+        </p:blipFill>
+        <p:spPr>
+          <a:xfrm>
+            <a:off x="7556274" y="2840492"/>
+            <a:ext cx="3243183" cy="1177013"/>
           </a:xfrm>
           <a:prstGeom prst="rect">
             <a:avLst/>
@@ -4486,7 +4803,7 @@
         </p:blipFill>
         <p:spPr>
           <a:xfrm>
-            <a:off x="4437744" y="1770744"/>
+            <a:off x="5005010" y="966411"/>
             <a:ext cx="3316511" cy="3316511"/>
           </a:xfrm>
           <a:prstGeom prst="rect">
@@ -4494,6 +4811,85 @@
           </a:prstGeom>
         </p:spPr>
       </p:pic>
+      <p:sp>
+        <p:nvSpPr>
+          <p:cNvPr id="2" name="Rectangle: Rounded Corners 1">
+            <a:extLst>
+              <a:ext uri="{FF2B5EF4-FFF2-40B4-BE49-F238E27FC236}">
+                <a16:creationId xmlns:a16="http://schemas.microsoft.com/office/drawing/2014/main" id="{F05A9F2A-F1D4-8736-ED05-BAB93E97B452}"/>
+              </a:ext>
+            </a:extLst>
+          </p:cNvPr>
+          <p:cNvSpPr/>
+          <p:nvPr/>
+        </p:nvSpPr>
+        <p:spPr>
+          <a:xfrm>
+            <a:off x="1084944" y="966411"/>
+            <a:ext cx="3316510" cy="3316511"/>
+          </a:xfrm>
+          <a:prstGeom prst="roundRect">
+            <a:avLst/>
+          </a:prstGeom>
+          <a:solidFill>
+            <a:srgbClr val="1E1E1E"/>
+          </a:solidFill>
+          <a:ln>
+            <a:solidFill>
+              <a:srgbClr val="505050"/>
+            </a:solidFill>
+          </a:ln>
+          <a:scene3d>
+            <a:camera prst="orthographicFront"/>
+            <a:lightRig rig="threePt" dir="t"/>
+          </a:scene3d>
+          <a:sp3d>
+            <a:bevelT w="139700" prst="cross"/>
+          </a:sp3d>
+        </p:spPr>
+        <p:style>
+          <a:lnRef idx="2">
+            <a:schemeClr val="accent1">
+              <a:shade val="15000"/>
+            </a:schemeClr>
+          </a:lnRef>
+          <a:fillRef idx="1">
+            <a:schemeClr val="accent1"/>
+          </a:fillRef>
+          <a:effectRef idx="0">
+            <a:schemeClr val="accent1"/>
+          </a:effectRef>
+          <a:fontRef idx="minor">
+            <a:schemeClr val="lt1"/>
+          </a:fontRef>
+        </p:style>
+        <p:txBody>
+          <a:bodyPr rtlCol="0" anchor="ctr"/>
+          <a:lstStyle/>
+          <a:p>
+            <a:pPr algn="ctr"/>
+            <a:r>
+              <a:rPr lang="en-GB" sz="26900" dirty="0">
+                <a:solidFill>
+                  <a:schemeClr val="bg1"/>
+                </a:solidFill>
+                <a:latin typeface="Noto Serif" panose="02020502060505020204" pitchFamily="18" charset="0"/>
+                <a:ea typeface="Noto Serif" panose="02020502060505020204" pitchFamily="18" charset="0"/>
+                <a:cs typeface="Noto Serif" panose="02020502060505020204" pitchFamily="18" charset="0"/>
+              </a:rPr>
+              <a:t>P</a:t>
+            </a:r>
+            <a:endParaRPr lang="en-GB" sz="13000" dirty="0">
+              <a:solidFill>
+                <a:schemeClr val="bg1"/>
+              </a:solidFill>
+              <a:latin typeface="Noto Serif" panose="02020502060505020204" pitchFamily="18" charset="0"/>
+              <a:ea typeface="Noto Serif" panose="02020502060505020204" pitchFamily="18" charset="0"/>
+              <a:cs typeface="Noto Serif" panose="02020502060505020204" pitchFamily="18" charset="0"/>
+            </a:endParaRPr>
+          </a:p>
+        </p:txBody>
+      </p:sp>
     </p:spTree>
     <p:extLst>
       <p:ext uri="{BB962C8B-B14F-4D97-AF65-F5344CB8AC3E}">
@@ -4552,7 +4948,7 @@
         </p:blipFill>
         <p:spPr>
           <a:xfrm>
-            <a:off x="2764247" y="2593775"/>
+            <a:off x="0" y="0"/>
             <a:ext cx="6663506" cy="1670449"/>
           </a:xfrm>
           <a:prstGeom prst="rect">
@@ -4560,6 +4956,91 @@
           </a:prstGeom>
         </p:spPr>
       </p:pic>
+      <p:pic>
+        <p:nvPicPr>
+          <p:cNvPr id="4" name="Picture 3">
+            <a:extLst>
+              <a:ext uri="{FF2B5EF4-FFF2-40B4-BE49-F238E27FC236}">
+                <a16:creationId xmlns:a16="http://schemas.microsoft.com/office/drawing/2014/main" id="{8EBD8E19-C4CD-B1C4-5EE2-313E0CE174F7}"/>
+              </a:ext>
+            </a:extLst>
+          </p:cNvPr>
+          <p:cNvPicPr>
+            <a:picLocks noChangeAspect="1"/>
+          </p:cNvPicPr>
+          <p:nvPr/>
+        </p:nvPicPr>
+        <p:blipFill rotWithShape="1">
+          <a:blip r:embed="rId3">
+            <a:extLst>
+              <a:ext uri="{28A0092B-C50C-407E-A947-70E740481C1C}">
+                <a14:useLocalDpi xmlns:a14="http://schemas.microsoft.com/office/drawing/2010/main" val="0"/>
+              </a:ext>
+            </a:extLst>
+          </a:blip>
+          <a:srcRect b="69610"/>
+          <a:stretch/>
+        </p:blipFill>
+        <p:spPr>
+          <a:xfrm>
+            <a:off x="4707017" y="2077537"/>
+            <a:ext cx="4437433" cy="1351464"/>
+          </a:xfrm>
+          <a:prstGeom prst="rect">
+            <a:avLst/>
+          </a:prstGeom>
+        </p:spPr>
+      </p:pic>
+      <p:sp>
+        <p:nvSpPr>
+          <p:cNvPr id="5" name="TextBox 4">
+            <a:extLst>
+              <a:ext uri="{FF2B5EF4-FFF2-40B4-BE49-F238E27FC236}">
+                <a16:creationId xmlns:a16="http://schemas.microsoft.com/office/drawing/2014/main" id="{F5D257DD-2468-FBFF-2390-A81938D72E6B}"/>
+              </a:ext>
+            </a:extLst>
+          </p:cNvPr>
+          <p:cNvSpPr txBox="1"/>
+          <p:nvPr/>
+        </p:nvSpPr>
+        <p:spPr>
+          <a:xfrm>
+            <a:off x="5869193" y="2306135"/>
+            <a:ext cx="2113079" cy="769441"/>
+          </a:xfrm>
+          <a:prstGeom prst="rect">
+            <a:avLst/>
+          </a:prstGeom>
+          <a:noFill/>
+        </p:spPr>
+        <p:txBody>
+          <a:bodyPr wrap="none" rtlCol="0">
+            <a:spAutoFit/>
+          </a:bodyPr>
+          <a:lstStyle/>
+          <a:p>
+            <a:r>
+              <a:rPr lang="en-GB" sz="4400" dirty="0">
+                <a:solidFill>
+                  <a:schemeClr val="bg1"/>
+                </a:solidFill>
+                <a:latin typeface="Noto Serif" panose="02020502060505020204" pitchFamily="18" charset="0"/>
+                <a:ea typeface="Noto Serif" panose="02020502060505020204" pitchFamily="18" charset="0"/>
+                <a:cs typeface="Noto Serif" panose="02020502060505020204" pitchFamily="18" charset="0"/>
+              </a:rPr>
+              <a:t>Pycraft</a:t>
+            </a:r>
+            <a:endParaRPr lang="en-GB" sz="3600" dirty="0">
+              <a:solidFill>
+                <a:schemeClr val="bg1"/>
+              </a:solidFill>
+              <a:latin typeface="Noto Serif" panose="02020502060505020204" pitchFamily="18" charset="0"/>
+              <a:ea typeface="Noto Serif" panose="02020502060505020204" pitchFamily="18" charset="0"/>
+              <a:cs typeface="Noto Serif" panose="02020502060505020204" pitchFamily="18" charset="0"/>
+            </a:endParaRPr>
+          </a:p>
+        </p:txBody>
+      </p:sp>
     </p:spTree>
     <p:extLst>
       <p:ext uri="{BB962C8B-B14F-4D97-AF65-F5344CB8AC3E}">
@@ -5138,6 +5619,44 @@
 </file>
 
 <file path=ppt/slides/slide20.xml><?xml version="1.0" encoding="utf-8"?>
+<p:sld xmlns:a="http://schemas.openxmlformats.org/drawingml/2006/main" xmlns:r="http://schemas.openxmlformats.org/officeDocument/2006/relationships" xmlns:p="http://schemas.openxmlformats.org/presentationml/2006/main">
+  <p:cSld>
+    <p:bg>
+      <p:bgPr>
+        <a:solidFill>
+          <a:srgbClr val="FF0000"/>
+        </a:solidFill>
+        <a:effectLst/>
+      </p:bgPr>
+    </p:bg>
+    <p:spTree>
+      <p:nvGrpSpPr>
+        <p:cNvPr id="1" name=""/>
+        <p:cNvGrpSpPr/>
+        <p:nvPr/>
+      </p:nvGrpSpPr>
+      <p:grpSpPr>
+        <a:xfrm>
+          <a:off x="0" y="0"/>
+          <a:ext cx="0" cy="0"/>
+          <a:chOff x="0" y="0"/>
+          <a:chExt cx="0" cy="0"/>
+        </a:xfrm>
+      </p:grpSpPr>
+    </p:spTree>
+    <p:extLst>
+      <p:ext uri="{BB962C8B-B14F-4D97-AF65-F5344CB8AC3E}">
+        <p14:creationId xmlns:p14="http://schemas.microsoft.com/office/powerpoint/2010/main" val="3871932749"/>
+      </p:ext>
+    </p:extLst>
+  </p:cSld>
+  <p:clrMapOvr>
+    <a:masterClrMapping/>
+  </p:clrMapOvr>
+</p:sld>
+</file>
+
+<file path=ppt/slides/slide21.xml><?xml version="1.0" encoding="utf-8"?>
 <p:sld xmlns:a="http://schemas.openxmlformats.org/drawingml/2006/main" xmlns:r="http://schemas.openxmlformats.org/officeDocument/2006/relationships" xmlns:p="http://schemas.openxmlformats.org/presentationml/2006/main">
   <p:cSld>
     <p:spTree>
@@ -7106,14 +7625,6 @@
 <file path=ppt/slides/slide9.xml><?xml version="1.0" encoding="utf-8"?>
 <p:sld xmlns:a="http://schemas.openxmlformats.org/drawingml/2006/main" xmlns:r="http://schemas.openxmlformats.org/officeDocument/2006/relationships" xmlns:p="http://schemas.openxmlformats.org/presentationml/2006/main">
   <p:cSld>
-    <p:bg>
-      <p:bgPr>
-        <a:solidFill>
-          <a:srgbClr val="FF0000"/>
-        </a:solidFill>
-        <a:effectLst/>
-      </p:bgPr>
-    </p:bg>
     <p:spTree>
       <p:nvGrpSpPr>
         <p:cNvPr id="1" name=""/>
@@ -7128,10 +7639,117 @@
           <a:chExt cx="0" cy="0"/>
         </a:xfrm>
       </p:grpSpPr>
+      <p:pic>
+        <p:nvPicPr>
+          <p:cNvPr id="3" name="Picture 2">
+            <a:extLst>
+              <a:ext uri="{FF2B5EF4-FFF2-40B4-BE49-F238E27FC236}">
+                <a16:creationId xmlns:a16="http://schemas.microsoft.com/office/drawing/2014/main" id="{48126AE8-085C-558D-694D-DFB2CC1BCA22}"/>
+              </a:ext>
+            </a:extLst>
+          </p:cNvPr>
+          <p:cNvPicPr>
+            <a:picLocks noChangeAspect="1"/>
+          </p:cNvPicPr>
+          <p:nvPr/>
+        </p:nvPicPr>
+        <p:blipFill>
+          <a:blip r:embed="rId2">
+            <a:extLst>
+              <a:ext uri="{28A0092B-C50C-407E-A947-70E740481C1C}">
+                <a14:useLocalDpi xmlns:a14="http://schemas.microsoft.com/office/drawing/2010/main" val="0"/>
+              </a:ext>
+            </a:extLst>
+          </a:blip>
+          <a:stretch>
+            <a:fillRect/>
+          </a:stretch>
+        </p:blipFill>
+        <p:spPr>
+          <a:xfrm>
+            <a:off x="601205" y="911246"/>
+            <a:ext cx="6163590" cy="2444708"/>
+          </a:xfrm>
+          <a:prstGeom prst="rect">
+            <a:avLst/>
+          </a:prstGeom>
+        </p:spPr>
+      </p:pic>
+      <p:sp>
+        <p:nvSpPr>
+          <p:cNvPr id="2" name="Rectangle: Rounded Corners 1">
+            <a:extLst>
+              <a:ext uri="{FF2B5EF4-FFF2-40B4-BE49-F238E27FC236}">
+                <a16:creationId xmlns:a16="http://schemas.microsoft.com/office/drawing/2014/main" id="{9540CC72-A755-FA60-CA60-4B6B14D5396A}"/>
+              </a:ext>
+            </a:extLst>
+          </p:cNvPr>
+          <p:cNvSpPr/>
+          <p:nvPr/>
+        </p:nvSpPr>
+        <p:spPr>
+          <a:xfrm>
+            <a:off x="541867" y="3590713"/>
+            <a:ext cx="6163589" cy="2223726"/>
+          </a:xfrm>
+          <a:prstGeom prst="roundRect">
+            <a:avLst/>
+          </a:prstGeom>
+          <a:solidFill>
+            <a:srgbClr val="1E1E1E"/>
+          </a:solidFill>
+          <a:ln>
+            <a:solidFill>
+              <a:srgbClr val="505050"/>
+            </a:solidFill>
+          </a:ln>
+          <a:scene3d>
+            <a:camera prst="orthographicFront"/>
+            <a:lightRig rig="threePt" dir="t"/>
+          </a:scene3d>
+          <a:sp3d>
+            <a:bevelT w="139700" prst="cross"/>
+          </a:sp3d>
+        </p:spPr>
+        <p:style>
+          <a:lnRef idx="2">
+            <a:schemeClr val="accent1">
+              <a:shade val="15000"/>
+            </a:schemeClr>
+          </a:lnRef>
+          <a:fillRef idx="1">
+            <a:schemeClr val="accent1"/>
+          </a:fillRef>
+          <a:effectRef idx="0">
+            <a:schemeClr val="accent1"/>
+          </a:effectRef>
+          <a:fontRef idx="minor">
+            <a:schemeClr val="lt1"/>
+          </a:fontRef>
+        </p:style>
+        <p:txBody>
+          <a:bodyPr rtlCol="0" anchor="ctr"/>
+          <a:lstStyle/>
+          <a:p>
+            <a:pPr algn="ctr"/>
+            <a:r>
+              <a:rPr lang="en-GB" sz="13000" dirty="0">
+                <a:solidFill>
+                  <a:schemeClr val="bg1"/>
+                </a:solidFill>
+                <a:latin typeface="Noto Serif" panose="02020502060505020204" pitchFamily="18" charset="0"/>
+                <a:ea typeface="Noto Serif" panose="02020502060505020204" pitchFamily="18" charset="0"/>
+                <a:cs typeface="Noto Serif" panose="02020502060505020204" pitchFamily="18" charset="0"/>
+              </a:rPr>
+              <a:t>Pycraft</a:t>
+            </a:r>
+          </a:p>
+        </p:txBody>
+      </p:sp>
     </p:spTree>
     <p:extLst>
       <p:ext uri="{BB962C8B-B14F-4D97-AF65-F5344CB8AC3E}">
-        <p14:creationId xmlns:p14="http://schemas.microsoft.com/office/powerpoint/2010/main" val="3871932749"/>
+        <p14:creationId xmlns:p14="http://schemas.microsoft.com/office/powerpoint/2010/main" val="3673453931"/>
       </p:ext>
     </p:extLst>
   </p:cSld>

</xml_diff>

<commit_message>
Update Background ideas for Pycraft Reimagined.pptx
</commit_message>
<xml_diff>
--- a/Pycraft data files/current/Background ideas for Pycraft Reimagined.pptx
+++ b/Pycraft data files/current/Background ideas for Pycraft Reimagined.pptx
@@ -9,24 +9,25 @@
     <p:sldId id="259" r:id="rId3"/>
     <p:sldId id="257" r:id="rId4"/>
     <p:sldId id="258" r:id="rId5"/>
-    <p:sldId id="260" r:id="rId6"/>
-    <p:sldId id="274" r:id="rId7"/>
-    <p:sldId id="261" r:id="rId8"/>
-    <p:sldId id="262" r:id="rId9"/>
-    <p:sldId id="263" r:id="rId10"/>
-    <p:sldId id="264" r:id="rId11"/>
-    <p:sldId id="265" r:id="rId12"/>
-    <p:sldId id="266" r:id="rId13"/>
-    <p:sldId id="276" r:id="rId14"/>
-    <p:sldId id="267" r:id="rId15"/>
-    <p:sldId id="268" r:id="rId16"/>
-    <p:sldId id="277" r:id="rId17"/>
-    <p:sldId id="269" r:id="rId18"/>
-    <p:sldId id="270" r:id="rId19"/>
-    <p:sldId id="271" r:id="rId20"/>
-    <p:sldId id="272" r:id="rId21"/>
-    <p:sldId id="275" r:id="rId22"/>
-    <p:sldId id="273" r:id="rId23"/>
+    <p:sldId id="278" r:id="rId6"/>
+    <p:sldId id="260" r:id="rId7"/>
+    <p:sldId id="274" r:id="rId8"/>
+    <p:sldId id="261" r:id="rId9"/>
+    <p:sldId id="262" r:id="rId10"/>
+    <p:sldId id="263" r:id="rId11"/>
+    <p:sldId id="264" r:id="rId12"/>
+    <p:sldId id="265" r:id="rId13"/>
+    <p:sldId id="266" r:id="rId14"/>
+    <p:sldId id="276" r:id="rId15"/>
+    <p:sldId id="267" r:id="rId16"/>
+    <p:sldId id="268" r:id="rId17"/>
+    <p:sldId id="277" r:id="rId18"/>
+    <p:sldId id="269" r:id="rId19"/>
+    <p:sldId id="270" r:id="rId20"/>
+    <p:sldId id="271" r:id="rId21"/>
+    <p:sldId id="272" r:id="rId22"/>
+    <p:sldId id="275" r:id="rId23"/>
+    <p:sldId id="273" r:id="rId24"/>
   </p:sldIdLst>
   <p:sldSz cx="12192000" cy="6858000"/>
   <p:notesSz cx="6858000" cy="9144000"/>
@@ -282,7 +283,7 @@
           <a:p>
             <a:fld id="{2268D07C-359D-43C3-800B-3286632F6833}" type="datetimeFigureOut">
               <a:rPr lang="en-GB" smtClean="0"/>
-              <a:t>17/11/2023</a:t>
+              <a:t>08/12/2023</a:t>
             </a:fld>
             <a:endParaRPr lang="en-GB"/>
           </a:p>
@@ -482,7 +483,7 @@
           <a:p>
             <a:fld id="{2268D07C-359D-43C3-800B-3286632F6833}" type="datetimeFigureOut">
               <a:rPr lang="en-GB" smtClean="0"/>
-              <a:t>17/11/2023</a:t>
+              <a:t>08/12/2023</a:t>
             </a:fld>
             <a:endParaRPr lang="en-GB"/>
           </a:p>
@@ -692,7 +693,7 @@
           <a:p>
             <a:fld id="{2268D07C-359D-43C3-800B-3286632F6833}" type="datetimeFigureOut">
               <a:rPr lang="en-GB" smtClean="0"/>
-              <a:t>17/11/2023</a:t>
+              <a:t>08/12/2023</a:t>
             </a:fld>
             <a:endParaRPr lang="en-GB"/>
           </a:p>
@@ -892,7 +893,7 @@
           <a:p>
             <a:fld id="{2268D07C-359D-43C3-800B-3286632F6833}" type="datetimeFigureOut">
               <a:rPr lang="en-GB" smtClean="0"/>
-              <a:t>17/11/2023</a:t>
+              <a:t>08/12/2023</a:t>
             </a:fld>
             <a:endParaRPr lang="en-GB"/>
           </a:p>
@@ -1168,7 +1169,7 @@
           <a:p>
             <a:fld id="{2268D07C-359D-43C3-800B-3286632F6833}" type="datetimeFigureOut">
               <a:rPr lang="en-GB" smtClean="0"/>
-              <a:t>17/11/2023</a:t>
+              <a:t>08/12/2023</a:t>
             </a:fld>
             <a:endParaRPr lang="en-GB"/>
           </a:p>
@@ -1436,7 +1437,7 @@
           <a:p>
             <a:fld id="{2268D07C-359D-43C3-800B-3286632F6833}" type="datetimeFigureOut">
               <a:rPr lang="en-GB" smtClean="0"/>
-              <a:t>17/11/2023</a:t>
+              <a:t>08/12/2023</a:t>
             </a:fld>
             <a:endParaRPr lang="en-GB"/>
           </a:p>
@@ -1851,7 +1852,7 @@
           <a:p>
             <a:fld id="{2268D07C-359D-43C3-800B-3286632F6833}" type="datetimeFigureOut">
               <a:rPr lang="en-GB" smtClean="0"/>
-              <a:t>17/11/2023</a:t>
+              <a:t>08/12/2023</a:t>
             </a:fld>
             <a:endParaRPr lang="en-GB"/>
           </a:p>
@@ -1993,7 +1994,7 @@
           <a:p>
             <a:fld id="{2268D07C-359D-43C3-800B-3286632F6833}" type="datetimeFigureOut">
               <a:rPr lang="en-GB" smtClean="0"/>
-              <a:t>17/11/2023</a:t>
+              <a:t>08/12/2023</a:t>
             </a:fld>
             <a:endParaRPr lang="en-GB"/>
           </a:p>
@@ -2106,7 +2107,7 @@
           <a:p>
             <a:fld id="{2268D07C-359D-43C3-800B-3286632F6833}" type="datetimeFigureOut">
               <a:rPr lang="en-GB" smtClean="0"/>
-              <a:t>17/11/2023</a:t>
+              <a:t>08/12/2023</a:t>
             </a:fld>
             <a:endParaRPr lang="en-GB"/>
           </a:p>
@@ -2419,7 +2420,7 @@
           <a:p>
             <a:fld id="{2268D07C-359D-43C3-800B-3286632F6833}" type="datetimeFigureOut">
               <a:rPr lang="en-GB" smtClean="0"/>
-              <a:t>17/11/2023</a:t>
+              <a:t>08/12/2023</a:t>
             </a:fld>
             <a:endParaRPr lang="en-GB"/>
           </a:p>
@@ -2708,7 +2709,7 @@
           <a:p>
             <a:fld id="{2268D07C-359D-43C3-800B-3286632F6833}" type="datetimeFigureOut">
               <a:rPr lang="en-GB" smtClean="0"/>
-              <a:t>17/11/2023</a:t>
+              <a:t>08/12/2023</a:t>
             </a:fld>
             <a:endParaRPr lang="en-GB"/>
           </a:p>
@@ -2951,7 +2952,7 @@
           <a:p>
             <a:fld id="{2268D07C-359D-43C3-800B-3286632F6833}" type="datetimeFigureOut">
               <a:rPr lang="en-GB" smtClean="0"/>
-              <a:t>17/11/2023</a:t>
+              <a:t>08/12/2023</a:t>
             </a:fld>
             <a:endParaRPr lang="en-GB"/>
           </a:p>
@@ -3937,7 +3938,7 @@
           <p:cNvPr id="3" name="Picture 2">
             <a:extLst>
               <a:ext uri="{FF2B5EF4-FFF2-40B4-BE49-F238E27FC236}">
-                <a16:creationId xmlns:a16="http://schemas.microsoft.com/office/drawing/2014/main" id="{56D9FEBE-F670-3EF0-ADE6-696C2A27BD4E}"/>
+                <a16:creationId xmlns:a16="http://schemas.microsoft.com/office/drawing/2014/main" id="{48126AE8-085C-558D-694D-DFB2CC1BCA22}"/>
               </a:ext>
             </a:extLst>
           </p:cNvPr>
@@ -3960,18 +3961,89 @@
         </p:blipFill>
         <p:spPr>
           <a:xfrm>
-            <a:off x="0" y="1007559"/>
-            <a:ext cx="12192000" cy="4842881"/>
+            <a:off x="601205" y="911246"/>
+            <a:ext cx="6163590" cy="2444708"/>
           </a:xfrm>
           <a:prstGeom prst="rect">
             <a:avLst/>
           </a:prstGeom>
         </p:spPr>
       </p:pic>
+      <p:sp>
+        <p:nvSpPr>
+          <p:cNvPr id="2" name="Rectangle: Rounded Corners 1">
+            <a:extLst>
+              <a:ext uri="{FF2B5EF4-FFF2-40B4-BE49-F238E27FC236}">
+                <a16:creationId xmlns:a16="http://schemas.microsoft.com/office/drawing/2014/main" id="{9540CC72-A755-FA60-CA60-4B6B14D5396A}"/>
+              </a:ext>
+            </a:extLst>
+          </p:cNvPr>
+          <p:cNvSpPr/>
+          <p:nvPr/>
+        </p:nvSpPr>
+        <p:spPr>
+          <a:xfrm>
+            <a:off x="541867" y="3590713"/>
+            <a:ext cx="6163589" cy="2223726"/>
+          </a:xfrm>
+          <a:prstGeom prst="roundRect">
+            <a:avLst/>
+          </a:prstGeom>
+          <a:solidFill>
+            <a:srgbClr val="1E1E1E"/>
+          </a:solidFill>
+          <a:ln>
+            <a:solidFill>
+              <a:srgbClr val="505050"/>
+            </a:solidFill>
+          </a:ln>
+          <a:scene3d>
+            <a:camera prst="orthographicFront"/>
+            <a:lightRig rig="threePt" dir="t"/>
+          </a:scene3d>
+          <a:sp3d>
+            <a:bevelT w="139700" prst="cross"/>
+          </a:sp3d>
+        </p:spPr>
+        <p:style>
+          <a:lnRef idx="2">
+            <a:schemeClr val="accent1">
+              <a:shade val="15000"/>
+            </a:schemeClr>
+          </a:lnRef>
+          <a:fillRef idx="1">
+            <a:schemeClr val="accent1"/>
+          </a:fillRef>
+          <a:effectRef idx="0">
+            <a:schemeClr val="accent1"/>
+          </a:effectRef>
+          <a:fontRef idx="minor">
+            <a:schemeClr val="lt1"/>
+          </a:fontRef>
+        </p:style>
+        <p:txBody>
+          <a:bodyPr rtlCol="0" anchor="ctr"/>
+          <a:lstStyle/>
+          <a:p>
+            <a:pPr algn="ctr"/>
+            <a:r>
+              <a:rPr lang="en-GB" sz="13000" dirty="0">
+                <a:solidFill>
+                  <a:schemeClr val="bg1"/>
+                </a:solidFill>
+                <a:latin typeface="Noto Serif" panose="02020502060505020204" pitchFamily="18" charset="0"/>
+                <a:ea typeface="Noto Serif" panose="02020502060505020204" pitchFamily="18" charset="0"/>
+                <a:cs typeface="Noto Serif" panose="02020502060505020204" pitchFamily="18" charset="0"/>
+              </a:rPr>
+              <a:t>Pycraft</a:t>
+            </a:r>
+          </a:p>
+        </p:txBody>
+      </p:sp>
     </p:spTree>
     <p:extLst>
       <p:ext uri="{BB962C8B-B14F-4D97-AF65-F5344CB8AC3E}">
-        <p14:creationId xmlns:p14="http://schemas.microsoft.com/office/powerpoint/2010/main" val="94890027"/>
+        <p14:creationId xmlns:p14="http://schemas.microsoft.com/office/powerpoint/2010/main" val="3673453931"/>
       </p:ext>
     </p:extLst>
   </p:cSld>
@@ -4003,7 +4075,7 @@
           <p:cNvPr id="3" name="Picture 2">
             <a:extLst>
               <a:ext uri="{FF2B5EF4-FFF2-40B4-BE49-F238E27FC236}">
-                <a16:creationId xmlns:a16="http://schemas.microsoft.com/office/drawing/2014/main" id="{4BF04D9A-2C30-3348-BCE4-2DF09C06174F}"/>
+                <a16:creationId xmlns:a16="http://schemas.microsoft.com/office/drawing/2014/main" id="{56D9FEBE-F670-3EF0-ADE6-696C2A27BD4E}"/>
               </a:ext>
             </a:extLst>
           </p:cNvPr>
@@ -4026,8 +4098,8 @@
         </p:blipFill>
         <p:spPr>
           <a:xfrm>
-            <a:off x="732998" y="1249287"/>
-            <a:ext cx="4968671" cy="1243692"/>
+            <a:off x="0" y="1007559"/>
+            <a:ext cx="12192000" cy="4842881"/>
           </a:xfrm>
           <a:prstGeom prst="rect">
             <a:avLst/>
@@ -4037,7 +4109,7 @@
     </p:spTree>
     <p:extLst>
       <p:ext uri="{BB962C8B-B14F-4D97-AF65-F5344CB8AC3E}">
-        <p14:creationId xmlns:p14="http://schemas.microsoft.com/office/powerpoint/2010/main" val="4019192603"/>
+        <p14:creationId xmlns:p14="http://schemas.microsoft.com/office/powerpoint/2010/main" val="94890027"/>
       </p:ext>
     </p:extLst>
   </p:cSld>
@@ -4069,7 +4141,7 @@
           <p:cNvPr id="3" name="Picture 2">
             <a:extLst>
               <a:ext uri="{FF2B5EF4-FFF2-40B4-BE49-F238E27FC236}">
-                <a16:creationId xmlns:a16="http://schemas.microsoft.com/office/drawing/2014/main" id="{0B0756B9-0002-7B9D-1429-2C22BBBB9EBE}"/>
+                <a16:creationId xmlns:a16="http://schemas.microsoft.com/office/drawing/2014/main" id="{4BF04D9A-2C30-3348-BCE4-2DF09C06174F}"/>
               </a:ext>
             </a:extLst>
           </p:cNvPr>
@@ -4092,140 +4164,18 @@
         </p:blipFill>
         <p:spPr>
           <a:xfrm>
-            <a:off x="0" y="998724"/>
-            <a:ext cx="5204228" cy="4860552"/>
+            <a:off x="732998" y="1249287"/>
+            <a:ext cx="4968671" cy="1243692"/>
           </a:xfrm>
           <a:prstGeom prst="rect">
             <a:avLst/>
           </a:prstGeom>
         </p:spPr>
       </p:pic>
-      <p:sp>
-        <p:nvSpPr>
-          <p:cNvPr id="2" name="Rectangle 1">
-            <a:extLst>
-              <a:ext uri="{FF2B5EF4-FFF2-40B4-BE49-F238E27FC236}">
-                <a16:creationId xmlns:a16="http://schemas.microsoft.com/office/drawing/2014/main" id="{BFA30666-8E48-B784-E63F-A686C205ADD5}"/>
-              </a:ext>
-            </a:extLst>
-          </p:cNvPr>
-          <p:cNvSpPr/>
-          <p:nvPr/>
-        </p:nvSpPr>
-        <p:spPr>
-          <a:xfrm>
-            <a:off x="6096000" y="998724"/>
-            <a:ext cx="5204228" cy="4860551"/>
-          </a:xfrm>
-          <a:prstGeom prst="rect">
-            <a:avLst/>
-          </a:prstGeom>
-          <a:solidFill>
-            <a:srgbClr val="242424"/>
-          </a:solidFill>
-          <a:ln>
-            <a:solidFill>
-              <a:srgbClr val="1E1E1E"/>
-            </a:solidFill>
-          </a:ln>
-        </p:spPr>
-        <p:style>
-          <a:lnRef idx="2">
-            <a:schemeClr val="accent1">
-              <a:shade val="15000"/>
-            </a:schemeClr>
-          </a:lnRef>
-          <a:fillRef idx="1">
-            <a:schemeClr val="accent1"/>
-          </a:fillRef>
-          <a:effectRef idx="0">
-            <a:schemeClr val="accent1"/>
-          </a:effectRef>
-          <a:fontRef idx="minor">
-            <a:schemeClr val="lt1"/>
-          </a:fontRef>
-        </p:style>
-        <p:txBody>
-          <a:bodyPr rtlCol="0" anchor="ctr"/>
-          <a:lstStyle/>
-          <a:p>
-            <a:pPr algn="ctr"/>
-            <a:r>
-              <a:rPr lang="en-GB" sz="41300" b="1" dirty="0">
-                <a:solidFill>
-                  <a:srgbClr val="1E1E1E"/>
-                </a:solidFill>
-                <a:latin typeface="Noto Serif" panose="02020502060505020204" pitchFamily="18" charset="0"/>
-                <a:ea typeface="Noto Serif" panose="02020502060505020204" pitchFamily="18" charset="0"/>
-                <a:cs typeface="Noto Serif" panose="02020502060505020204" pitchFamily="18" charset="0"/>
-              </a:rPr>
-              <a:t>#</a:t>
-            </a:r>
-            <a:endParaRPr lang="en-GB" b="1" dirty="0">
-              <a:solidFill>
-                <a:srgbClr val="1E1E1E"/>
-              </a:solidFill>
-              <a:latin typeface="Noto Serif" panose="02020502060505020204" pitchFamily="18" charset="0"/>
-              <a:ea typeface="Noto Serif" panose="02020502060505020204" pitchFamily="18" charset="0"/>
-              <a:cs typeface="Noto Serif" panose="02020502060505020204" pitchFamily="18" charset="0"/>
-            </a:endParaRPr>
-          </a:p>
-        </p:txBody>
-      </p:sp>
-      <p:sp>
-        <p:nvSpPr>
-          <p:cNvPr id="4" name="TextBox 3">
-            <a:extLst>
-              <a:ext uri="{FF2B5EF4-FFF2-40B4-BE49-F238E27FC236}">
-                <a16:creationId xmlns:a16="http://schemas.microsoft.com/office/drawing/2014/main" id="{3E2C672C-F803-E516-A0F7-1BCF8B0F6AD2}"/>
-              </a:ext>
-            </a:extLst>
-          </p:cNvPr>
-          <p:cNvSpPr txBox="1"/>
-          <p:nvPr/>
-        </p:nvSpPr>
-        <p:spPr>
-          <a:xfrm>
-            <a:off x="7122201" y="2934211"/>
-            <a:ext cx="3151825" cy="769441"/>
-          </a:xfrm>
-          <a:prstGeom prst="rect">
-            <a:avLst/>
-          </a:prstGeom>
-          <a:noFill/>
-        </p:spPr>
-        <p:txBody>
-          <a:bodyPr wrap="none" rtlCol="0">
-            <a:spAutoFit/>
-          </a:bodyPr>
-          <a:lstStyle/>
-          <a:p>
-            <a:r>
-              <a:rPr lang="en-GB" sz="4400" dirty="0">
-                <a:solidFill>
-                  <a:schemeClr val="bg1"/>
-                </a:solidFill>
-                <a:latin typeface="Noto Serif" panose="02020502060505020204" pitchFamily="18" charset="0"/>
-                <a:ea typeface="Noto Serif" panose="02020502060505020204" pitchFamily="18" charset="0"/>
-                <a:cs typeface="Noto Serif" panose="02020502060505020204" pitchFamily="18" charset="0"/>
-              </a:rPr>
-              <a:t>PycraftDev</a:t>
-            </a:r>
-            <a:endParaRPr lang="en-GB" sz="2800" dirty="0">
-              <a:solidFill>
-                <a:schemeClr val="bg1"/>
-              </a:solidFill>
-              <a:latin typeface="Noto Serif" panose="02020502060505020204" pitchFamily="18" charset="0"/>
-              <a:ea typeface="Noto Serif" panose="02020502060505020204" pitchFamily="18" charset="0"/>
-              <a:cs typeface="Noto Serif" panose="02020502060505020204" pitchFamily="18" charset="0"/>
-            </a:endParaRPr>
-          </a:p>
-        </p:txBody>
-      </p:sp>
     </p:spTree>
     <p:extLst>
       <p:ext uri="{BB962C8B-B14F-4D97-AF65-F5344CB8AC3E}">
-        <p14:creationId xmlns:p14="http://schemas.microsoft.com/office/powerpoint/2010/main" val="1528842542"/>
+        <p14:creationId xmlns:p14="http://schemas.microsoft.com/office/powerpoint/2010/main" val="4019192603"/>
       </p:ext>
     </p:extLst>
   </p:cSld>
@@ -4290,7 +4240,7 @@
       </p:pic>
       <p:sp>
         <p:nvSpPr>
-          <p:cNvPr id="2" name="Rectangle: Rounded Corners 1">
+          <p:cNvPr id="2" name="Rectangle 1">
             <a:extLst>
               <a:ext uri="{FF2B5EF4-FFF2-40B4-BE49-F238E27FC236}">
                 <a16:creationId xmlns:a16="http://schemas.microsoft.com/office/drawing/2014/main" id="{BFA30666-8E48-B784-E63F-A686C205ADD5}"/>
@@ -4305,7 +4255,7 @@
             <a:off x="6096000" y="998724"/>
             <a:ext cx="5204228" cy="4860551"/>
           </a:xfrm>
-          <a:prstGeom prst="roundRect">
+          <a:prstGeom prst="rect">
             <a:avLst/>
           </a:prstGeom>
           <a:solidFill>
@@ -4413,7 +4363,7 @@
     </p:spTree>
     <p:extLst>
       <p:ext uri="{BB962C8B-B14F-4D97-AF65-F5344CB8AC3E}">
-        <p14:creationId xmlns:p14="http://schemas.microsoft.com/office/powerpoint/2010/main" val="2449411376"/>
+        <p14:creationId xmlns:p14="http://schemas.microsoft.com/office/powerpoint/2010/main" val="1528842542"/>
       </p:ext>
     </p:extLst>
   </p:cSld>
@@ -4445,7 +4395,7 @@
           <p:cNvPr id="3" name="Picture 2">
             <a:extLst>
               <a:ext uri="{FF2B5EF4-FFF2-40B4-BE49-F238E27FC236}">
-                <a16:creationId xmlns:a16="http://schemas.microsoft.com/office/drawing/2014/main" id="{655997BA-ADE0-A5BE-D802-F7F5428DBFC0}"/>
+                <a16:creationId xmlns:a16="http://schemas.microsoft.com/office/drawing/2014/main" id="{0B0756B9-0002-7B9D-1429-2C22BBBB9EBE}"/>
               </a:ext>
             </a:extLst>
           </p:cNvPr>
@@ -4468,18 +4418,140 @@
         </p:blipFill>
         <p:spPr>
           <a:xfrm>
-            <a:off x="3665724" y="1001792"/>
-            <a:ext cx="4860552" cy="4854415"/>
+            <a:off x="0" y="998724"/>
+            <a:ext cx="5204228" cy="4860552"/>
           </a:xfrm>
           <a:prstGeom prst="rect">
             <a:avLst/>
           </a:prstGeom>
         </p:spPr>
       </p:pic>
+      <p:sp>
+        <p:nvSpPr>
+          <p:cNvPr id="2" name="Rectangle: Rounded Corners 1">
+            <a:extLst>
+              <a:ext uri="{FF2B5EF4-FFF2-40B4-BE49-F238E27FC236}">
+                <a16:creationId xmlns:a16="http://schemas.microsoft.com/office/drawing/2014/main" id="{BFA30666-8E48-B784-E63F-A686C205ADD5}"/>
+              </a:ext>
+            </a:extLst>
+          </p:cNvPr>
+          <p:cNvSpPr/>
+          <p:nvPr/>
+        </p:nvSpPr>
+        <p:spPr>
+          <a:xfrm>
+            <a:off x="6096000" y="998724"/>
+            <a:ext cx="5204228" cy="4860551"/>
+          </a:xfrm>
+          <a:prstGeom prst="roundRect">
+            <a:avLst/>
+          </a:prstGeom>
+          <a:solidFill>
+            <a:srgbClr val="242424"/>
+          </a:solidFill>
+          <a:ln>
+            <a:solidFill>
+              <a:srgbClr val="1E1E1E"/>
+            </a:solidFill>
+          </a:ln>
+        </p:spPr>
+        <p:style>
+          <a:lnRef idx="2">
+            <a:schemeClr val="accent1">
+              <a:shade val="15000"/>
+            </a:schemeClr>
+          </a:lnRef>
+          <a:fillRef idx="1">
+            <a:schemeClr val="accent1"/>
+          </a:fillRef>
+          <a:effectRef idx="0">
+            <a:schemeClr val="accent1"/>
+          </a:effectRef>
+          <a:fontRef idx="minor">
+            <a:schemeClr val="lt1"/>
+          </a:fontRef>
+        </p:style>
+        <p:txBody>
+          <a:bodyPr rtlCol="0" anchor="ctr"/>
+          <a:lstStyle/>
+          <a:p>
+            <a:pPr algn="ctr"/>
+            <a:r>
+              <a:rPr lang="en-GB" sz="41300" b="1" dirty="0">
+                <a:solidFill>
+                  <a:srgbClr val="1E1E1E"/>
+                </a:solidFill>
+                <a:latin typeface="Noto Serif" panose="02020502060505020204" pitchFamily="18" charset="0"/>
+                <a:ea typeface="Noto Serif" panose="02020502060505020204" pitchFamily="18" charset="0"/>
+                <a:cs typeface="Noto Serif" panose="02020502060505020204" pitchFamily="18" charset="0"/>
+              </a:rPr>
+              <a:t>#</a:t>
+            </a:r>
+            <a:endParaRPr lang="en-GB" b="1" dirty="0">
+              <a:solidFill>
+                <a:srgbClr val="1E1E1E"/>
+              </a:solidFill>
+              <a:latin typeface="Noto Serif" panose="02020502060505020204" pitchFamily="18" charset="0"/>
+              <a:ea typeface="Noto Serif" panose="02020502060505020204" pitchFamily="18" charset="0"/>
+              <a:cs typeface="Noto Serif" panose="02020502060505020204" pitchFamily="18" charset="0"/>
+            </a:endParaRPr>
+          </a:p>
+        </p:txBody>
+      </p:sp>
+      <p:sp>
+        <p:nvSpPr>
+          <p:cNvPr id="4" name="TextBox 3">
+            <a:extLst>
+              <a:ext uri="{FF2B5EF4-FFF2-40B4-BE49-F238E27FC236}">
+                <a16:creationId xmlns:a16="http://schemas.microsoft.com/office/drawing/2014/main" id="{3E2C672C-F803-E516-A0F7-1BCF8B0F6AD2}"/>
+              </a:ext>
+            </a:extLst>
+          </p:cNvPr>
+          <p:cNvSpPr txBox="1"/>
+          <p:nvPr/>
+        </p:nvSpPr>
+        <p:spPr>
+          <a:xfrm>
+            <a:off x="7122201" y="2934211"/>
+            <a:ext cx="3151825" cy="769441"/>
+          </a:xfrm>
+          <a:prstGeom prst="rect">
+            <a:avLst/>
+          </a:prstGeom>
+          <a:noFill/>
+        </p:spPr>
+        <p:txBody>
+          <a:bodyPr wrap="none" rtlCol="0">
+            <a:spAutoFit/>
+          </a:bodyPr>
+          <a:lstStyle/>
+          <a:p>
+            <a:r>
+              <a:rPr lang="en-GB" sz="4400" dirty="0">
+                <a:solidFill>
+                  <a:schemeClr val="bg1"/>
+                </a:solidFill>
+                <a:latin typeface="Noto Serif" panose="02020502060505020204" pitchFamily="18" charset="0"/>
+                <a:ea typeface="Noto Serif" panose="02020502060505020204" pitchFamily="18" charset="0"/>
+                <a:cs typeface="Noto Serif" panose="02020502060505020204" pitchFamily="18" charset="0"/>
+              </a:rPr>
+              <a:t>PycraftDev</a:t>
+            </a:r>
+            <a:endParaRPr lang="en-GB" sz="2800" dirty="0">
+              <a:solidFill>
+                <a:schemeClr val="bg1"/>
+              </a:solidFill>
+              <a:latin typeface="Noto Serif" panose="02020502060505020204" pitchFamily="18" charset="0"/>
+              <a:ea typeface="Noto Serif" panose="02020502060505020204" pitchFamily="18" charset="0"/>
+              <a:cs typeface="Noto Serif" panose="02020502060505020204" pitchFamily="18" charset="0"/>
+            </a:endParaRPr>
+          </a:p>
+        </p:txBody>
+      </p:sp>
     </p:spTree>
     <p:extLst>
       <p:ext uri="{BB962C8B-B14F-4D97-AF65-F5344CB8AC3E}">
-        <p14:creationId xmlns:p14="http://schemas.microsoft.com/office/powerpoint/2010/main" val="1510975494"/>
+        <p14:creationId xmlns:p14="http://schemas.microsoft.com/office/powerpoint/2010/main" val="2449411376"/>
       </p:ext>
     </p:extLst>
   </p:cSld>
@@ -4511,6 +4583,72 @@
           <p:cNvPr id="3" name="Picture 2">
             <a:extLst>
               <a:ext uri="{FF2B5EF4-FFF2-40B4-BE49-F238E27FC236}">
+                <a16:creationId xmlns:a16="http://schemas.microsoft.com/office/drawing/2014/main" id="{655997BA-ADE0-A5BE-D802-F7F5428DBFC0}"/>
+              </a:ext>
+            </a:extLst>
+          </p:cNvPr>
+          <p:cNvPicPr>
+            <a:picLocks noChangeAspect="1"/>
+          </p:cNvPicPr>
+          <p:nvPr/>
+        </p:nvPicPr>
+        <p:blipFill>
+          <a:blip r:embed="rId2">
+            <a:extLst>
+              <a:ext uri="{28A0092B-C50C-407E-A947-70E740481C1C}">
+                <a14:useLocalDpi xmlns:a14="http://schemas.microsoft.com/office/drawing/2010/main" val="0"/>
+              </a:ext>
+            </a:extLst>
+          </a:blip>
+          <a:stretch>
+            <a:fillRect/>
+          </a:stretch>
+        </p:blipFill>
+        <p:spPr>
+          <a:xfrm>
+            <a:off x="3665724" y="1001792"/>
+            <a:ext cx="4860552" cy="4854415"/>
+          </a:xfrm>
+          <a:prstGeom prst="rect">
+            <a:avLst/>
+          </a:prstGeom>
+        </p:spPr>
+      </p:pic>
+    </p:spTree>
+    <p:extLst>
+      <p:ext uri="{BB962C8B-B14F-4D97-AF65-F5344CB8AC3E}">
+        <p14:creationId xmlns:p14="http://schemas.microsoft.com/office/powerpoint/2010/main" val="1510975494"/>
+      </p:ext>
+    </p:extLst>
+  </p:cSld>
+  <p:clrMapOvr>
+    <a:masterClrMapping/>
+  </p:clrMapOvr>
+</p:sld>
+</file>
+
+<file path=ppt/slides/slide16.xml><?xml version="1.0" encoding="utf-8"?>
+<p:sld xmlns:a="http://schemas.openxmlformats.org/drawingml/2006/main" xmlns:r="http://schemas.openxmlformats.org/officeDocument/2006/relationships" xmlns:p="http://schemas.openxmlformats.org/presentationml/2006/main">
+  <p:cSld>
+    <p:spTree>
+      <p:nvGrpSpPr>
+        <p:cNvPr id="1" name=""/>
+        <p:cNvGrpSpPr/>
+        <p:nvPr/>
+      </p:nvGrpSpPr>
+      <p:grpSpPr>
+        <a:xfrm>
+          <a:off x="0" y="0"/>
+          <a:ext cx="0" cy="0"/>
+          <a:chOff x="0" y="0"/>
+          <a:chExt cx="0" cy="0"/>
+        </a:xfrm>
+      </p:grpSpPr>
+      <p:pic>
+        <p:nvPicPr>
+          <p:cNvPr id="3" name="Picture 2">
+            <a:extLst>
+              <a:ext uri="{FF2B5EF4-FFF2-40B4-BE49-F238E27FC236}">
                 <a16:creationId xmlns:a16="http://schemas.microsoft.com/office/drawing/2014/main" id="{6D1AA91A-1E23-2CC1-F59B-CCFB01B9B207}"/>
               </a:ext>
             </a:extLst>
@@ -4555,7 +4693,7 @@
 </p:sld>
 </file>
 
-<file path=ppt/slides/slide16.xml><?xml version="1.0" encoding="utf-8"?>
+<file path=ppt/slides/slide17.xml><?xml version="1.0" encoding="utf-8"?>
 <p:sld xmlns:a="http://schemas.openxmlformats.org/drawingml/2006/main" xmlns:r="http://schemas.openxmlformats.org/officeDocument/2006/relationships" xmlns:p="http://schemas.openxmlformats.org/presentationml/2006/main">
   <p:cSld>
     <p:bg>
@@ -4780,7 +4918,7 @@
 </p:sld>
 </file>
 
-<file path=ppt/slides/slide17.xml><?xml version="1.0" encoding="utf-8"?>
+<file path=ppt/slides/slide18.xml><?xml version="1.0" encoding="utf-8"?>
 <p:sld xmlns:a="http://schemas.openxmlformats.org/drawingml/2006/main" xmlns:r="http://schemas.openxmlformats.org/officeDocument/2006/relationships" xmlns:p="http://schemas.openxmlformats.org/presentationml/2006/main">
   <p:cSld>
     <p:spTree>
@@ -4909,72 +5047,6 @@
     <p:extLst>
       <p:ext uri="{BB962C8B-B14F-4D97-AF65-F5344CB8AC3E}">
         <p14:creationId xmlns:p14="http://schemas.microsoft.com/office/powerpoint/2010/main" val="3100960146"/>
-      </p:ext>
-    </p:extLst>
-  </p:cSld>
-  <p:clrMapOvr>
-    <a:masterClrMapping/>
-  </p:clrMapOvr>
-</p:sld>
-</file>
-
-<file path=ppt/slides/slide18.xml><?xml version="1.0" encoding="utf-8"?>
-<p:sld xmlns:a="http://schemas.openxmlformats.org/drawingml/2006/main" xmlns:r="http://schemas.openxmlformats.org/officeDocument/2006/relationships" xmlns:p="http://schemas.openxmlformats.org/presentationml/2006/main">
-  <p:cSld>
-    <p:spTree>
-      <p:nvGrpSpPr>
-        <p:cNvPr id="1" name=""/>
-        <p:cNvGrpSpPr/>
-        <p:nvPr/>
-      </p:nvGrpSpPr>
-      <p:grpSpPr>
-        <a:xfrm>
-          <a:off x="0" y="0"/>
-          <a:ext cx="0" cy="0"/>
-          <a:chOff x="0" y="0"/>
-          <a:chExt cx="0" cy="0"/>
-        </a:xfrm>
-      </p:grpSpPr>
-      <p:pic>
-        <p:nvPicPr>
-          <p:cNvPr id="3" name="Picture 2">
-            <a:extLst>
-              <a:ext uri="{FF2B5EF4-FFF2-40B4-BE49-F238E27FC236}">
-                <a16:creationId xmlns:a16="http://schemas.microsoft.com/office/drawing/2014/main" id="{72014563-7783-A6DF-65F0-E688F1861D4E}"/>
-              </a:ext>
-            </a:extLst>
-          </p:cNvPr>
-          <p:cNvPicPr>
-            <a:picLocks noChangeAspect="1"/>
-          </p:cNvPicPr>
-          <p:nvPr/>
-        </p:nvPicPr>
-        <p:blipFill>
-          <a:blip r:embed="rId2">
-            <a:extLst>
-              <a:ext uri="{28A0092B-C50C-407E-A947-70E740481C1C}">
-                <a14:useLocalDpi xmlns:a14="http://schemas.microsoft.com/office/drawing/2010/main" val="0"/>
-              </a:ext>
-            </a:extLst>
-          </a:blip>
-          <a:stretch>
-            <a:fillRect/>
-          </a:stretch>
-        </p:blipFill>
-        <p:spPr>
-          <a:xfrm>
-            <a:off x="2667000" y="0"/>
-            <a:ext cx="6858000" cy="6858000"/>
-          </a:xfrm>
-          <a:prstGeom prst="rect">
-            <a:avLst/>
-          </a:prstGeom>
-        </p:spPr>
-      </p:pic>
-    </p:spTree>
-    <p:extLst>
-      <p:ext uri="{BB962C8B-B14F-4D97-AF65-F5344CB8AC3E}">
-        <p14:creationId xmlns:p14="http://schemas.microsoft.com/office/powerpoint/2010/main" val="3630987067"/>
       </p:ext>
     </p:extLst>
   </p:cSld>
@@ -5006,7 +5078,7 @@
           <p:cNvPr id="3" name="Picture 2">
             <a:extLst>
               <a:ext uri="{FF2B5EF4-FFF2-40B4-BE49-F238E27FC236}">
-                <a16:creationId xmlns:a16="http://schemas.microsoft.com/office/drawing/2014/main" id="{9ED7CD52-6389-BC2B-397E-9DD0281CE277}"/>
+                <a16:creationId xmlns:a16="http://schemas.microsoft.com/office/drawing/2014/main" id="{72014563-7783-A6DF-65F0-E688F1861D4E}"/>
               </a:ext>
             </a:extLst>
           </p:cNvPr>
@@ -5029,97 +5101,18 @@
         </p:blipFill>
         <p:spPr>
           <a:xfrm>
-            <a:off x="5005010" y="966411"/>
-            <a:ext cx="3316511" cy="3316511"/>
+            <a:off x="2667000" y="0"/>
+            <a:ext cx="6858000" cy="6858000"/>
           </a:xfrm>
           <a:prstGeom prst="rect">
             <a:avLst/>
           </a:prstGeom>
         </p:spPr>
       </p:pic>
-      <p:sp>
-        <p:nvSpPr>
-          <p:cNvPr id="2" name="Rectangle: Rounded Corners 1">
-            <a:extLst>
-              <a:ext uri="{FF2B5EF4-FFF2-40B4-BE49-F238E27FC236}">
-                <a16:creationId xmlns:a16="http://schemas.microsoft.com/office/drawing/2014/main" id="{F05A9F2A-F1D4-8736-ED05-BAB93E97B452}"/>
-              </a:ext>
-            </a:extLst>
-          </p:cNvPr>
-          <p:cNvSpPr/>
-          <p:nvPr/>
-        </p:nvSpPr>
-        <p:spPr>
-          <a:xfrm>
-            <a:off x="1084944" y="966411"/>
-            <a:ext cx="3316510" cy="3316511"/>
-          </a:xfrm>
-          <a:prstGeom prst="roundRect">
-            <a:avLst/>
-          </a:prstGeom>
-          <a:solidFill>
-            <a:srgbClr val="1E1E1E"/>
-          </a:solidFill>
-          <a:ln>
-            <a:solidFill>
-              <a:srgbClr val="505050"/>
-            </a:solidFill>
-          </a:ln>
-          <a:scene3d>
-            <a:camera prst="orthographicFront"/>
-            <a:lightRig rig="threePt" dir="t"/>
-          </a:scene3d>
-          <a:sp3d>
-            <a:bevelT w="139700" prst="cross"/>
-          </a:sp3d>
-        </p:spPr>
-        <p:style>
-          <a:lnRef idx="2">
-            <a:schemeClr val="accent1">
-              <a:shade val="15000"/>
-            </a:schemeClr>
-          </a:lnRef>
-          <a:fillRef idx="1">
-            <a:schemeClr val="accent1"/>
-          </a:fillRef>
-          <a:effectRef idx="0">
-            <a:schemeClr val="accent1"/>
-          </a:effectRef>
-          <a:fontRef idx="minor">
-            <a:schemeClr val="lt1"/>
-          </a:fontRef>
-        </p:style>
-        <p:txBody>
-          <a:bodyPr rtlCol="0" anchor="ctr"/>
-          <a:lstStyle/>
-          <a:p>
-            <a:pPr algn="ctr"/>
-            <a:r>
-              <a:rPr lang="en-GB" sz="26900" dirty="0">
-                <a:solidFill>
-                  <a:schemeClr val="bg1"/>
-                </a:solidFill>
-                <a:latin typeface="Noto Serif" panose="02020502060505020204" pitchFamily="18" charset="0"/>
-                <a:ea typeface="Noto Serif" panose="02020502060505020204" pitchFamily="18" charset="0"/>
-                <a:cs typeface="Noto Serif" panose="02020502060505020204" pitchFamily="18" charset="0"/>
-              </a:rPr>
-              <a:t>P</a:t>
-            </a:r>
-            <a:endParaRPr lang="en-GB" sz="13000" dirty="0">
-              <a:solidFill>
-                <a:schemeClr val="bg1"/>
-              </a:solidFill>
-              <a:latin typeface="Noto Serif" panose="02020502060505020204" pitchFamily="18" charset="0"/>
-              <a:ea typeface="Noto Serif" panose="02020502060505020204" pitchFamily="18" charset="0"/>
-              <a:cs typeface="Noto Serif" panose="02020502060505020204" pitchFamily="18" charset="0"/>
-            </a:endParaRPr>
-          </a:p>
-        </p:txBody>
-      </p:sp>
     </p:spTree>
     <p:extLst>
       <p:ext uri="{BB962C8B-B14F-4D97-AF65-F5344CB8AC3E}">
-        <p14:creationId xmlns:p14="http://schemas.microsoft.com/office/powerpoint/2010/main" val="2942169427"/>
+        <p14:creationId xmlns:p14="http://schemas.microsoft.com/office/powerpoint/2010/main" val="3630987067"/>
       </p:ext>
     </p:extLst>
   </p:cSld>
@@ -5715,6 +5708,151 @@
           <p:cNvPr id="3" name="Picture 2">
             <a:extLst>
               <a:ext uri="{FF2B5EF4-FFF2-40B4-BE49-F238E27FC236}">
+                <a16:creationId xmlns:a16="http://schemas.microsoft.com/office/drawing/2014/main" id="{9ED7CD52-6389-BC2B-397E-9DD0281CE277}"/>
+              </a:ext>
+            </a:extLst>
+          </p:cNvPr>
+          <p:cNvPicPr>
+            <a:picLocks noChangeAspect="1"/>
+          </p:cNvPicPr>
+          <p:nvPr/>
+        </p:nvPicPr>
+        <p:blipFill>
+          <a:blip r:embed="rId2">
+            <a:extLst>
+              <a:ext uri="{28A0092B-C50C-407E-A947-70E740481C1C}">
+                <a14:useLocalDpi xmlns:a14="http://schemas.microsoft.com/office/drawing/2010/main" val="0"/>
+              </a:ext>
+            </a:extLst>
+          </a:blip>
+          <a:stretch>
+            <a:fillRect/>
+          </a:stretch>
+        </p:blipFill>
+        <p:spPr>
+          <a:xfrm>
+            <a:off x="5005010" y="966411"/>
+            <a:ext cx="3316511" cy="3316511"/>
+          </a:xfrm>
+          <a:prstGeom prst="rect">
+            <a:avLst/>
+          </a:prstGeom>
+        </p:spPr>
+      </p:pic>
+      <p:sp>
+        <p:nvSpPr>
+          <p:cNvPr id="2" name="Rectangle: Rounded Corners 1">
+            <a:extLst>
+              <a:ext uri="{FF2B5EF4-FFF2-40B4-BE49-F238E27FC236}">
+                <a16:creationId xmlns:a16="http://schemas.microsoft.com/office/drawing/2014/main" id="{F05A9F2A-F1D4-8736-ED05-BAB93E97B452}"/>
+              </a:ext>
+            </a:extLst>
+          </p:cNvPr>
+          <p:cNvSpPr/>
+          <p:nvPr/>
+        </p:nvSpPr>
+        <p:spPr>
+          <a:xfrm>
+            <a:off x="1084944" y="966411"/>
+            <a:ext cx="3316510" cy="3316511"/>
+          </a:xfrm>
+          <a:prstGeom prst="roundRect">
+            <a:avLst/>
+          </a:prstGeom>
+          <a:solidFill>
+            <a:srgbClr val="1E1E1E"/>
+          </a:solidFill>
+          <a:ln>
+            <a:solidFill>
+              <a:srgbClr val="505050"/>
+            </a:solidFill>
+          </a:ln>
+          <a:scene3d>
+            <a:camera prst="orthographicFront"/>
+            <a:lightRig rig="threePt" dir="t"/>
+          </a:scene3d>
+          <a:sp3d>
+            <a:bevelT w="139700" prst="cross"/>
+          </a:sp3d>
+        </p:spPr>
+        <p:style>
+          <a:lnRef idx="2">
+            <a:schemeClr val="accent1">
+              <a:shade val="15000"/>
+            </a:schemeClr>
+          </a:lnRef>
+          <a:fillRef idx="1">
+            <a:schemeClr val="accent1"/>
+          </a:fillRef>
+          <a:effectRef idx="0">
+            <a:schemeClr val="accent1"/>
+          </a:effectRef>
+          <a:fontRef idx="minor">
+            <a:schemeClr val="lt1"/>
+          </a:fontRef>
+        </p:style>
+        <p:txBody>
+          <a:bodyPr rtlCol="0" anchor="ctr"/>
+          <a:lstStyle/>
+          <a:p>
+            <a:pPr algn="ctr"/>
+            <a:r>
+              <a:rPr lang="en-GB" sz="26900" dirty="0">
+                <a:solidFill>
+                  <a:schemeClr val="bg1"/>
+                </a:solidFill>
+                <a:latin typeface="Noto Serif" panose="02020502060505020204" pitchFamily="18" charset="0"/>
+                <a:ea typeface="Noto Serif" panose="02020502060505020204" pitchFamily="18" charset="0"/>
+                <a:cs typeface="Noto Serif" panose="02020502060505020204" pitchFamily="18" charset="0"/>
+              </a:rPr>
+              <a:t>P</a:t>
+            </a:r>
+            <a:endParaRPr lang="en-GB" sz="13000" dirty="0">
+              <a:solidFill>
+                <a:schemeClr val="bg1"/>
+              </a:solidFill>
+              <a:latin typeface="Noto Serif" panose="02020502060505020204" pitchFamily="18" charset="0"/>
+              <a:ea typeface="Noto Serif" panose="02020502060505020204" pitchFamily="18" charset="0"/>
+              <a:cs typeface="Noto Serif" panose="02020502060505020204" pitchFamily="18" charset="0"/>
+            </a:endParaRPr>
+          </a:p>
+        </p:txBody>
+      </p:sp>
+    </p:spTree>
+    <p:extLst>
+      <p:ext uri="{BB962C8B-B14F-4D97-AF65-F5344CB8AC3E}">
+        <p14:creationId xmlns:p14="http://schemas.microsoft.com/office/powerpoint/2010/main" val="2942169427"/>
+      </p:ext>
+    </p:extLst>
+  </p:cSld>
+  <p:clrMapOvr>
+    <a:masterClrMapping/>
+  </p:clrMapOvr>
+</p:sld>
+</file>
+
+<file path=ppt/slides/slide21.xml><?xml version="1.0" encoding="utf-8"?>
+<p:sld xmlns:a="http://schemas.openxmlformats.org/drawingml/2006/main" xmlns:r="http://schemas.openxmlformats.org/officeDocument/2006/relationships" xmlns:p="http://schemas.openxmlformats.org/presentationml/2006/main">
+  <p:cSld>
+    <p:spTree>
+      <p:nvGrpSpPr>
+        <p:cNvPr id="1" name=""/>
+        <p:cNvGrpSpPr/>
+        <p:nvPr/>
+      </p:nvGrpSpPr>
+      <p:grpSpPr>
+        <a:xfrm>
+          <a:off x="0" y="0"/>
+          <a:ext cx="0" cy="0"/>
+          <a:chOff x="0" y="0"/>
+          <a:chExt cx="0" cy="0"/>
+        </a:xfrm>
+      </p:grpSpPr>
+      <p:pic>
+        <p:nvPicPr>
+          <p:cNvPr id="3" name="Picture 2">
+            <a:extLst>
+              <a:ext uri="{FF2B5EF4-FFF2-40B4-BE49-F238E27FC236}">
                 <a16:creationId xmlns:a16="http://schemas.microsoft.com/office/drawing/2014/main" id="{AC2F3FF2-E3E9-B0C5-74E3-F6F67C5D193F}"/>
               </a:ext>
             </a:extLst>
@@ -5844,7 +5982,7 @@
 </p:sld>
 </file>
 
-<file path=ppt/slides/slide21.xml><?xml version="1.0" encoding="utf-8"?>
+<file path=ppt/slides/slide22.xml><?xml version="1.0" encoding="utf-8"?>
 <p:sld xmlns:a="http://schemas.openxmlformats.org/drawingml/2006/main" xmlns:r="http://schemas.openxmlformats.org/officeDocument/2006/relationships" xmlns:p="http://schemas.openxmlformats.org/presentationml/2006/main">
   <p:cSld>
     <p:bg>
@@ -5882,7 +6020,7 @@
 </p:sld>
 </file>
 
-<file path=ppt/slides/slide22.xml><?xml version="1.0" encoding="utf-8"?>
+<file path=ppt/slides/slide23.xml><?xml version="1.0" encoding="utf-8"?>
 <p:sld xmlns:a="http://schemas.openxmlformats.org/drawingml/2006/main" xmlns:r="http://schemas.openxmlformats.org/officeDocument/2006/relationships" xmlns:p="http://schemas.openxmlformats.org/presentationml/2006/main">
   <p:cSld>
     <p:spTree>
@@ -7261,6 +7399,3708 @@
           <a:chExt cx="0" cy="0"/>
         </a:xfrm>
       </p:grpSpPr>
+      <p:graphicFrame>
+        <p:nvGraphicFramePr>
+          <p:cNvPr id="4" name="Table 3">
+            <a:extLst>
+              <a:ext uri="{FF2B5EF4-FFF2-40B4-BE49-F238E27FC236}">
+                <a16:creationId xmlns:a16="http://schemas.microsoft.com/office/drawing/2014/main" id="{2A47020C-5A21-0552-54D0-242A22716CB8}"/>
+              </a:ext>
+            </a:extLst>
+          </p:cNvPr>
+          <p:cNvGraphicFramePr>
+            <a:graphicFrameLocks noGrp="1"/>
+          </p:cNvGraphicFramePr>
+          <p:nvPr/>
+        </p:nvGraphicFramePr>
+        <p:xfrm>
+          <a:off x="0" y="0"/>
+          <a:ext cx="12192000" cy="6858000"/>
+        </p:xfrm>
+        <a:graphic>
+          <a:graphicData uri="http://schemas.openxmlformats.org/drawingml/2006/table">
+            <a:tbl>
+              <a:tblPr firstRow="1" bandRow="1">
+                <a:tableStyleId>{5C22544A-7EE6-4342-B048-85BDC9FD1C3A}</a:tableStyleId>
+              </a:tblPr>
+              <a:tblGrid>
+                <a:gridCol w="2032000">
+                  <a:extLst>
+                    <a:ext uri="{9D8B030D-6E8A-4147-A177-3AD203B41FA5}">
+                      <a16:colId xmlns:a16="http://schemas.microsoft.com/office/drawing/2014/main" val="3146145574"/>
+                    </a:ext>
+                  </a:extLst>
+                </a:gridCol>
+                <a:gridCol w="2032000">
+                  <a:extLst>
+                    <a:ext uri="{9D8B030D-6E8A-4147-A177-3AD203B41FA5}">
+                      <a16:colId xmlns:a16="http://schemas.microsoft.com/office/drawing/2014/main" val="3303982561"/>
+                    </a:ext>
+                  </a:extLst>
+                </a:gridCol>
+                <a:gridCol w="2032000">
+                  <a:extLst>
+                    <a:ext uri="{9D8B030D-6E8A-4147-A177-3AD203B41FA5}">
+                      <a16:colId xmlns:a16="http://schemas.microsoft.com/office/drawing/2014/main" val="1210714408"/>
+                    </a:ext>
+                  </a:extLst>
+                </a:gridCol>
+                <a:gridCol w="2032000">
+                  <a:extLst>
+                    <a:ext uri="{9D8B030D-6E8A-4147-A177-3AD203B41FA5}">
+                      <a16:colId xmlns:a16="http://schemas.microsoft.com/office/drawing/2014/main" val="1539742638"/>
+                    </a:ext>
+                  </a:extLst>
+                </a:gridCol>
+                <a:gridCol w="2032000">
+                  <a:extLst>
+                    <a:ext uri="{9D8B030D-6E8A-4147-A177-3AD203B41FA5}">
+                      <a16:colId xmlns:a16="http://schemas.microsoft.com/office/drawing/2014/main" val="2169538559"/>
+                    </a:ext>
+                  </a:extLst>
+                </a:gridCol>
+                <a:gridCol w="2032000">
+                  <a:extLst>
+                    <a:ext uri="{9D8B030D-6E8A-4147-A177-3AD203B41FA5}">
+                      <a16:colId xmlns:a16="http://schemas.microsoft.com/office/drawing/2014/main" val="3848005541"/>
+                    </a:ext>
+                  </a:extLst>
+                </a:gridCol>
+              </a:tblGrid>
+              <a:tr h="857250">
+                <a:tc>
+                  <a:txBody>
+                    <a:bodyPr/>
+                    <a:lstStyle/>
+                    <a:p>
+                      <a:endParaRPr lang="en-GB" dirty="0"/>
+                    </a:p>
+                  </a:txBody>
+                  <a:tcPr>
+                    <a:lnL w="12700" cmpd="sng">
+                      <a:noFill/>
+                    </a:lnL>
+                    <a:lnR w="12700" cap="flat" cmpd="sng" algn="ctr">
+                      <a:solidFill>
+                        <a:schemeClr val="tx1"/>
+                      </a:solidFill>
+                      <a:prstDash val="solid"/>
+                      <a:round/>
+                      <a:headEnd type="none" w="med" len="med"/>
+                      <a:tailEnd type="none" w="med" len="med"/>
+                    </a:lnR>
+                    <a:lnT w="12700" cmpd="sng">
+                      <a:noFill/>
+                    </a:lnT>
+                    <a:lnB w="12700" cap="flat" cmpd="sng" algn="ctr">
+                      <a:noFill/>
+                      <a:prstDash val="solid"/>
+                      <a:round/>
+                      <a:headEnd type="none" w="med" len="med"/>
+                      <a:tailEnd type="none" w="med" len="med"/>
+                    </a:lnB>
+                    <a:lnTlToBr w="12700" cmpd="sng">
+                      <a:noFill/>
+                      <a:prstDash val="solid"/>
+                    </a:lnTlToBr>
+                    <a:lnBlToTr w="12700" cmpd="sng">
+                      <a:noFill/>
+                      <a:prstDash val="solid"/>
+                    </a:lnBlToTr>
+                    <a:noFill/>
+                  </a:tcPr>
+                </a:tc>
+                <a:tc>
+                  <a:txBody>
+                    <a:bodyPr/>
+                    <a:lstStyle/>
+                    <a:p>
+                      <a:endParaRPr lang="en-GB"/>
+                    </a:p>
+                  </a:txBody>
+                  <a:tcPr>
+                    <a:lnL w="12700" cap="flat" cmpd="sng" algn="ctr">
+                      <a:solidFill>
+                        <a:schemeClr val="tx1"/>
+                      </a:solidFill>
+                      <a:prstDash val="solid"/>
+                      <a:round/>
+                      <a:headEnd type="none" w="med" len="med"/>
+                      <a:tailEnd type="none" w="med" len="med"/>
+                    </a:lnL>
+                    <a:lnR w="12700" cap="flat" cmpd="sng" algn="ctr">
+                      <a:solidFill>
+                        <a:schemeClr val="tx1"/>
+                      </a:solidFill>
+                      <a:prstDash val="solid"/>
+                      <a:round/>
+                      <a:headEnd type="none" w="med" len="med"/>
+                      <a:tailEnd type="none" w="med" len="med"/>
+                    </a:lnR>
+                    <a:lnT w="12700" cmpd="sng">
+                      <a:noFill/>
+                    </a:lnT>
+                    <a:lnB w="12700" cap="flat" cmpd="sng" algn="ctr">
+                      <a:noFill/>
+                      <a:prstDash val="solid"/>
+                      <a:round/>
+                      <a:headEnd type="none" w="med" len="med"/>
+                      <a:tailEnd type="none" w="med" len="med"/>
+                    </a:lnB>
+                    <a:lnTlToBr w="12700" cmpd="sng">
+                      <a:noFill/>
+                      <a:prstDash val="solid"/>
+                    </a:lnTlToBr>
+                    <a:lnBlToTr w="12700" cmpd="sng">
+                      <a:noFill/>
+                      <a:prstDash val="solid"/>
+                    </a:lnBlToTr>
+                    <a:noFill/>
+                  </a:tcPr>
+                </a:tc>
+                <a:tc>
+                  <a:txBody>
+                    <a:bodyPr/>
+                    <a:lstStyle/>
+                    <a:p>
+                      <a:endParaRPr lang="en-GB"/>
+                    </a:p>
+                  </a:txBody>
+                  <a:tcPr>
+                    <a:lnL w="12700" cap="flat" cmpd="sng" algn="ctr">
+                      <a:solidFill>
+                        <a:schemeClr val="tx1"/>
+                      </a:solidFill>
+                      <a:prstDash val="solid"/>
+                      <a:round/>
+                      <a:headEnd type="none" w="med" len="med"/>
+                      <a:tailEnd type="none" w="med" len="med"/>
+                    </a:lnL>
+                    <a:lnR w="12700" cap="flat" cmpd="sng" algn="ctr">
+                      <a:solidFill>
+                        <a:schemeClr val="tx1"/>
+                      </a:solidFill>
+                      <a:prstDash val="solid"/>
+                      <a:round/>
+                      <a:headEnd type="none" w="med" len="med"/>
+                      <a:tailEnd type="none" w="med" len="med"/>
+                    </a:lnR>
+                    <a:lnT w="12700" cmpd="sng">
+                      <a:noFill/>
+                    </a:lnT>
+                    <a:lnB w="12700" cap="flat" cmpd="sng" algn="ctr">
+                      <a:noFill/>
+                      <a:prstDash val="solid"/>
+                      <a:round/>
+                      <a:headEnd type="none" w="med" len="med"/>
+                      <a:tailEnd type="none" w="med" len="med"/>
+                    </a:lnB>
+                    <a:lnTlToBr w="12700" cmpd="sng">
+                      <a:noFill/>
+                      <a:prstDash val="solid"/>
+                    </a:lnTlToBr>
+                    <a:lnBlToTr w="12700" cmpd="sng">
+                      <a:noFill/>
+                      <a:prstDash val="solid"/>
+                    </a:lnBlToTr>
+                    <a:noFill/>
+                  </a:tcPr>
+                </a:tc>
+                <a:tc>
+                  <a:txBody>
+                    <a:bodyPr/>
+                    <a:lstStyle/>
+                    <a:p>
+                      <a:endParaRPr lang="en-GB"/>
+                    </a:p>
+                  </a:txBody>
+                  <a:tcPr>
+                    <a:lnL w="12700" cap="flat" cmpd="sng" algn="ctr">
+                      <a:solidFill>
+                        <a:schemeClr val="tx1"/>
+                      </a:solidFill>
+                      <a:prstDash val="solid"/>
+                      <a:round/>
+                      <a:headEnd type="none" w="med" len="med"/>
+                      <a:tailEnd type="none" w="med" len="med"/>
+                    </a:lnL>
+                    <a:lnR w="12700" cap="flat" cmpd="sng" algn="ctr">
+                      <a:solidFill>
+                        <a:schemeClr val="tx1"/>
+                      </a:solidFill>
+                      <a:prstDash val="solid"/>
+                      <a:round/>
+                      <a:headEnd type="none" w="med" len="med"/>
+                      <a:tailEnd type="none" w="med" len="med"/>
+                    </a:lnR>
+                    <a:lnT w="12700" cmpd="sng">
+                      <a:noFill/>
+                    </a:lnT>
+                    <a:lnB w="12700" cap="flat" cmpd="sng" algn="ctr">
+                      <a:noFill/>
+                      <a:prstDash val="solid"/>
+                      <a:round/>
+                      <a:headEnd type="none" w="med" len="med"/>
+                      <a:tailEnd type="none" w="med" len="med"/>
+                    </a:lnB>
+                    <a:lnTlToBr w="12700" cmpd="sng">
+                      <a:noFill/>
+                      <a:prstDash val="solid"/>
+                    </a:lnTlToBr>
+                    <a:lnBlToTr w="12700" cmpd="sng">
+                      <a:noFill/>
+                      <a:prstDash val="solid"/>
+                    </a:lnBlToTr>
+                    <a:noFill/>
+                  </a:tcPr>
+                </a:tc>
+                <a:tc>
+                  <a:txBody>
+                    <a:bodyPr/>
+                    <a:lstStyle/>
+                    <a:p>
+                      <a:endParaRPr lang="en-GB"/>
+                    </a:p>
+                  </a:txBody>
+                  <a:tcPr>
+                    <a:lnL w="12700" cap="flat" cmpd="sng" algn="ctr">
+                      <a:solidFill>
+                        <a:schemeClr val="tx1"/>
+                      </a:solidFill>
+                      <a:prstDash val="solid"/>
+                      <a:round/>
+                      <a:headEnd type="none" w="med" len="med"/>
+                      <a:tailEnd type="none" w="med" len="med"/>
+                    </a:lnL>
+                    <a:lnR w="12700" cap="flat" cmpd="sng" algn="ctr">
+                      <a:solidFill>
+                        <a:schemeClr val="tx1"/>
+                      </a:solidFill>
+                      <a:prstDash val="solid"/>
+                      <a:round/>
+                      <a:headEnd type="none" w="med" len="med"/>
+                      <a:tailEnd type="none" w="med" len="med"/>
+                    </a:lnR>
+                    <a:lnT w="12700" cmpd="sng">
+                      <a:noFill/>
+                    </a:lnT>
+                    <a:lnB w="12700" cap="flat" cmpd="sng" algn="ctr">
+                      <a:noFill/>
+                      <a:prstDash val="solid"/>
+                      <a:round/>
+                      <a:headEnd type="none" w="med" len="med"/>
+                      <a:tailEnd type="none" w="med" len="med"/>
+                    </a:lnB>
+                    <a:lnTlToBr w="12700" cmpd="sng">
+                      <a:noFill/>
+                      <a:prstDash val="solid"/>
+                    </a:lnTlToBr>
+                    <a:lnBlToTr w="12700" cmpd="sng">
+                      <a:noFill/>
+                      <a:prstDash val="solid"/>
+                    </a:lnBlToTr>
+                    <a:noFill/>
+                  </a:tcPr>
+                </a:tc>
+                <a:tc>
+                  <a:txBody>
+                    <a:bodyPr/>
+                    <a:lstStyle/>
+                    <a:p>
+                      <a:endParaRPr lang="en-GB"/>
+                    </a:p>
+                  </a:txBody>
+                  <a:tcPr>
+                    <a:lnL w="12700" cap="flat" cmpd="sng" algn="ctr">
+                      <a:solidFill>
+                        <a:schemeClr val="tx1"/>
+                      </a:solidFill>
+                      <a:prstDash val="solid"/>
+                      <a:round/>
+                      <a:headEnd type="none" w="med" len="med"/>
+                      <a:tailEnd type="none" w="med" len="med"/>
+                    </a:lnL>
+                    <a:lnR w="12700" cmpd="sng">
+                      <a:noFill/>
+                    </a:lnR>
+                    <a:lnT w="12700" cmpd="sng">
+                      <a:noFill/>
+                    </a:lnT>
+                    <a:lnB w="12700" cap="flat" cmpd="sng" algn="ctr">
+                      <a:noFill/>
+                      <a:prstDash val="solid"/>
+                      <a:round/>
+                      <a:headEnd type="none" w="med" len="med"/>
+                      <a:tailEnd type="none" w="med" len="med"/>
+                    </a:lnB>
+                    <a:lnTlToBr w="12700" cmpd="sng">
+                      <a:noFill/>
+                      <a:prstDash val="solid"/>
+                    </a:lnTlToBr>
+                    <a:lnBlToTr w="12700" cmpd="sng">
+                      <a:noFill/>
+                      <a:prstDash val="solid"/>
+                    </a:lnBlToTr>
+                    <a:noFill/>
+                  </a:tcPr>
+                </a:tc>
+                <a:extLst>
+                  <a:ext uri="{0D108BD9-81ED-4DB2-BD59-A6C34878D82A}">
+                    <a16:rowId xmlns:a16="http://schemas.microsoft.com/office/drawing/2014/main" val="929773837"/>
+                  </a:ext>
+                </a:extLst>
+              </a:tr>
+              <a:tr h="857250">
+                <a:tc>
+                  <a:txBody>
+                    <a:bodyPr/>
+                    <a:lstStyle/>
+                    <a:p>
+                      <a:endParaRPr lang="en-GB" dirty="0"/>
+                    </a:p>
+                  </a:txBody>
+                  <a:tcPr>
+                    <a:lnL w="12700" cmpd="sng">
+                      <a:noFill/>
+                    </a:lnL>
+                    <a:lnR w="12700" cap="flat" cmpd="sng" algn="ctr">
+                      <a:solidFill>
+                        <a:schemeClr val="tx1"/>
+                      </a:solidFill>
+                      <a:prstDash val="solid"/>
+                      <a:round/>
+                      <a:headEnd type="none" w="med" len="med"/>
+                      <a:tailEnd type="none" w="med" len="med"/>
+                    </a:lnR>
+                    <a:lnT w="12700" cap="flat" cmpd="sng" algn="ctr">
+                      <a:noFill/>
+                      <a:prstDash val="solid"/>
+                      <a:round/>
+                      <a:headEnd type="none" w="med" len="med"/>
+                      <a:tailEnd type="none" w="med" len="med"/>
+                    </a:lnT>
+                    <a:lnB w="12700" cap="flat" cmpd="sng" algn="ctr">
+                      <a:noFill/>
+                      <a:prstDash val="solid"/>
+                      <a:round/>
+                      <a:headEnd type="none" w="med" len="med"/>
+                      <a:tailEnd type="none" w="med" len="med"/>
+                    </a:lnB>
+                    <a:lnTlToBr w="12700" cmpd="sng">
+                      <a:noFill/>
+                      <a:prstDash val="solid"/>
+                    </a:lnTlToBr>
+                    <a:lnBlToTr w="12700" cmpd="sng">
+                      <a:noFill/>
+                      <a:prstDash val="solid"/>
+                    </a:lnBlToTr>
+                    <a:noFill/>
+                  </a:tcPr>
+                </a:tc>
+                <a:tc>
+                  <a:txBody>
+                    <a:bodyPr/>
+                    <a:lstStyle/>
+                    <a:p>
+                      <a:endParaRPr lang="en-GB" dirty="0"/>
+                    </a:p>
+                  </a:txBody>
+                  <a:tcPr>
+                    <a:lnL w="12700" cap="flat" cmpd="sng" algn="ctr">
+                      <a:solidFill>
+                        <a:schemeClr val="tx1"/>
+                      </a:solidFill>
+                      <a:prstDash val="solid"/>
+                      <a:round/>
+                      <a:headEnd type="none" w="med" len="med"/>
+                      <a:tailEnd type="none" w="med" len="med"/>
+                    </a:lnL>
+                    <a:lnR w="12700" cap="flat" cmpd="sng" algn="ctr">
+                      <a:solidFill>
+                        <a:schemeClr val="tx1"/>
+                      </a:solidFill>
+                      <a:prstDash val="solid"/>
+                      <a:round/>
+                      <a:headEnd type="none" w="med" len="med"/>
+                      <a:tailEnd type="none" w="med" len="med"/>
+                    </a:lnR>
+                    <a:lnT w="12700" cap="flat" cmpd="sng" algn="ctr">
+                      <a:noFill/>
+                      <a:prstDash val="solid"/>
+                      <a:round/>
+                      <a:headEnd type="none" w="med" len="med"/>
+                      <a:tailEnd type="none" w="med" len="med"/>
+                    </a:lnT>
+                    <a:lnB w="12700" cap="flat" cmpd="sng" algn="ctr">
+                      <a:noFill/>
+                      <a:prstDash val="solid"/>
+                      <a:round/>
+                      <a:headEnd type="none" w="med" len="med"/>
+                      <a:tailEnd type="none" w="med" len="med"/>
+                    </a:lnB>
+                    <a:lnTlToBr w="12700" cmpd="sng">
+                      <a:noFill/>
+                      <a:prstDash val="solid"/>
+                    </a:lnTlToBr>
+                    <a:lnBlToTr w="12700" cmpd="sng">
+                      <a:noFill/>
+                      <a:prstDash val="solid"/>
+                    </a:lnBlToTr>
+                    <a:noFill/>
+                  </a:tcPr>
+                </a:tc>
+                <a:tc>
+                  <a:txBody>
+                    <a:bodyPr/>
+                    <a:lstStyle/>
+                    <a:p>
+                      <a:endParaRPr lang="en-GB"/>
+                    </a:p>
+                  </a:txBody>
+                  <a:tcPr>
+                    <a:lnL w="12700" cap="flat" cmpd="sng" algn="ctr">
+                      <a:solidFill>
+                        <a:schemeClr val="tx1"/>
+                      </a:solidFill>
+                      <a:prstDash val="solid"/>
+                      <a:round/>
+                      <a:headEnd type="none" w="med" len="med"/>
+                      <a:tailEnd type="none" w="med" len="med"/>
+                    </a:lnL>
+                    <a:lnR w="12700" cap="flat" cmpd="sng" algn="ctr">
+                      <a:solidFill>
+                        <a:schemeClr val="tx1"/>
+                      </a:solidFill>
+                      <a:prstDash val="solid"/>
+                      <a:round/>
+                      <a:headEnd type="none" w="med" len="med"/>
+                      <a:tailEnd type="none" w="med" len="med"/>
+                    </a:lnR>
+                    <a:lnT w="12700" cap="flat" cmpd="sng" algn="ctr">
+                      <a:noFill/>
+                      <a:prstDash val="solid"/>
+                      <a:round/>
+                      <a:headEnd type="none" w="med" len="med"/>
+                      <a:tailEnd type="none" w="med" len="med"/>
+                    </a:lnT>
+                    <a:lnB w="12700" cap="flat" cmpd="sng" algn="ctr">
+                      <a:noFill/>
+                      <a:prstDash val="solid"/>
+                      <a:round/>
+                      <a:headEnd type="none" w="med" len="med"/>
+                      <a:tailEnd type="none" w="med" len="med"/>
+                    </a:lnB>
+                    <a:lnTlToBr w="12700" cmpd="sng">
+                      <a:noFill/>
+                      <a:prstDash val="solid"/>
+                    </a:lnTlToBr>
+                    <a:lnBlToTr w="12700" cmpd="sng">
+                      <a:noFill/>
+                      <a:prstDash val="solid"/>
+                    </a:lnBlToTr>
+                    <a:noFill/>
+                  </a:tcPr>
+                </a:tc>
+                <a:tc>
+                  <a:txBody>
+                    <a:bodyPr/>
+                    <a:lstStyle/>
+                    <a:p>
+                      <a:endParaRPr lang="en-GB"/>
+                    </a:p>
+                  </a:txBody>
+                  <a:tcPr>
+                    <a:lnL w="12700" cap="flat" cmpd="sng" algn="ctr">
+                      <a:solidFill>
+                        <a:schemeClr val="tx1"/>
+                      </a:solidFill>
+                      <a:prstDash val="solid"/>
+                      <a:round/>
+                      <a:headEnd type="none" w="med" len="med"/>
+                      <a:tailEnd type="none" w="med" len="med"/>
+                    </a:lnL>
+                    <a:lnR w="12700" cap="flat" cmpd="sng" algn="ctr">
+                      <a:solidFill>
+                        <a:schemeClr val="tx1"/>
+                      </a:solidFill>
+                      <a:prstDash val="solid"/>
+                      <a:round/>
+                      <a:headEnd type="none" w="med" len="med"/>
+                      <a:tailEnd type="none" w="med" len="med"/>
+                    </a:lnR>
+                    <a:lnT w="12700" cap="flat" cmpd="sng" algn="ctr">
+                      <a:noFill/>
+                      <a:prstDash val="solid"/>
+                      <a:round/>
+                      <a:headEnd type="none" w="med" len="med"/>
+                      <a:tailEnd type="none" w="med" len="med"/>
+                    </a:lnT>
+                    <a:lnB w="12700" cap="flat" cmpd="sng" algn="ctr">
+                      <a:noFill/>
+                      <a:prstDash val="solid"/>
+                      <a:round/>
+                      <a:headEnd type="none" w="med" len="med"/>
+                      <a:tailEnd type="none" w="med" len="med"/>
+                    </a:lnB>
+                    <a:lnTlToBr w="12700" cmpd="sng">
+                      <a:noFill/>
+                      <a:prstDash val="solid"/>
+                    </a:lnTlToBr>
+                    <a:lnBlToTr w="12700" cmpd="sng">
+                      <a:noFill/>
+                      <a:prstDash val="solid"/>
+                    </a:lnBlToTr>
+                    <a:noFill/>
+                  </a:tcPr>
+                </a:tc>
+                <a:tc>
+                  <a:txBody>
+                    <a:bodyPr/>
+                    <a:lstStyle/>
+                    <a:p>
+                      <a:endParaRPr lang="en-GB"/>
+                    </a:p>
+                  </a:txBody>
+                  <a:tcPr>
+                    <a:lnL w="12700" cap="flat" cmpd="sng" algn="ctr">
+                      <a:solidFill>
+                        <a:schemeClr val="tx1"/>
+                      </a:solidFill>
+                      <a:prstDash val="solid"/>
+                      <a:round/>
+                      <a:headEnd type="none" w="med" len="med"/>
+                      <a:tailEnd type="none" w="med" len="med"/>
+                    </a:lnL>
+                    <a:lnR w="12700" cap="flat" cmpd="sng" algn="ctr">
+                      <a:solidFill>
+                        <a:schemeClr val="tx1"/>
+                      </a:solidFill>
+                      <a:prstDash val="solid"/>
+                      <a:round/>
+                      <a:headEnd type="none" w="med" len="med"/>
+                      <a:tailEnd type="none" w="med" len="med"/>
+                    </a:lnR>
+                    <a:lnT w="12700" cap="flat" cmpd="sng" algn="ctr">
+                      <a:noFill/>
+                      <a:prstDash val="solid"/>
+                      <a:round/>
+                      <a:headEnd type="none" w="med" len="med"/>
+                      <a:tailEnd type="none" w="med" len="med"/>
+                    </a:lnT>
+                    <a:lnB w="12700" cap="flat" cmpd="sng" algn="ctr">
+                      <a:noFill/>
+                      <a:prstDash val="solid"/>
+                      <a:round/>
+                      <a:headEnd type="none" w="med" len="med"/>
+                      <a:tailEnd type="none" w="med" len="med"/>
+                    </a:lnB>
+                    <a:lnTlToBr w="12700" cmpd="sng">
+                      <a:noFill/>
+                      <a:prstDash val="solid"/>
+                    </a:lnTlToBr>
+                    <a:lnBlToTr w="12700" cmpd="sng">
+                      <a:noFill/>
+                      <a:prstDash val="solid"/>
+                    </a:lnBlToTr>
+                    <a:noFill/>
+                  </a:tcPr>
+                </a:tc>
+                <a:tc>
+                  <a:txBody>
+                    <a:bodyPr/>
+                    <a:lstStyle/>
+                    <a:p>
+                      <a:endParaRPr lang="en-GB" dirty="0"/>
+                    </a:p>
+                  </a:txBody>
+                  <a:tcPr>
+                    <a:lnL w="12700" cap="flat" cmpd="sng" algn="ctr">
+                      <a:solidFill>
+                        <a:schemeClr val="tx1"/>
+                      </a:solidFill>
+                      <a:prstDash val="solid"/>
+                      <a:round/>
+                      <a:headEnd type="none" w="med" len="med"/>
+                      <a:tailEnd type="none" w="med" len="med"/>
+                    </a:lnL>
+                    <a:lnR w="12700" cmpd="sng">
+                      <a:noFill/>
+                    </a:lnR>
+                    <a:lnT w="12700" cap="flat" cmpd="sng" algn="ctr">
+                      <a:noFill/>
+                      <a:prstDash val="solid"/>
+                      <a:round/>
+                      <a:headEnd type="none" w="med" len="med"/>
+                      <a:tailEnd type="none" w="med" len="med"/>
+                    </a:lnT>
+                    <a:lnB w="12700" cap="flat" cmpd="sng" algn="ctr">
+                      <a:noFill/>
+                      <a:prstDash val="solid"/>
+                      <a:round/>
+                      <a:headEnd type="none" w="med" len="med"/>
+                      <a:tailEnd type="none" w="med" len="med"/>
+                    </a:lnB>
+                    <a:lnTlToBr w="12700" cmpd="sng">
+                      <a:noFill/>
+                      <a:prstDash val="solid"/>
+                    </a:lnTlToBr>
+                    <a:lnBlToTr w="12700" cmpd="sng">
+                      <a:noFill/>
+                      <a:prstDash val="solid"/>
+                    </a:lnBlToTr>
+                    <a:noFill/>
+                  </a:tcPr>
+                </a:tc>
+                <a:extLst>
+                  <a:ext uri="{0D108BD9-81ED-4DB2-BD59-A6C34878D82A}">
+                    <a16:rowId xmlns:a16="http://schemas.microsoft.com/office/drawing/2014/main" val="1331370651"/>
+                  </a:ext>
+                </a:extLst>
+              </a:tr>
+              <a:tr h="857250">
+                <a:tc>
+                  <a:txBody>
+                    <a:bodyPr/>
+                    <a:lstStyle/>
+                    <a:p>
+                      <a:endParaRPr lang="en-GB" dirty="0"/>
+                    </a:p>
+                  </a:txBody>
+                  <a:tcPr>
+                    <a:lnL w="12700" cmpd="sng">
+                      <a:noFill/>
+                    </a:lnL>
+                    <a:lnR w="12700" cap="flat" cmpd="sng" algn="ctr">
+                      <a:solidFill>
+                        <a:schemeClr val="tx1"/>
+                      </a:solidFill>
+                      <a:prstDash val="solid"/>
+                      <a:round/>
+                      <a:headEnd type="none" w="med" len="med"/>
+                      <a:tailEnd type="none" w="med" len="med"/>
+                    </a:lnR>
+                    <a:lnT w="12700" cap="flat" cmpd="sng" algn="ctr">
+                      <a:noFill/>
+                      <a:prstDash val="solid"/>
+                      <a:round/>
+                      <a:headEnd type="none" w="med" len="med"/>
+                      <a:tailEnd type="none" w="med" len="med"/>
+                    </a:lnT>
+                    <a:lnB w="12700" cap="flat" cmpd="sng" algn="ctr">
+                      <a:noFill/>
+                      <a:prstDash val="solid"/>
+                      <a:round/>
+                      <a:headEnd type="none" w="med" len="med"/>
+                      <a:tailEnd type="none" w="med" len="med"/>
+                    </a:lnB>
+                    <a:lnTlToBr w="12700" cmpd="sng">
+                      <a:noFill/>
+                      <a:prstDash val="solid"/>
+                    </a:lnTlToBr>
+                    <a:lnBlToTr w="12700" cmpd="sng">
+                      <a:noFill/>
+                      <a:prstDash val="solid"/>
+                    </a:lnBlToTr>
+                    <a:noFill/>
+                  </a:tcPr>
+                </a:tc>
+                <a:tc>
+                  <a:txBody>
+                    <a:bodyPr/>
+                    <a:lstStyle/>
+                    <a:p>
+                      <a:endParaRPr lang="en-GB"/>
+                    </a:p>
+                  </a:txBody>
+                  <a:tcPr>
+                    <a:lnL w="12700" cap="flat" cmpd="sng" algn="ctr">
+                      <a:solidFill>
+                        <a:schemeClr val="tx1"/>
+                      </a:solidFill>
+                      <a:prstDash val="solid"/>
+                      <a:round/>
+                      <a:headEnd type="none" w="med" len="med"/>
+                      <a:tailEnd type="none" w="med" len="med"/>
+                    </a:lnL>
+                    <a:lnR w="12700" cap="flat" cmpd="sng" algn="ctr">
+                      <a:solidFill>
+                        <a:schemeClr val="tx1"/>
+                      </a:solidFill>
+                      <a:prstDash val="solid"/>
+                      <a:round/>
+                      <a:headEnd type="none" w="med" len="med"/>
+                      <a:tailEnd type="none" w="med" len="med"/>
+                    </a:lnR>
+                    <a:lnT w="12700" cap="flat" cmpd="sng" algn="ctr">
+                      <a:noFill/>
+                      <a:prstDash val="solid"/>
+                      <a:round/>
+                      <a:headEnd type="none" w="med" len="med"/>
+                      <a:tailEnd type="none" w="med" len="med"/>
+                    </a:lnT>
+                    <a:lnB w="12700" cap="flat" cmpd="sng" algn="ctr">
+                      <a:noFill/>
+                      <a:prstDash val="solid"/>
+                      <a:round/>
+                      <a:headEnd type="none" w="med" len="med"/>
+                      <a:tailEnd type="none" w="med" len="med"/>
+                    </a:lnB>
+                    <a:lnTlToBr w="12700" cmpd="sng">
+                      <a:noFill/>
+                      <a:prstDash val="solid"/>
+                    </a:lnTlToBr>
+                    <a:lnBlToTr w="12700" cmpd="sng">
+                      <a:noFill/>
+                      <a:prstDash val="solid"/>
+                    </a:lnBlToTr>
+                    <a:noFill/>
+                  </a:tcPr>
+                </a:tc>
+                <a:tc>
+                  <a:txBody>
+                    <a:bodyPr/>
+                    <a:lstStyle/>
+                    <a:p>
+                      <a:endParaRPr lang="en-GB" dirty="0"/>
+                    </a:p>
+                  </a:txBody>
+                  <a:tcPr>
+                    <a:lnL w="12700" cap="flat" cmpd="sng" algn="ctr">
+                      <a:solidFill>
+                        <a:schemeClr val="tx1"/>
+                      </a:solidFill>
+                      <a:prstDash val="solid"/>
+                      <a:round/>
+                      <a:headEnd type="none" w="med" len="med"/>
+                      <a:tailEnd type="none" w="med" len="med"/>
+                    </a:lnL>
+                    <a:lnR w="12700" cap="flat" cmpd="sng" algn="ctr">
+                      <a:solidFill>
+                        <a:schemeClr val="tx1"/>
+                      </a:solidFill>
+                      <a:prstDash val="solid"/>
+                      <a:round/>
+                      <a:headEnd type="none" w="med" len="med"/>
+                      <a:tailEnd type="none" w="med" len="med"/>
+                    </a:lnR>
+                    <a:lnT w="12700" cap="flat" cmpd="sng" algn="ctr">
+                      <a:noFill/>
+                      <a:prstDash val="solid"/>
+                      <a:round/>
+                      <a:headEnd type="none" w="med" len="med"/>
+                      <a:tailEnd type="none" w="med" len="med"/>
+                    </a:lnT>
+                    <a:lnB w="12700" cap="flat" cmpd="sng" algn="ctr">
+                      <a:noFill/>
+                      <a:prstDash val="solid"/>
+                      <a:round/>
+                      <a:headEnd type="none" w="med" len="med"/>
+                      <a:tailEnd type="none" w="med" len="med"/>
+                    </a:lnB>
+                    <a:lnTlToBr w="12700" cmpd="sng">
+                      <a:noFill/>
+                      <a:prstDash val="solid"/>
+                    </a:lnTlToBr>
+                    <a:lnBlToTr w="12700" cmpd="sng">
+                      <a:noFill/>
+                      <a:prstDash val="solid"/>
+                    </a:lnBlToTr>
+                    <a:noFill/>
+                  </a:tcPr>
+                </a:tc>
+                <a:tc>
+                  <a:txBody>
+                    <a:bodyPr/>
+                    <a:lstStyle/>
+                    <a:p>
+                      <a:endParaRPr lang="en-GB"/>
+                    </a:p>
+                  </a:txBody>
+                  <a:tcPr>
+                    <a:lnL w="12700" cap="flat" cmpd="sng" algn="ctr">
+                      <a:solidFill>
+                        <a:schemeClr val="tx1"/>
+                      </a:solidFill>
+                      <a:prstDash val="solid"/>
+                      <a:round/>
+                      <a:headEnd type="none" w="med" len="med"/>
+                      <a:tailEnd type="none" w="med" len="med"/>
+                    </a:lnL>
+                    <a:lnR w="12700" cap="flat" cmpd="sng" algn="ctr">
+                      <a:solidFill>
+                        <a:schemeClr val="tx1"/>
+                      </a:solidFill>
+                      <a:prstDash val="solid"/>
+                      <a:round/>
+                      <a:headEnd type="none" w="med" len="med"/>
+                      <a:tailEnd type="none" w="med" len="med"/>
+                    </a:lnR>
+                    <a:lnT w="12700" cap="flat" cmpd="sng" algn="ctr">
+                      <a:noFill/>
+                      <a:prstDash val="solid"/>
+                      <a:round/>
+                      <a:headEnd type="none" w="med" len="med"/>
+                      <a:tailEnd type="none" w="med" len="med"/>
+                    </a:lnT>
+                    <a:lnB w="12700" cap="flat" cmpd="sng" algn="ctr">
+                      <a:noFill/>
+                      <a:prstDash val="solid"/>
+                      <a:round/>
+                      <a:headEnd type="none" w="med" len="med"/>
+                      <a:tailEnd type="none" w="med" len="med"/>
+                    </a:lnB>
+                    <a:lnTlToBr w="12700" cmpd="sng">
+                      <a:noFill/>
+                      <a:prstDash val="solid"/>
+                    </a:lnTlToBr>
+                    <a:lnBlToTr w="12700" cmpd="sng">
+                      <a:noFill/>
+                      <a:prstDash val="solid"/>
+                    </a:lnBlToTr>
+                    <a:noFill/>
+                  </a:tcPr>
+                </a:tc>
+                <a:tc>
+                  <a:txBody>
+                    <a:bodyPr/>
+                    <a:lstStyle/>
+                    <a:p>
+                      <a:endParaRPr lang="en-GB"/>
+                    </a:p>
+                  </a:txBody>
+                  <a:tcPr>
+                    <a:lnL w="12700" cap="flat" cmpd="sng" algn="ctr">
+                      <a:solidFill>
+                        <a:schemeClr val="tx1"/>
+                      </a:solidFill>
+                      <a:prstDash val="solid"/>
+                      <a:round/>
+                      <a:headEnd type="none" w="med" len="med"/>
+                      <a:tailEnd type="none" w="med" len="med"/>
+                    </a:lnL>
+                    <a:lnR w="12700" cap="flat" cmpd="sng" algn="ctr">
+                      <a:solidFill>
+                        <a:schemeClr val="tx1"/>
+                      </a:solidFill>
+                      <a:prstDash val="solid"/>
+                      <a:round/>
+                      <a:headEnd type="none" w="med" len="med"/>
+                      <a:tailEnd type="none" w="med" len="med"/>
+                    </a:lnR>
+                    <a:lnT w="12700" cap="flat" cmpd="sng" algn="ctr">
+                      <a:noFill/>
+                      <a:prstDash val="solid"/>
+                      <a:round/>
+                      <a:headEnd type="none" w="med" len="med"/>
+                      <a:tailEnd type="none" w="med" len="med"/>
+                    </a:lnT>
+                    <a:lnB w="12700" cap="flat" cmpd="sng" algn="ctr">
+                      <a:noFill/>
+                      <a:prstDash val="solid"/>
+                      <a:round/>
+                      <a:headEnd type="none" w="med" len="med"/>
+                      <a:tailEnd type="none" w="med" len="med"/>
+                    </a:lnB>
+                    <a:lnTlToBr w="12700" cmpd="sng">
+                      <a:noFill/>
+                      <a:prstDash val="solid"/>
+                    </a:lnTlToBr>
+                    <a:lnBlToTr w="12700" cmpd="sng">
+                      <a:noFill/>
+                      <a:prstDash val="solid"/>
+                    </a:lnBlToTr>
+                    <a:noFill/>
+                  </a:tcPr>
+                </a:tc>
+                <a:tc>
+                  <a:txBody>
+                    <a:bodyPr/>
+                    <a:lstStyle/>
+                    <a:p>
+                      <a:endParaRPr lang="en-GB" dirty="0"/>
+                    </a:p>
+                  </a:txBody>
+                  <a:tcPr>
+                    <a:lnL w="12700" cap="flat" cmpd="sng" algn="ctr">
+                      <a:solidFill>
+                        <a:schemeClr val="tx1"/>
+                      </a:solidFill>
+                      <a:prstDash val="solid"/>
+                      <a:round/>
+                      <a:headEnd type="none" w="med" len="med"/>
+                      <a:tailEnd type="none" w="med" len="med"/>
+                    </a:lnL>
+                    <a:lnR w="12700" cmpd="sng">
+                      <a:noFill/>
+                    </a:lnR>
+                    <a:lnT w="12700" cap="flat" cmpd="sng" algn="ctr">
+                      <a:noFill/>
+                      <a:prstDash val="solid"/>
+                      <a:round/>
+                      <a:headEnd type="none" w="med" len="med"/>
+                      <a:tailEnd type="none" w="med" len="med"/>
+                    </a:lnT>
+                    <a:lnB w="12700" cap="flat" cmpd="sng" algn="ctr">
+                      <a:noFill/>
+                      <a:prstDash val="solid"/>
+                      <a:round/>
+                      <a:headEnd type="none" w="med" len="med"/>
+                      <a:tailEnd type="none" w="med" len="med"/>
+                    </a:lnB>
+                    <a:lnTlToBr w="12700" cmpd="sng">
+                      <a:noFill/>
+                      <a:prstDash val="solid"/>
+                    </a:lnTlToBr>
+                    <a:lnBlToTr w="12700" cmpd="sng">
+                      <a:noFill/>
+                      <a:prstDash val="solid"/>
+                    </a:lnBlToTr>
+                    <a:noFill/>
+                  </a:tcPr>
+                </a:tc>
+                <a:extLst>
+                  <a:ext uri="{0D108BD9-81ED-4DB2-BD59-A6C34878D82A}">
+                    <a16:rowId xmlns:a16="http://schemas.microsoft.com/office/drawing/2014/main" val="2756274862"/>
+                  </a:ext>
+                </a:extLst>
+              </a:tr>
+              <a:tr h="857250">
+                <a:tc>
+                  <a:txBody>
+                    <a:bodyPr/>
+                    <a:lstStyle/>
+                    <a:p>
+                      <a:endParaRPr lang="en-GB"/>
+                    </a:p>
+                  </a:txBody>
+                  <a:tcPr>
+                    <a:lnL w="12700" cmpd="sng">
+                      <a:noFill/>
+                    </a:lnL>
+                    <a:lnR w="12700" cap="flat" cmpd="sng" algn="ctr">
+                      <a:solidFill>
+                        <a:schemeClr val="tx1"/>
+                      </a:solidFill>
+                      <a:prstDash val="solid"/>
+                      <a:round/>
+                      <a:headEnd type="none" w="med" len="med"/>
+                      <a:tailEnd type="none" w="med" len="med"/>
+                    </a:lnR>
+                    <a:lnT w="12700" cap="flat" cmpd="sng" algn="ctr">
+                      <a:noFill/>
+                      <a:prstDash val="solid"/>
+                      <a:round/>
+                      <a:headEnd type="none" w="med" len="med"/>
+                      <a:tailEnd type="none" w="med" len="med"/>
+                    </a:lnT>
+                    <a:lnB w="12700" cap="flat" cmpd="sng" algn="ctr">
+                      <a:noFill/>
+                      <a:prstDash val="solid"/>
+                      <a:round/>
+                      <a:headEnd type="none" w="med" len="med"/>
+                      <a:tailEnd type="none" w="med" len="med"/>
+                    </a:lnB>
+                    <a:lnTlToBr w="12700" cmpd="sng">
+                      <a:noFill/>
+                      <a:prstDash val="solid"/>
+                    </a:lnTlToBr>
+                    <a:lnBlToTr w="12700" cmpd="sng">
+                      <a:noFill/>
+                      <a:prstDash val="solid"/>
+                    </a:lnBlToTr>
+                    <a:noFill/>
+                  </a:tcPr>
+                </a:tc>
+                <a:tc>
+                  <a:txBody>
+                    <a:bodyPr/>
+                    <a:lstStyle/>
+                    <a:p>
+                      <a:endParaRPr lang="en-GB"/>
+                    </a:p>
+                  </a:txBody>
+                  <a:tcPr>
+                    <a:lnL w="12700" cap="flat" cmpd="sng" algn="ctr">
+                      <a:solidFill>
+                        <a:schemeClr val="tx1"/>
+                      </a:solidFill>
+                      <a:prstDash val="solid"/>
+                      <a:round/>
+                      <a:headEnd type="none" w="med" len="med"/>
+                      <a:tailEnd type="none" w="med" len="med"/>
+                    </a:lnL>
+                    <a:lnR w="12700" cap="flat" cmpd="sng" algn="ctr">
+                      <a:solidFill>
+                        <a:schemeClr val="tx1"/>
+                      </a:solidFill>
+                      <a:prstDash val="solid"/>
+                      <a:round/>
+                      <a:headEnd type="none" w="med" len="med"/>
+                      <a:tailEnd type="none" w="med" len="med"/>
+                    </a:lnR>
+                    <a:lnT w="12700" cap="flat" cmpd="sng" algn="ctr">
+                      <a:noFill/>
+                      <a:prstDash val="solid"/>
+                      <a:round/>
+                      <a:headEnd type="none" w="med" len="med"/>
+                      <a:tailEnd type="none" w="med" len="med"/>
+                    </a:lnT>
+                    <a:lnB w="12700" cap="flat" cmpd="sng" algn="ctr">
+                      <a:noFill/>
+                      <a:prstDash val="solid"/>
+                      <a:round/>
+                      <a:headEnd type="none" w="med" len="med"/>
+                      <a:tailEnd type="none" w="med" len="med"/>
+                    </a:lnB>
+                    <a:lnTlToBr w="12700" cmpd="sng">
+                      <a:noFill/>
+                      <a:prstDash val="solid"/>
+                    </a:lnTlToBr>
+                    <a:lnBlToTr w="12700" cmpd="sng">
+                      <a:noFill/>
+                      <a:prstDash val="solid"/>
+                    </a:lnBlToTr>
+                    <a:noFill/>
+                  </a:tcPr>
+                </a:tc>
+                <a:tc>
+                  <a:txBody>
+                    <a:bodyPr/>
+                    <a:lstStyle/>
+                    <a:p>
+                      <a:endParaRPr lang="en-GB"/>
+                    </a:p>
+                  </a:txBody>
+                  <a:tcPr>
+                    <a:lnL w="12700" cap="flat" cmpd="sng" algn="ctr">
+                      <a:solidFill>
+                        <a:schemeClr val="tx1"/>
+                      </a:solidFill>
+                      <a:prstDash val="solid"/>
+                      <a:round/>
+                      <a:headEnd type="none" w="med" len="med"/>
+                      <a:tailEnd type="none" w="med" len="med"/>
+                    </a:lnL>
+                    <a:lnR w="12700" cap="flat" cmpd="sng" algn="ctr">
+                      <a:solidFill>
+                        <a:schemeClr val="tx1"/>
+                      </a:solidFill>
+                      <a:prstDash val="solid"/>
+                      <a:round/>
+                      <a:headEnd type="none" w="med" len="med"/>
+                      <a:tailEnd type="none" w="med" len="med"/>
+                    </a:lnR>
+                    <a:lnT w="12700" cap="flat" cmpd="sng" algn="ctr">
+                      <a:noFill/>
+                      <a:prstDash val="solid"/>
+                      <a:round/>
+                      <a:headEnd type="none" w="med" len="med"/>
+                      <a:tailEnd type="none" w="med" len="med"/>
+                    </a:lnT>
+                    <a:lnB w="12700" cap="flat" cmpd="sng" algn="ctr">
+                      <a:noFill/>
+                      <a:prstDash val="solid"/>
+                      <a:round/>
+                      <a:headEnd type="none" w="med" len="med"/>
+                      <a:tailEnd type="none" w="med" len="med"/>
+                    </a:lnB>
+                    <a:lnTlToBr w="12700" cmpd="sng">
+                      <a:noFill/>
+                      <a:prstDash val="solid"/>
+                    </a:lnTlToBr>
+                    <a:lnBlToTr w="12700" cmpd="sng">
+                      <a:noFill/>
+                      <a:prstDash val="solid"/>
+                    </a:lnBlToTr>
+                    <a:noFill/>
+                  </a:tcPr>
+                </a:tc>
+                <a:tc>
+                  <a:txBody>
+                    <a:bodyPr/>
+                    <a:lstStyle/>
+                    <a:p>
+                      <a:endParaRPr lang="en-GB"/>
+                    </a:p>
+                  </a:txBody>
+                  <a:tcPr>
+                    <a:lnL w="12700" cap="flat" cmpd="sng" algn="ctr">
+                      <a:solidFill>
+                        <a:schemeClr val="tx1"/>
+                      </a:solidFill>
+                      <a:prstDash val="solid"/>
+                      <a:round/>
+                      <a:headEnd type="none" w="med" len="med"/>
+                      <a:tailEnd type="none" w="med" len="med"/>
+                    </a:lnL>
+                    <a:lnR w="12700" cap="flat" cmpd="sng" algn="ctr">
+                      <a:solidFill>
+                        <a:schemeClr val="tx1"/>
+                      </a:solidFill>
+                      <a:prstDash val="solid"/>
+                      <a:round/>
+                      <a:headEnd type="none" w="med" len="med"/>
+                      <a:tailEnd type="none" w="med" len="med"/>
+                    </a:lnR>
+                    <a:lnT w="12700" cap="flat" cmpd="sng" algn="ctr">
+                      <a:noFill/>
+                      <a:prstDash val="solid"/>
+                      <a:round/>
+                      <a:headEnd type="none" w="med" len="med"/>
+                      <a:tailEnd type="none" w="med" len="med"/>
+                    </a:lnT>
+                    <a:lnB w="12700" cap="flat" cmpd="sng" algn="ctr">
+                      <a:noFill/>
+                      <a:prstDash val="solid"/>
+                      <a:round/>
+                      <a:headEnd type="none" w="med" len="med"/>
+                      <a:tailEnd type="none" w="med" len="med"/>
+                    </a:lnB>
+                    <a:lnTlToBr w="12700" cmpd="sng">
+                      <a:noFill/>
+                      <a:prstDash val="solid"/>
+                    </a:lnTlToBr>
+                    <a:lnBlToTr w="12700" cmpd="sng">
+                      <a:noFill/>
+                      <a:prstDash val="solid"/>
+                    </a:lnBlToTr>
+                    <a:noFill/>
+                  </a:tcPr>
+                </a:tc>
+                <a:tc>
+                  <a:txBody>
+                    <a:bodyPr/>
+                    <a:lstStyle/>
+                    <a:p>
+                      <a:endParaRPr lang="en-GB"/>
+                    </a:p>
+                  </a:txBody>
+                  <a:tcPr>
+                    <a:lnL w="12700" cap="flat" cmpd="sng" algn="ctr">
+                      <a:solidFill>
+                        <a:schemeClr val="tx1"/>
+                      </a:solidFill>
+                      <a:prstDash val="solid"/>
+                      <a:round/>
+                      <a:headEnd type="none" w="med" len="med"/>
+                      <a:tailEnd type="none" w="med" len="med"/>
+                    </a:lnL>
+                    <a:lnR w="12700" cap="flat" cmpd="sng" algn="ctr">
+                      <a:solidFill>
+                        <a:schemeClr val="tx1"/>
+                      </a:solidFill>
+                      <a:prstDash val="solid"/>
+                      <a:round/>
+                      <a:headEnd type="none" w="med" len="med"/>
+                      <a:tailEnd type="none" w="med" len="med"/>
+                    </a:lnR>
+                    <a:lnT w="12700" cap="flat" cmpd="sng" algn="ctr">
+                      <a:noFill/>
+                      <a:prstDash val="solid"/>
+                      <a:round/>
+                      <a:headEnd type="none" w="med" len="med"/>
+                      <a:tailEnd type="none" w="med" len="med"/>
+                    </a:lnT>
+                    <a:lnB w="12700" cap="flat" cmpd="sng" algn="ctr">
+                      <a:noFill/>
+                      <a:prstDash val="solid"/>
+                      <a:round/>
+                      <a:headEnd type="none" w="med" len="med"/>
+                      <a:tailEnd type="none" w="med" len="med"/>
+                    </a:lnB>
+                    <a:lnTlToBr w="12700" cmpd="sng">
+                      <a:noFill/>
+                      <a:prstDash val="solid"/>
+                    </a:lnTlToBr>
+                    <a:lnBlToTr w="12700" cmpd="sng">
+                      <a:noFill/>
+                      <a:prstDash val="solid"/>
+                    </a:lnBlToTr>
+                    <a:noFill/>
+                  </a:tcPr>
+                </a:tc>
+                <a:tc>
+                  <a:txBody>
+                    <a:bodyPr/>
+                    <a:lstStyle/>
+                    <a:p>
+                      <a:endParaRPr lang="en-GB" dirty="0"/>
+                    </a:p>
+                  </a:txBody>
+                  <a:tcPr>
+                    <a:lnL w="12700" cap="flat" cmpd="sng" algn="ctr">
+                      <a:solidFill>
+                        <a:schemeClr val="tx1"/>
+                      </a:solidFill>
+                      <a:prstDash val="solid"/>
+                      <a:round/>
+                      <a:headEnd type="none" w="med" len="med"/>
+                      <a:tailEnd type="none" w="med" len="med"/>
+                    </a:lnL>
+                    <a:lnR w="12700" cmpd="sng">
+                      <a:noFill/>
+                    </a:lnR>
+                    <a:lnT w="12700" cap="flat" cmpd="sng" algn="ctr">
+                      <a:noFill/>
+                      <a:prstDash val="solid"/>
+                      <a:round/>
+                      <a:headEnd type="none" w="med" len="med"/>
+                      <a:tailEnd type="none" w="med" len="med"/>
+                    </a:lnT>
+                    <a:lnB w="12700" cap="flat" cmpd="sng" algn="ctr">
+                      <a:noFill/>
+                      <a:prstDash val="solid"/>
+                      <a:round/>
+                      <a:headEnd type="none" w="med" len="med"/>
+                      <a:tailEnd type="none" w="med" len="med"/>
+                    </a:lnB>
+                    <a:lnTlToBr w="12700" cmpd="sng">
+                      <a:noFill/>
+                      <a:prstDash val="solid"/>
+                    </a:lnTlToBr>
+                    <a:lnBlToTr w="12700" cmpd="sng">
+                      <a:noFill/>
+                      <a:prstDash val="solid"/>
+                    </a:lnBlToTr>
+                    <a:noFill/>
+                  </a:tcPr>
+                </a:tc>
+                <a:extLst>
+                  <a:ext uri="{0D108BD9-81ED-4DB2-BD59-A6C34878D82A}">
+                    <a16:rowId xmlns:a16="http://schemas.microsoft.com/office/drawing/2014/main" val="3655643733"/>
+                  </a:ext>
+                </a:extLst>
+              </a:tr>
+              <a:tr h="857250">
+                <a:tc>
+                  <a:txBody>
+                    <a:bodyPr/>
+                    <a:lstStyle/>
+                    <a:p>
+                      <a:endParaRPr lang="en-GB"/>
+                    </a:p>
+                  </a:txBody>
+                  <a:tcPr>
+                    <a:lnL w="12700" cmpd="sng">
+                      <a:noFill/>
+                    </a:lnL>
+                    <a:lnR w="12700" cap="flat" cmpd="sng" algn="ctr">
+                      <a:solidFill>
+                        <a:schemeClr val="tx1"/>
+                      </a:solidFill>
+                      <a:prstDash val="solid"/>
+                      <a:round/>
+                      <a:headEnd type="none" w="med" len="med"/>
+                      <a:tailEnd type="none" w="med" len="med"/>
+                    </a:lnR>
+                    <a:lnT w="12700" cap="flat" cmpd="sng" algn="ctr">
+                      <a:noFill/>
+                      <a:prstDash val="solid"/>
+                      <a:round/>
+                      <a:headEnd type="none" w="med" len="med"/>
+                      <a:tailEnd type="none" w="med" len="med"/>
+                    </a:lnT>
+                    <a:lnB w="12700" cap="flat" cmpd="sng" algn="ctr">
+                      <a:noFill/>
+                      <a:prstDash val="solid"/>
+                      <a:round/>
+                      <a:headEnd type="none" w="med" len="med"/>
+                      <a:tailEnd type="none" w="med" len="med"/>
+                    </a:lnB>
+                    <a:lnTlToBr w="12700" cmpd="sng">
+                      <a:noFill/>
+                      <a:prstDash val="solid"/>
+                    </a:lnTlToBr>
+                    <a:lnBlToTr w="12700" cmpd="sng">
+                      <a:noFill/>
+                      <a:prstDash val="solid"/>
+                    </a:lnBlToTr>
+                    <a:noFill/>
+                  </a:tcPr>
+                </a:tc>
+                <a:tc>
+                  <a:txBody>
+                    <a:bodyPr/>
+                    <a:lstStyle/>
+                    <a:p>
+                      <a:endParaRPr lang="en-GB"/>
+                    </a:p>
+                  </a:txBody>
+                  <a:tcPr>
+                    <a:lnL w="12700" cap="flat" cmpd="sng" algn="ctr">
+                      <a:solidFill>
+                        <a:schemeClr val="tx1"/>
+                      </a:solidFill>
+                      <a:prstDash val="solid"/>
+                      <a:round/>
+                      <a:headEnd type="none" w="med" len="med"/>
+                      <a:tailEnd type="none" w="med" len="med"/>
+                    </a:lnL>
+                    <a:lnR w="12700" cap="flat" cmpd="sng" algn="ctr">
+                      <a:solidFill>
+                        <a:schemeClr val="tx1"/>
+                      </a:solidFill>
+                      <a:prstDash val="solid"/>
+                      <a:round/>
+                      <a:headEnd type="none" w="med" len="med"/>
+                      <a:tailEnd type="none" w="med" len="med"/>
+                    </a:lnR>
+                    <a:lnT w="12700" cap="flat" cmpd="sng" algn="ctr">
+                      <a:noFill/>
+                      <a:prstDash val="solid"/>
+                      <a:round/>
+                      <a:headEnd type="none" w="med" len="med"/>
+                      <a:tailEnd type="none" w="med" len="med"/>
+                    </a:lnT>
+                    <a:lnB w="12700" cap="flat" cmpd="sng" algn="ctr">
+                      <a:noFill/>
+                      <a:prstDash val="solid"/>
+                      <a:round/>
+                      <a:headEnd type="none" w="med" len="med"/>
+                      <a:tailEnd type="none" w="med" len="med"/>
+                    </a:lnB>
+                    <a:lnTlToBr w="12700" cmpd="sng">
+                      <a:noFill/>
+                      <a:prstDash val="solid"/>
+                    </a:lnTlToBr>
+                    <a:lnBlToTr w="12700" cmpd="sng">
+                      <a:noFill/>
+                      <a:prstDash val="solid"/>
+                    </a:lnBlToTr>
+                    <a:noFill/>
+                  </a:tcPr>
+                </a:tc>
+                <a:tc>
+                  <a:txBody>
+                    <a:bodyPr/>
+                    <a:lstStyle/>
+                    <a:p>
+                      <a:endParaRPr lang="en-GB"/>
+                    </a:p>
+                  </a:txBody>
+                  <a:tcPr>
+                    <a:lnL w="12700" cap="flat" cmpd="sng" algn="ctr">
+                      <a:solidFill>
+                        <a:schemeClr val="tx1"/>
+                      </a:solidFill>
+                      <a:prstDash val="solid"/>
+                      <a:round/>
+                      <a:headEnd type="none" w="med" len="med"/>
+                      <a:tailEnd type="none" w="med" len="med"/>
+                    </a:lnL>
+                    <a:lnR w="12700" cap="flat" cmpd="sng" algn="ctr">
+                      <a:solidFill>
+                        <a:schemeClr val="tx1"/>
+                      </a:solidFill>
+                      <a:prstDash val="solid"/>
+                      <a:round/>
+                      <a:headEnd type="none" w="med" len="med"/>
+                      <a:tailEnd type="none" w="med" len="med"/>
+                    </a:lnR>
+                    <a:lnT w="12700" cap="flat" cmpd="sng" algn="ctr">
+                      <a:noFill/>
+                      <a:prstDash val="solid"/>
+                      <a:round/>
+                      <a:headEnd type="none" w="med" len="med"/>
+                      <a:tailEnd type="none" w="med" len="med"/>
+                    </a:lnT>
+                    <a:lnB w="12700" cap="flat" cmpd="sng" algn="ctr">
+                      <a:noFill/>
+                      <a:prstDash val="solid"/>
+                      <a:round/>
+                      <a:headEnd type="none" w="med" len="med"/>
+                      <a:tailEnd type="none" w="med" len="med"/>
+                    </a:lnB>
+                    <a:lnTlToBr w="12700" cmpd="sng">
+                      <a:noFill/>
+                      <a:prstDash val="solid"/>
+                    </a:lnTlToBr>
+                    <a:lnBlToTr w="12700" cmpd="sng">
+                      <a:noFill/>
+                      <a:prstDash val="solid"/>
+                    </a:lnBlToTr>
+                    <a:noFill/>
+                  </a:tcPr>
+                </a:tc>
+                <a:tc>
+                  <a:txBody>
+                    <a:bodyPr/>
+                    <a:lstStyle/>
+                    <a:p>
+                      <a:endParaRPr lang="en-GB"/>
+                    </a:p>
+                  </a:txBody>
+                  <a:tcPr>
+                    <a:lnL w="12700" cap="flat" cmpd="sng" algn="ctr">
+                      <a:solidFill>
+                        <a:schemeClr val="tx1"/>
+                      </a:solidFill>
+                      <a:prstDash val="solid"/>
+                      <a:round/>
+                      <a:headEnd type="none" w="med" len="med"/>
+                      <a:tailEnd type="none" w="med" len="med"/>
+                    </a:lnL>
+                    <a:lnR w="12700" cap="flat" cmpd="sng" algn="ctr">
+                      <a:solidFill>
+                        <a:schemeClr val="tx1"/>
+                      </a:solidFill>
+                      <a:prstDash val="solid"/>
+                      <a:round/>
+                      <a:headEnd type="none" w="med" len="med"/>
+                      <a:tailEnd type="none" w="med" len="med"/>
+                    </a:lnR>
+                    <a:lnT w="12700" cap="flat" cmpd="sng" algn="ctr">
+                      <a:noFill/>
+                      <a:prstDash val="solid"/>
+                      <a:round/>
+                      <a:headEnd type="none" w="med" len="med"/>
+                      <a:tailEnd type="none" w="med" len="med"/>
+                    </a:lnT>
+                    <a:lnB w="12700" cap="flat" cmpd="sng" algn="ctr">
+                      <a:noFill/>
+                      <a:prstDash val="solid"/>
+                      <a:round/>
+                      <a:headEnd type="none" w="med" len="med"/>
+                      <a:tailEnd type="none" w="med" len="med"/>
+                    </a:lnB>
+                    <a:lnTlToBr w="12700" cmpd="sng">
+                      <a:noFill/>
+                      <a:prstDash val="solid"/>
+                    </a:lnTlToBr>
+                    <a:lnBlToTr w="12700" cmpd="sng">
+                      <a:noFill/>
+                      <a:prstDash val="solid"/>
+                    </a:lnBlToTr>
+                    <a:noFill/>
+                  </a:tcPr>
+                </a:tc>
+                <a:tc>
+                  <a:txBody>
+                    <a:bodyPr/>
+                    <a:lstStyle/>
+                    <a:p>
+                      <a:endParaRPr lang="en-GB" dirty="0"/>
+                    </a:p>
+                  </a:txBody>
+                  <a:tcPr>
+                    <a:lnL w="12700" cap="flat" cmpd="sng" algn="ctr">
+                      <a:solidFill>
+                        <a:schemeClr val="tx1"/>
+                      </a:solidFill>
+                      <a:prstDash val="solid"/>
+                      <a:round/>
+                      <a:headEnd type="none" w="med" len="med"/>
+                      <a:tailEnd type="none" w="med" len="med"/>
+                    </a:lnL>
+                    <a:lnR w="12700" cap="flat" cmpd="sng" algn="ctr">
+                      <a:solidFill>
+                        <a:schemeClr val="tx1"/>
+                      </a:solidFill>
+                      <a:prstDash val="solid"/>
+                      <a:round/>
+                      <a:headEnd type="none" w="med" len="med"/>
+                      <a:tailEnd type="none" w="med" len="med"/>
+                    </a:lnR>
+                    <a:lnT w="12700" cap="flat" cmpd="sng" algn="ctr">
+                      <a:noFill/>
+                      <a:prstDash val="solid"/>
+                      <a:round/>
+                      <a:headEnd type="none" w="med" len="med"/>
+                      <a:tailEnd type="none" w="med" len="med"/>
+                    </a:lnT>
+                    <a:lnB w="12700" cap="flat" cmpd="sng" algn="ctr">
+                      <a:noFill/>
+                      <a:prstDash val="solid"/>
+                      <a:round/>
+                      <a:headEnd type="none" w="med" len="med"/>
+                      <a:tailEnd type="none" w="med" len="med"/>
+                    </a:lnB>
+                    <a:lnTlToBr w="12700" cmpd="sng">
+                      <a:noFill/>
+                      <a:prstDash val="solid"/>
+                    </a:lnTlToBr>
+                    <a:lnBlToTr w="12700" cmpd="sng">
+                      <a:noFill/>
+                      <a:prstDash val="solid"/>
+                    </a:lnBlToTr>
+                    <a:noFill/>
+                  </a:tcPr>
+                </a:tc>
+                <a:tc>
+                  <a:txBody>
+                    <a:bodyPr/>
+                    <a:lstStyle/>
+                    <a:p>
+                      <a:endParaRPr lang="en-GB"/>
+                    </a:p>
+                  </a:txBody>
+                  <a:tcPr>
+                    <a:lnL w="12700" cap="flat" cmpd="sng" algn="ctr">
+                      <a:solidFill>
+                        <a:schemeClr val="tx1"/>
+                      </a:solidFill>
+                      <a:prstDash val="solid"/>
+                      <a:round/>
+                      <a:headEnd type="none" w="med" len="med"/>
+                      <a:tailEnd type="none" w="med" len="med"/>
+                    </a:lnL>
+                    <a:lnR w="12700" cmpd="sng">
+                      <a:noFill/>
+                    </a:lnR>
+                    <a:lnT w="12700" cap="flat" cmpd="sng" algn="ctr">
+                      <a:noFill/>
+                      <a:prstDash val="solid"/>
+                      <a:round/>
+                      <a:headEnd type="none" w="med" len="med"/>
+                      <a:tailEnd type="none" w="med" len="med"/>
+                    </a:lnT>
+                    <a:lnB w="12700" cap="flat" cmpd="sng" algn="ctr">
+                      <a:noFill/>
+                      <a:prstDash val="solid"/>
+                      <a:round/>
+                      <a:headEnd type="none" w="med" len="med"/>
+                      <a:tailEnd type="none" w="med" len="med"/>
+                    </a:lnB>
+                    <a:lnTlToBr w="12700" cmpd="sng">
+                      <a:noFill/>
+                      <a:prstDash val="solid"/>
+                    </a:lnTlToBr>
+                    <a:lnBlToTr w="12700" cmpd="sng">
+                      <a:noFill/>
+                      <a:prstDash val="solid"/>
+                    </a:lnBlToTr>
+                    <a:noFill/>
+                  </a:tcPr>
+                </a:tc>
+                <a:extLst>
+                  <a:ext uri="{0D108BD9-81ED-4DB2-BD59-A6C34878D82A}">
+                    <a16:rowId xmlns:a16="http://schemas.microsoft.com/office/drawing/2014/main" val="1664904004"/>
+                  </a:ext>
+                </a:extLst>
+              </a:tr>
+              <a:tr h="857250">
+                <a:tc>
+                  <a:txBody>
+                    <a:bodyPr/>
+                    <a:lstStyle/>
+                    <a:p>
+                      <a:endParaRPr lang="en-GB"/>
+                    </a:p>
+                  </a:txBody>
+                  <a:tcPr>
+                    <a:lnL w="12700" cmpd="sng">
+                      <a:noFill/>
+                    </a:lnL>
+                    <a:lnR w="12700" cap="flat" cmpd="sng" algn="ctr">
+                      <a:solidFill>
+                        <a:schemeClr val="tx1"/>
+                      </a:solidFill>
+                      <a:prstDash val="solid"/>
+                      <a:round/>
+                      <a:headEnd type="none" w="med" len="med"/>
+                      <a:tailEnd type="none" w="med" len="med"/>
+                    </a:lnR>
+                    <a:lnT w="12700" cap="flat" cmpd="sng" algn="ctr">
+                      <a:noFill/>
+                      <a:prstDash val="solid"/>
+                      <a:round/>
+                      <a:headEnd type="none" w="med" len="med"/>
+                      <a:tailEnd type="none" w="med" len="med"/>
+                    </a:lnT>
+                    <a:lnB w="12700" cap="flat" cmpd="sng" algn="ctr">
+                      <a:noFill/>
+                      <a:prstDash val="solid"/>
+                      <a:round/>
+                      <a:headEnd type="none" w="med" len="med"/>
+                      <a:tailEnd type="none" w="med" len="med"/>
+                    </a:lnB>
+                    <a:lnTlToBr w="12700" cmpd="sng">
+                      <a:noFill/>
+                      <a:prstDash val="solid"/>
+                    </a:lnTlToBr>
+                    <a:lnBlToTr w="12700" cmpd="sng">
+                      <a:noFill/>
+                      <a:prstDash val="solid"/>
+                    </a:lnBlToTr>
+                    <a:noFill/>
+                  </a:tcPr>
+                </a:tc>
+                <a:tc>
+                  <a:txBody>
+                    <a:bodyPr/>
+                    <a:lstStyle/>
+                    <a:p>
+                      <a:endParaRPr lang="en-GB"/>
+                    </a:p>
+                  </a:txBody>
+                  <a:tcPr>
+                    <a:lnL w="12700" cap="flat" cmpd="sng" algn="ctr">
+                      <a:solidFill>
+                        <a:schemeClr val="tx1"/>
+                      </a:solidFill>
+                      <a:prstDash val="solid"/>
+                      <a:round/>
+                      <a:headEnd type="none" w="med" len="med"/>
+                      <a:tailEnd type="none" w="med" len="med"/>
+                    </a:lnL>
+                    <a:lnR w="12700" cap="flat" cmpd="sng" algn="ctr">
+                      <a:solidFill>
+                        <a:schemeClr val="tx1"/>
+                      </a:solidFill>
+                      <a:prstDash val="solid"/>
+                      <a:round/>
+                      <a:headEnd type="none" w="med" len="med"/>
+                      <a:tailEnd type="none" w="med" len="med"/>
+                    </a:lnR>
+                    <a:lnT w="12700" cap="flat" cmpd="sng" algn="ctr">
+                      <a:noFill/>
+                      <a:prstDash val="solid"/>
+                      <a:round/>
+                      <a:headEnd type="none" w="med" len="med"/>
+                      <a:tailEnd type="none" w="med" len="med"/>
+                    </a:lnT>
+                    <a:lnB w="12700" cap="flat" cmpd="sng" algn="ctr">
+                      <a:noFill/>
+                      <a:prstDash val="solid"/>
+                      <a:round/>
+                      <a:headEnd type="none" w="med" len="med"/>
+                      <a:tailEnd type="none" w="med" len="med"/>
+                    </a:lnB>
+                    <a:lnTlToBr w="12700" cmpd="sng">
+                      <a:noFill/>
+                      <a:prstDash val="solid"/>
+                    </a:lnTlToBr>
+                    <a:lnBlToTr w="12700" cmpd="sng">
+                      <a:noFill/>
+                      <a:prstDash val="solid"/>
+                    </a:lnBlToTr>
+                    <a:noFill/>
+                  </a:tcPr>
+                </a:tc>
+                <a:tc>
+                  <a:txBody>
+                    <a:bodyPr/>
+                    <a:lstStyle/>
+                    <a:p>
+                      <a:endParaRPr lang="en-GB"/>
+                    </a:p>
+                  </a:txBody>
+                  <a:tcPr>
+                    <a:lnL w="12700" cap="flat" cmpd="sng" algn="ctr">
+                      <a:solidFill>
+                        <a:schemeClr val="tx1"/>
+                      </a:solidFill>
+                      <a:prstDash val="solid"/>
+                      <a:round/>
+                      <a:headEnd type="none" w="med" len="med"/>
+                      <a:tailEnd type="none" w="med" len="med"/>
+                    </a:lnL>
+                    <a:lnR w="12700" cap="flat" cmpd="sng" algn="ctr">
+                      <a:solidFill>
+                        <a:schemeClr val="tx1"/>
+                      </a:solidFill>
+                      <a:prstDash val="solid"/>
+                      <a:round/>
+                      <a:headEnd type="none" w="med" len="med"/>
+                      <a:tailEnd type="none" w="med" len="med"/>
+                    </a:lnR>
+                    <a:lnT w="12700" cap="flat" cmpd="sng" algn="ctr">
+                      <a:noFill/>
+                      <a:prstDash val="solid"/>
+                      <a:round/>
+                      <a:headEnd type="none" w="med" len="med"/>
+                      <a:tailEnd type="none" w="med" len="med"/>
+                    </a:lnT>
+                    <a:lnB w="12700" cap="flat" cmpd="sng" algn="ctr">
+                      <a:noFill/>
+                      <a:prstDash val="solid"/>
+                      <a:round/>
+                      <a:headEnd type="none" w="med" len="med"/>
+                      <a:tailEnd type="none" w="med" len="med"/>
+                    </a:lnB>
+                    <a:lnTlToBr w="12700" cmpd="sng">
+                      <a:noFill/>
+                      <a:prstDash val="solid"/>
+                    </a:lnTlToBr>
+                    <a:lnBlToTr w="12700" cmpd="sng">
+                      <a:noFill/>
+                      <a:prstDash val="solid"/>
+                    </a:lnBlToTr>
+                    <a:noFill/>
+                  </a:tcPr>
+                </a:tc>
+                <a:tc>
+                  <a:txBody>
+                    <a:bodyPr/>
+                    <a:lstStyle/>
+                    <a:p>
+                      <a:endParaRPr lang="en-GB"/>
+                    </a:p>
+                  </a:txBody>
+                  <a:tcPr>
+                    <a:lnL w="12700" cap="flat" cmpd="sng" algn="ctr">
+                      <a:solidFill>
+                        <a:schemeClr val="tx1"/>
+                      </a:solidFill>
+                      <a:prstDash val="solid"/>
+                      <a:round/>
+                      <a:headEnd type="none" w="med" len="med"/>
+                      <a:tailEnd type="none" w="med" len="med"/>
+                    </a:lnL>
+                    <a:lnR w="12700" cap="flat" cmpd="sng" algn="ctr">
+                      <a:solidFill>
+                        <a:schemeClr val="tx1"/>
+                      </a:solidFill>
+                      <a:prstDash val="solid"/>
+                      <a:round/>
+                      <a:headEnd type="none" w="med" len="med"/>
+                      <a:tailEnd type="none" w="med" len="med"/>
+                    </a:lnR>
+                    <a:lnT w="12700" cap="flat" cmpd="sng" algn="ctr">
+                      <a:noFill/>
+                      <a:prstDash val="solid"/>
+                      <a:round/>
+                      <a:headEnd type="none" w="med" len="med"/>
+                      <a:tailEnd type="none" w="med" len="med"/>
+                    </a:lnT>
+                    <a:lnB w="12700" cap="flat" cmpd="sng" algn="ctr">
+                      <a:noFill/>
+                      <a:prstDash val="solid"/>
+                      <a:round/>
+                      <a:headEnd type="none" w="med" len="med"/>
+                      <a:tailEnd type="none" w="med" len="med"/>
+                    </a:lnB>
+                    <a:lnTlToBr w="12700" cmpd="sng">
+                      <a:noFill/>
+                      <a:prstDash val="solid"/>
+                    </a:lnTlToBr>
+                    <a:lnBlToTr w="12700" cmpd="sng">
+                      <a:noFill/>
+                      <a:prstDash val="solid"/>
+                    </a:lnBlToTr>
+                    <a:noFill/>
+                  </a:tcPr>
+                </a:tc>
+                <a:tc>
+                  <a:txBody>
+                    <a:bodyPr/>
+                    <a:lstStyle/>
+                    <a:p>
+                      <a:endParaRPr lang="en-GB" dirty="0"/>
+                    </a:p>
+                  </a:txBody>
+                  <a:tcPr>
+                    <a:lnL w="12700" cap="flat" cmpd="sng" algn="ctr">
+                      <a:solidFill>
+                        <a:schemeClr val="tx1"/>
+                      </a:solidFill>
+                      <a:prstDash val="solid"/>
+                      <a:round/>
+                      <a:headEnd type="none" w="med" len="med"/>
+                      <a:tailEnd type="none" w="med" len="med"/>
+                    </a:lnL>
+                    <a:lnR w="12700" cap="flat" cmpd="sng" algn="ctr">
+                      <a:solidFill>
+                        <a:schemeClr val="tx1"/>
+                      </a:solidFill>
+                      <a:prstDash val="solid"/>
+                      <a:round/>
+                      <a:headEnd type="none" w="med" len="med"/>
+                      <a:tailEnd type="none" w="med" len="med"/>
+                    </a:lnR>
+                    <a:lnT w="12700" cap="flat" cmpd="sng" algn="ctr">
+                      <a:noFill/>
+                      <a:prstDash val="solid"/>
+                      <a:round/>
+                      <a:headEnd type="none" w="med" len="med"/>
+                      <a:tailEnd type="none" w="med" len="med"/>
+                    </a:lnT>
+                    <a:lnB w="12700" cap="flat" cmpd="sng" algn="ctr">
+                      <a:noFill/>
+                      <a:prstDash val="solid"/>
+                      <a:round/>
+                      <a:headEnd type="none" w="med" len="med"/>
+                      <a:tailEnd type="none" w="med" len="med"/>
+                    </a:lnB>
+                    <a:lnTlToBr w="12700" cmpd="sng">
+                      <a:noFill/>
+                      <a:prstDash val="solid"/>
+                    </a:lnTlToBr>
+                    <a:lnBlToTr w="12700" cmpd="sng">
+                      <a:noFill/>
+                      <a:prstDash val="solid"/>
+                    </a:lnBlToTr>
+                    <a:noFill/>
+                  </a:tcPr>
+                </a:tc>
+                <a:tc>
+                  <a:txBody>
+                    <a:bodyPr/>
+                    <a:lstStyle/>
+                    <a:p>
+                      <a:endParaRPr lang="en-GB" dirty="0"/>
+                    </a:p>
+                  </a:txBody>
+                  <a:tcPr>
+                    <a:lnL w="12700" cap="flat" cmpd="sng" algn="ctr">
+                      <a:solidFill>
+                        <a:schemeClr val="tx1"/>
+                      </a:solidFill>
+                      <a:prstDash val="solid"/>
+                      <a:round/>
+                      <a:headEnd type="none" w="med" len="med"/>
+                      <a:tailEnd type="none" w="med" len="med"/>
+                    </a:lnL>
+                    <a:lnR w="12700" cmpd="sng">
+                      <a:noFill/>
+                    </a:lnR>
+                    <a:lnT w="12700" cap="flat" cmpd="sng" algn="ctr">
+                      <a:noFill/>
+                      <a:prstDash val="solid"/>
+                      <a:round/>
+                      <a:headEnd type="none" w="med" len="med"/>
+                      <a:tailEnd type="none" w="med" len="med"/>
+                    </a:lnT>
+                    <a:lnB w="12700" cap="flat" cmpd="sng" algn="ctr">
+                      <a:noFill/>
+                      <a:prstDash val="solid"/>
+                      <a:round/>
+                      <a:headEnd type="none" w="med" len="med"/>
+                      <a:tailEnd type="none" w="med" len="med"/>
+                    </a:lnB>
+                    <a:lnTlToBr w="12700" cmpd="sng">
+                      <a:noFill/>
+                      <a:prstDash val="solid"/>
+                    </a:lnTlToBr>
+                    <a:lnBlToTr w="12700" cmpd="sng">
+                      <a:noFill/>
+                      <a:prstDash val="solid"/>
+                    </a:lnBlToTr>
+                    <a:noFill/>
+                  </a:tcPr>
+                </a:tc>
+                <a:extLst>
+                  <a:ext uri="{0D108BD9-81ED-4DB2-BD59-A6C34878D82A}">
+                    <a16:rowId xmlns:a16="http://schemas.microsoft.com/office/drawing/2014/main" val="2890536790"/>
+                  </a:ext>
+                </a:extLst>
+              </a:tr>
+              <a:tr h="857250">
+                <a:tc>
+                  <a:txBody>
+                    <a:bodyPr/>
+                    <a:lstStyle/>
+                    <a:p>
+                      <a:endParaRPr lang="en-GB"/>
+                    </a:p>
+                  </a:txBody>
+                  <a:tcPr>
+                    <a:lnL w="12700" cmpd="sng">
+                      <a:noFill/>
+                    </a:lnL>
+                    <a:lnR w="12700" cap="flat" cmpd="sng" algn="ctr">
+                      <a:solidFill>
+                        <a:schemeClr val="tx1"/>
+                      </a:solidFill>
+                      <a:prstDash val="solid"/>
+                      <a:round/>
+                      <a:headEnd type="none" w="med" len="med"/>
+                      <a:tailEnd type="none" w="med" len="med"/>
+                    </a:lnR>
+                    <a:lnT w="12700" cap="flat" cmpd="sng" algn="ctr">
+                      <a:noFill/>
+                      <a:prstDash val="solid"/>
+                      <a:round/>
+                      <a:headEnd type="none" w="med" len="med"/>
+                      <a:tailEnd type="none" w="med" len="med"/>
+                    </a:lnT>
+                    <a:lnB w="12700" cap="flat" cmpd="sng" algn="ctr">
+                      <a:noFill/>
+                      <a:prstDash val="solid"/>
+                      <a:round/>
+                      <a:headEnd type="none" w="med" len="med"/>
+                      <a:tailEnd type="none" w="med" len="med"/>
+                    </a:lnB>
+                    <a:lnTlToBr w="12700" cmpd="sng">
+                      <a:noFill/>
+                      <a:prstDash val="solid"/>
+                    </a:lnTlToBr>
+                    <a:lnBlToTr w="12700" cmpd="sng">
+                      <a:noFill/>
+                      <a:prstDash val="solid"/>
+                    </a:lnBlToTr>
+                    <a:noFill/>
+                  </a:tcPr>
+                </a:tc>
+                <a:tc>
+                  <a:txBody>
+                    <a:bodyPr/>
+                    <a:lstStyle/>
+                    <a:p>
+                      <a:endParaRPr lang="en-GB"/>
+                    </a:p>
+                  </a:txBody>
+                  <a:tcPr>
+                    <a:lnL w="12700" cap="flat" cmpd="sng" algn="ctr">
+                      <a:solidFill>
+                        <a:schemeClr val="tx1"/>
+                      </a:solidFill>
+                      <a:prstDash val="solid"/>
+                      <a:round/>
+                      <a:headEnd type="none" w="med" len="med"/>
+                      <a:tailEnd type="none" w="med" len="med"/>
+                    </a:lnL>
+                    <a:lnR w="12700" cap="flat" cmpd="sng" algn="ctr">
+                      <a:solidFill>
+                        <a:schemeClr val="tx1"/>
+                      </a:solidFill>
+                      <a:prstDash val="solid"/>
+                      <a:round/>
+                      <a:headEnd type="none" w="med" len="med"/>
+                      <a:tailEnd type="none" w="med" len="med"/>
+                    </a:lnR>
+                    <a:lnT w="12700" cap="flat" cmpd="sng" algn="ctr">
+                      <a:noFill/>
+                      <a:prstDash val="solid"/>
+                      <a:round/>
+                      <a:headEnd type="none" w="med" len="med"/>
+                      <a:tailEnd type="none" w="med" len="med"/>
+                    </a:lnT>
+                    <a:lnB w="12700" cap="flat" cmpd="sng" algn="ctr">
+                      <a:noFill/>
+                      <a:prstDash val="solid"/>
+                      <a:round/>
+                      <a:headEnd type="none" w="med" len="med"/>
+                      <a:tailEnd type="none" w="med" len="med"/>
+                    </a:lnB>
+                    <a:lnTlToBr w="12700" cmpd="sng">
+                      <a:noFill/>
+                      <a:prstDash val="solid"/>
+                    </a:lnTlToBr>
+                    <a:lnBlToTr w="12700" cmpd="sng">
+                      <a:noFill/>
+                      <a:prstDash val="solid"/>
+                    </a:lnBlToTr>
+                    <a:noFill/>
+                  </a:tcPr>
+                </a:tc>
+                <a:tc>
+                  <a:txBody>
+                    <a:bodyPr/>
+                    <a:lstStyle/>
+                    <a:p>
+                      <a:endParaRPr lang="en-GB" dirty="0"/>
+                    </a:p>
+                  </a:txBody>
+                  <a:tcPr>
+                    <a:lnL w="12700" cap="flat" cmpd="sng" algn="ctr">
+                      <a:solidFill>
+                        <a:schemeClr val="tx1"/>
+                      </a:solidFill>
+                      <a:prstDash val="solid"/>
+                      <a:round/>
+                      <a:headEnd type="none" w="med" len="med"/>
+                      <a:tailEnd type="none" w="med" len="med"/>
+                    </a:lnL>
+                    <a:lnR w="12700" cap="flat" cmpd="sng" algn="ctr">
+                      <a:solidFill>
+                        <a:schemeClr val="tx1"/>
+                      </a:solidFill>
+                      <a:prstDash val="solid"/>
+                      <a:round/>
+                      <a:headEnd type="none" w="med" len="med"/>
+                      <a:tailEnd type="none" w="med" len="med"/>
+                    </a:lnR>
+                    <a:lnT w="12700" cap="flat" cmpd="sng" algn="ctr">
+                      <a:noFill/>
+                      <a:prstDash val="solid"/>
+                      <a:round/>
+                      <a:headEnd type="none" w="med" len="med"/>
+                      <a:tailEnd type="none" w="med" len="med"/>
+                    </a:lnT>
+                    <a:lnB w="12700" cap="flat" cmpd="sng" algn="ctr">
+                      <a:noFill/>
+                      <a:prstDash val="solid"/>
+                      <a:round/>
+                      <a:headEnd type="none" w="med" len="med"/>
+                      <a:tailEnd type="none" w="med" len="med"/>
+                    </a:lnB>
+                    <a:lnTlToBr w="12700" cmpd="sng">
+                      <a:noFill/>
+                      <a:prstDash val="solid"/>
+                    </a:lnTlToBr>
+                    <a:lnBlToTr w="12700" cmpd="sng">
+                      <a:noFill/>
+                      <a:prstDash val="solid"/>
+                    </a:lnBlToTr>
+                    <a:noFill/>
+                  </a:tcPr>
+                </a:tc>
+                <a:tc>
+                  <a:txBody>
+                    <a:bodyPr/>
+                    <a:lstStyle/>
+                    <a:p>
+                      <a:endParaRPr lang="en-GB" dirty="0"/>
+                    </a:p>
+                  </a:txBody>
+                  <a:tcPr>
+                    <a:lnL w="12700" cap="flat" cmpd="sng" algn="ctr">
+                      <a:solidFill>
+                        <a:schemeClr val="tx1"/>
+                      </a:solidFill>
+                      <a:prstDash val="solid"/>
+                      <a:round/>
+                      <a:headEnd type="none" w="med" len="med"/>
+                      <a:tailEnd type="none" w="med" len="med"/>
+                    </a:lnL>
+                    <a:lnR w="12700" cap="flat" cmpd="sng" algn="ctr">
+                      <a:solidFill>
+                        <a:schemeClr val="tx1"/>
+                      </a:solidFill>
+                      <a:prstDash val="solid"/>
+                      <a:round/>
+                      <a:headEnd type="none" w="med" len="med"/>
+                      <a:tailEnd type="none" w="med" len="med"/>
+                    </a:lnR>
+                    <a:lnT w="12700" cap="flat" cmpd="sng" algn="ctr">
+                      <a:noFill/>
+                      <a:prstDash val="solid"/>
+                      <a:round/>
+                      <a:headEnd type="none" w="med" len="med"/>
+                      <a:tailEnd type="none" w="med" len="med"/>
+                    </a:lnT>
+                    <a:lnB w="12700" cap="flat" cmpd="sng" algn="ctr">
+                      <a:noFill/>
+                      <a:prstDash val="solid"/>
+                      <a:round/>
+                      <a:headEnd type="none" w="med" len="med"/>
+                      <a:tailEnd type="none" w="med" len="med"/>
+                    </a:lnB>
+                    <a:lnTlToBr w="12700" cmpd="sng">
+                      <a:noFill/>
+                      <a:prstDash val="solid"/>
+                    </a:lnTlToBr>
+                    <a:lnBlToTr w="12700" cmpd="sng">
+                      <a:noFill/>
+                      <a:prstDash val="solid"/>
+                    </a:lnBlToTr>
+                    <a:noFill/>
+                  </a:tcPr>
+                </a:tc>
+                <a:tc>
+                  <a:txBody>
+                    <a:bodyPr/>
+                    <a:lstStyle/>
+                    <a:p>
+                      <a:endParaRPr lang="en-GB" dirty="0"/>
+                    </a:p>
+                  </a:txBody>
+                  <a:tcPr>
+                    <a:lnL w="12700" cap="flat" cmpd="sng" algn="ctr">
+                      <a:solidFill>
+                        <a:schemeClr val="tx1"/>
+                      </a:solidFill>
+                      <a:prstDash val="solid"/>
+                      <a:round/>
+                      <a:headEnd type="none" w="med" len="med"/>
+                      <a:tailEnd type="none" w="med" len="med"/>
+                    </a:lnL>
+                    <a:lnR w="12700" cap="flat" cmpd="sng" algn="ctr">
+                      <a:solidFill>
+                        <a:schemeClr val="tx1"/>
+                      </a:solidFill>
+                      <a:prstDash val="solid"/>
+                      <a:round/>
+                      <a:headEnd type="none" w="med" len="med"/>
+                      <a:tailEnd type="none" w="med" len="med"/>
+                    </a:lnR>
+                    <a:lnT w="12700" cap="flat" cmpd="sng" algn="ctr">
+                      <a:noFill/>
+                      <a:prstDash val="solid"/>
+                      <a:round/>
+                      <a:headEnd type="none" w="med" len="med"/>
+                      <a:tailEnd type="none" w="med" len="med"/>
+                    </a:lnT>
+                    <a:lnB w="12700" cap="flat" cmpd="sng" algn="ctr">
+                      <a:noFill/>
+                      <a:prstDash val="solid"/>
+                      <a:round/>
+                      <a:headEnd type="none" w="med" len="med"/>
+                      <a:tailEnd type="none" w="med" len="med"/>
+                    </a:lnB>
+                    <a:lnTlToBr w="12700" cmpd="sng">
+                      <a:noFill/>
+                      <a:prstDash val="solid"/>
+                    </a:lnTlToBr>
+                    <a:lnBlToTr w="12700" cmpd="sng">
+                      <a:noFill/>
+                      <a:prstDash val="solid"/>
+                    </a:lnBlToTr>
+                    <a:noFill/>
+                  </a:tcPr>
+                </a:tc>
+                <a:tc>
+                  <a:txBody>
+                    <a:bodyPr/>
+                    <a:lstStyle/>
+                    <a:p>
+                      <a:endParaRPr lang="en-GB" dirty="0"/>
+                    </a:p>
+                  </a:txBody>
+                  <a:tcPr>
+                    <a:lnL w="12700" cap="flat" cmpd="sng" algn="ctr">
+                      <a:solidFill>
+                        <a:schemeClr val="tx1"/>
+                      </a:solidFill>
+                      <a:prstDash val="solid"/>
+                      <a:round/>
+                      <a:headEnd type="none" w="med" len="med"/>
+                      <a:tailEnd type="none" w="med" len="med"/>
+                    </a:lnL>
+                    <a:lnR w="12700" cmpd="sng">
+                      <a:noFill/>
+                    </a:lnR>
+                    <a:lnT w="12700" cap="flat" cmpd="sng" algn="ctr">
+                      <a:noFill/>
+                      <a:prstDash val="solid"/>
+                      <a:round/>
+                      <a:headEnd type="none" w="med" len="med"/>
+                      <a:tailEnd type="none" w="med" len="med"/>
+                    </a:lnT>
+                    <a:lnB w="12700" cap="flat" cmpd="sng" algn="ctr">
+                      <a:noFill/>
+                      <a:prstDash val="solid"/>
+                      <a:round/>
+                      <a:headEnd type="none" w="med" len="med"/>
+                      <a:tailEnd type="none" w="med" len="med"/>
+                    </a:lnB>
+                    <a:lnTlToBr w="12700" cmpd="sng">
+                      <a:noFill/>
+                      <a:prstDash val="solid"/>
+                    </a:lnTlToBr>
+                    <a:lnBlToTr w="12700" cmpd="sng">
+                      <a:noFill/>
+                      <a:prstDash val="solid"/>
+                    </a:lnBlToTr>
+                    <a:noFill/>
+                  </a:tcPr>
+                </a:tc>
+                <a:extLst>
+                  <a:ext uri="{0D108BD9-81ED-4DB2-BD59-A6C34878D82A}">
+                    <a16:rowId xmlns:a16="http://schemas.microsoft.com/office/drawing/2014/main" val="1242435451"/>
+                  </a:ext>
+                </a:extLst>
+              </a:tr>
+              <a:tr h="857250">
+                <a:tc>
+                  <a:txBody>
+                    <a:bodyPr/>
+                    <a:lstStyle/>
+                    <a:p>
+                      <a:endParaRPr lang="en-GB"/>
+                    </a:p>
+                  </a:txBody>
+                  <a:tcPr>
+                    <a:lnL w="12700" cmpd="sng">
+                      <a:noFill/>
+                    </a:lnL>
+                    <a:lnR w="12700" cap="flat" cmpd="sng" algn="ctr">
+                      <a:solidFill>
+                        <a:schemeClr val="tx1"/>
+                      </a:solidFill>
+                      <a:prstDash val="solid"/>
+                      <a:round/>
+                      <a:headEnd type="none" w="med" len="med"/>
+                      <a:tailEnd type="none" w="med" len="med"/>
+                    </a:lnR>
+                    <a:lnT w="12700" cap="flat" cmpd="sng" algn="ctr">
+                      <a:noFill/>
+                      <a:prstDash val="solid"/>
+                      <a:round/>
+                      <a:headEnd type="none" w="med" len="med"/>
+                      <a:tailEnd type="none" w="med" len="med"/>
+                    </a:lnT>
+                    <a:lnB w="12700" cmpd="sng">
+                      <a:noFill/>
+                    </a:lnB>
+                    <a:lnTlToBr w="12700" cmpd="sng">
+                      <a:noFill/>
+                      <a:prstDash val="solid"/>
+                    </a:lnTlToBr>
+                    <a:lnBlToTr w="12700" cmpd="sng">
+                      <a:noFill/>
+                      <a:prstDash val="solid"/>
+                    </a:lnBlToTr>
+                    <a:noFill/>
+                  </a:tcPr>
+                </a:tc>
+                <a:tc>
+                  <a:txBody>
+                    <a:bodyPr/>
+                    <a:lstStyle/>
+                    <a:p>
+                      <a:endParaRPr lang="en-GB"/>
+                    </a:p>
+                  </a:txBody>
+                  <a:tcPr>
+                    <a:lnL w="12700" cap="flat" cmpd="sng" algn="ctr">
+                      <a:solidFill>
+                        <a:schemeClr val="tx1"/>
+                      </a:solidFill>
+                      <a:prstDash val="solid"/>
+                      <a:round/>
+                      <a:headEnd type="none" w="med" len="med"/>
+                      <a:tailEnd type="none" w="med" len="med"/>
+                    </a:lnL>
+                    <a:lnR w="12700" cap="flat" cmpd="sng" algn="ctr">
+                      <a:solidFill>
+                        <a:schemeClr val="tx1"/>
+                      </a:solidFill>
+                      <a:prstDash val="solid"/>
+                      <a:round/>
+                      <a:headEnd type="none" w="med" len="med"/>
+                      <a:tailEnd type="none" w="med" len="med"/>
+                    </a:lnR>
+                    <a:lnT w="12700" cap="flat" cmpd="sng" algn="ctr">
+                      <a:noFill/>
+                      <a:prstDash val="solid"/>
+                      <a:round/>
+                      <a:headEnd type="none" w="med" len="med"/>
+                      <a:tailEnd type="none" w="med" len="med"/>
+                    </a:lnT>
+                    <a:lnB w="12700" cmpd="sng">
+                      <a:noFill/>
+                    </a:lnB>
+                    <a:lnTlToBr w="12700" cmpd="sng">
+                      <a:noFill/>
+                      <a:prstDash val="solid"/>
+                    </a:lnTlToBr>
+                    <a:lnBlToTr w="12700" cmpd="sng">
+                      <a:noFill/>
+                      <a:prstDash val="solid"/>
+                    </a:lnBlToTr>
+                    <a:noFill/>
+                  </a:tcPr>
+                </a:tc>
+                <a:tc>
+                  <a:txBody>
+                    <a:bodyPr/>
+                    <a:lstStyle/>
+                    <a:p>
+                      <a:endParaRPr lang="en-GB"/>
+                    </a:p>
+                  </a:txBody>
+                  <a:tcPr>
+                    <a:lnL w="12700" cap="flat" cmpd="sng" algn="ctr">
+                      <a:solidFill>
+                        <a:schemeClr val="tx1"/>
+                      </a:solidFill>
+                      <a:prstDash val="solid"/>
+                      <a:round/>
+                      <a:headEnd type="none" w="med" len="med"/>
+                      <a:tailEnd type="none" w="med" len="med"/>
+                    </a:lnL>
+                    <a:lnR w="12700" cap="flat" cmpd="sng" algn="ctr">
+                      <a:solidFill>
+                        <a:schemeClr val="tx1"/>
+                      </a:solidFill>
+                      <a:prstDash val="solid"/>
+                      <a:round/>
+                      <a:headEnd type="none" w="med" len="med"/>
+                      <a:tailEnd type="none" w="med" len="med"/>
+                    </a:lnR>
+                    <a:lnT w="12700" cap="flat" cmpd="sng" algn="ctr">
+                      <a:noFill/>
+                      <a:prstDash val="solid"/>
+                      <a:round/>
+                      <a:headEnd type="none" w="med" len="med"/>
+                      <a:tailEnd type="none" w="med" len="med"/>
+                    </a:lnT>
+                    <a:lnB w="12700" cmpd="sng">
+                      <a:noFill/>
+                    </a:lnB>
+                    <a:lnTlToBr w="12700" cmpd="sng">
+                      <a:noFill/>
+                      <a:prstDash val="solid"/>
+                    </a:lnTlToBr>
+                    <a:lnBlToTr w="12700" cmpd="sng">
+                      <a:noFill/>
+                      <a:prstDash val="solid"/>
+                    </a:lnBlToTr>
+                    <a:noFill/>
+                  </a:tcPr>
+                </a:tc>
+                <a:tc>
+                  <a:txBody>
+                    <a:bodyPr/>
+                    <a:lstStyle/>
+                    <a:p>
+                      <a:endParaRPr lang="en-GB"/>
+                    </a:p>
+                  </a:txBody>
+                  <a:tcPr>
+                    <a:lnL w="12700" cap="flat" cmpd="sng" algn="ctr">
+                      <a:solidFill>
+                        <a:schemeClr val="tx1"/>
+                      </a:solidFill>
+                      <a:prstDash val="solid"/>
+                      <a:round/>
+                      <a:headEnd type="none" w="med" len="med"/>
+                      <a:tailEnd type="none" w="med" len="med"/>
+                    </a:lnL>
+                    <a:lnR w="12700" cap="flat" cmpd="sng" algn="ctr">
+                      <a:solidFill>
+                        <a:schemeClr val="tx1"/>
+                      </a:solidFill>
+                      <a:prstDash val="solid"/>
+                      <a:round/>
+                      <a:headEnd type="none" w="med" len="med"/>
+                      <a:tailEnd type="none" w="med" len="med"/>
+                    </a:lnR>
+                    <a:lnT w="12700" cap="flat" cmpd="sng" algn="ctr">
+                      <a:noFill/>
+                      <a:prstDash val="solid"/>
+                      <a:round/>
+                      <a:headEnd type="none" w="med" len="med"/>
+                      <a:tailEnd type="none" w="med" len="med"/>
+                    </a:lnT>
+                    <a:lnB w="12700" cmpd="sng">
+                      <a:noFill/>
+                    </a:lnB>
+                    <a:lnTlToBr w="12700" cmpd="sng">
+                      <a:noFill/>
+                      <a:prstDash val="solid"/>
+                    </a:lnTlToBr>
+                    <a:lnBlToTr w="12700" cmpd="sng">
+                      <a:noFill/>
+                      <a:prstDash val="solid"/>
+                    </a:lnBlToTr>
+                    <a:noFill/>
+                  </a:tcPr>
+                </a:tc>
+                <a:tc>
+                  <a:txBody>
+                    <a:bodyPr/>
+                    <a:lstStyle/>
+                    <a:p>
+                      <a:endParaRPr lang="en-GB"/>
+                    </a:p>
+                  </a:txBody>
+                  <a:tcPr>
+                    <a:lnL w="12700" cap="flat" cmpd="sng" algn="ctr">
+                      <a:solidFill>
+                        <a:schemeClr val="tx1"/>
+                      </a:solidFill>
+                      <a:prstDash val="solid"/>
+                      <a:round/>
+                      <a:headEnd type="none" w="med" len="med"/>
+                      <a:tailEnd type="none" w="med" len="med"/>
+                    </a:lnL>
+                    <a:lnR w="12700" cap="flat" cmpd="sng" algn="ctr">
+                      <a:solidFill>
+                        <a:schemeClr val="tx1"/>
+                      </a:solidFill>
+                      <a:prstDash val="solid"/>
+                      <a:round/>
+                      <a:headEnd type="none" w="med" len="med"/>
+                      <a:tailEnd type="none" w="med" len="med"/>
+                    </a:lnR>
+                    <a:lnT w="12700" cap="flat" cmpd="sng" algn="ctr">
+                      <a:noFill/>
+                      <a:prstDash val="solid"/>
+                      <a:round/>
+                      <a:headEnd type="none" w="med" len="med"/>
+                      <a:tailEnd type="none" w="med" len="med"/>
+                    </a:lnT>
+                    <a:lnB w="12700" cmpd="sng">
+                      <a:noFill/>
+                    </a:lnB>
+                    <a:lnTlToBr w="12700" cmpd="sng">
+                      <a:noFill/>
+                      <a:prstDash val="solid"/>
+                    </a:lnTlToBr>
+                    <a:lnBlToTr w="12700" cmpd="sng">
+                      <a:noFill/>
+                      <a:prstDash val="solid"/>
+                    </a:lnBlToTr>
+                    <a:noFill/>
+                  </a:tcPr>
+                </a:tc>
+                <a:tc>
+                  <a:txBody>
+                    <a:bodyPr/>
+                    <a:lstStyle/>
+                    <a:p>
+                      <a:endParaRPr lang="en-GB" dirty="0"/>
+                    </a:p>
+                  </a:txBody>
+                  <a:tcPr>
+                    <a:lnL w="12700" cap="flat" cmpd="sng" algn="ctr">
+                      <a:solidFill>
+                        <a:schemeClr val="tx1"/>
+                      </a:solidFill>
+                      <a:prstDash val="solid"/>
+                      <a:round/>
+                      <a:headEnd type="none" w="med" len="med"/>
+                      <a:tailEnd type="none" w="med" len="med"/>
+                    </a:lnL>
+                    <a:lnR w="12700" cmpd="sng">
+                      <a:noFill/>
+                    </a:lnR>
+                    <a:lnT w="12700" cap="flat" cmpd="sng" algn="ctr">
+                      <a:noFill/>
+                      <a:prstDash val="solid"/>
+                      <a:round/>
+                      <a:headEnd type="none" w="med" len="med"/>
+                      <a:tailEnd type="none" w="med" len="med"/>
+                    </a:lnT>
+                    <a:lnB w="12700" cmpd="sng">
+                      <a:noFill/>
+                    </a:lnB>
+                    <a:lnTlToBr w="12700" cmpd="sng">
+                      <a:noFill/>
+                      <a:prstDash val="solid"/>
+                    </a:lnTlToBr>
+                    <a:lnBlToTr w="12700" cmpd="sng">
+                      <a:noFill/>
+                      <a:prstDash val="solid"/>
+                    </a:lnBlToTr>
+                    <a:noFill/>
+                  </a:tcPr>
+                </a:tc>
+                <a:extLst>
+                  <a:ext uri="{0D108BD9-81ED-4DB2-BD59-A6C34878D82A}">
+                    <a16:rowId xmlns:a16="http://schemas.microsoft.com/office/drawing/2014/main" val="731754909"/>
+                  </a:ext>
+                </a:extLst>
+              </a:tr>
+            </a:tbl>
+          </a:graphicData>
+        </a:graphic>
+      </p:graphicFrame>
+      <p:sp>
+        <p:nvSpPr>
+          <p:cNvPr id="6" name="Oval 5">
+            <a:extLst>
+              <a:ext uri="{FF2B5EF4-FFF2-40B4-BE49-F238E27FC236}">
+                <a16:creationId xmlns:a16="http://schemas.microsoft.com/office/drawing/2014/main" id="{98941ABA-4178-A59C-5E36-F9696493195A}"/>
+              </a:ext>
+            </a:extLst>
+          </p:cNvPr>
+          <p:cNvSpPr/>
+          <p:nvPr/>
+        </p:nvSpPr>
+        <p:spPr>
+          <a:xfrm>
+            <a:off x="948268" y="2899833"/>
+            <a:ext cx="1075266" cy="1058333"/>
+          </a:xfrm>
+          <a:prstGeom prst="ellipse">
+            <a:avLst/>
+          </a:prstGeom>
+          <a:solidFill>
+            <a:srgbClr val="92D050"/>
+          </a:solidFill>
+          <a:ln>
+            <a:noFill/>
+          </a:ln>
+        </p:spPr>
+        <p:style>
+          <a:lnRef idx="2">
+            <a:schemeClr val="accent1">
+              <a:shade val="15000"/>
+            </a:schemeClr>
+          </a:lnRef>
+          <a:fillRef idx="1">
+            <a:schemeClr val="accent1"/>
+          </a:fillRef>
+          <a:effectRef idx="0">
+            <a:schemeClr val="accent1"/>
+          </a:effectRef>
+          <a:fontRef idx="minor">
+            <a:schemeClr val="lt1"/>
+          </a:fontRef>
+        </p:style>
+        <p:txBody>
+          <a:bodyPr rtlCol="0" anchor="ctr"/>
+          <a:lstStyle/>
+          <a:p>
+            <a:pPr algn="ctr"/>
+            <a:r>
+              <a:rPr lang="en-GB" dirty="0"/>
+              <a:t>START</a:t>
+            </a:r>
+          </a:p>
+        </p:txBody>
+      </p:sp>
+      <p:sp>
+        <p:nvSpPr>
+          <p:cNvPr id="7" name="Star: 5 Points 6">
+            <a:extLst>
+              <a:ext uri="{FF2B5EF4-FFF2-40B4-BE49-F238E27FC236}">
+                <a16:creationId xmlns:a16="http://schemas.microsoft.com/office/drawing/2014/main" id="{4E056291-1300-D42D-981D-C6E3FEB61E06}"/>
+              </a:ext>
+            </a:extLst>
+          </p:cNvPr>
+          <p:cNvSpPr/>
+          <p:nvPr/>
+        </p:nvSpPr>
+        <p:spPr>
+          <a:xfrm>
+            <a:off x="10168467" y="4055533"/>
+            <a:ext cx="914400" cy="914400"/>
+          </a:xfrm>
+          <a:prstGeom prst="star5">
+            <a:avLst/>
+          </a:prstGeom>
+          <a:solidFill>
+            <a:srgbClr val="92D050"/>
+          </a:solidFill>
+          <a:ln>
+            <a:noFill/>
+          </a:ln>
+        </p:spPr>
+        <p:style>
+          <a:lnRef idx="2">
+            <a:schemeClr val="accent1">
+              <a:shade val="15000"/>
+            </a:schemeClr>
+          </a:lnRef>
+          <a:fillRef idx="1">
+            <a:schemeClr val="accent1"/>
+          </a:fillRef>
+          <a:effectRef idx="0">
+            <a:schemeClr val="accent1"/>
+          </a:effectRef>
+          <a:fontRef idx="minor">
+            <a:schemeClr val="lt1"/>
+          </a:fontRef>
+        </p:style>
+        <p:txBody>
+          <a:bodyPr rtlCol="0" anchor="ctr"/>
+          <a:lstStyle/>
+          <a:p>
+            <a:pPr algn="ctr"/>
+            <a:endParaRPr lang="en-GB"/>
+          </a:p>
+        </p:txBody>
+      </p:sp>
+      <p:cxnSp>
+        <p:nvCxnSpPr>
+          <p:cNvPr id="9" name="Straight Connector 8">
+            <a:extLst>
+              <a:ext uri="{FF2B5EF4-FFF2-40B4-BE49-F238E27FC236}">
+                <a16:creationId xmlns:a16="http://schemas.microsoft.com/office/drawing/2014/main" id="{38658415-F92E-2F40-AE6C-5EB600EA721D}"/>
+              </a:ext>
+            </a:extLst>
+          </p:cNvPr>
+          <p:cNvCxnSpPr>
+            <a:cxnSpLocks/>
+          </p:cNvCxnSpPr>
+          <p:nvPr/>
+        </p:nvCxnSpPr>
+        <p:spPr>
+          <a:xfrm flipH="1">
+            <a:off x="2023534" y="1871133"/>
+            <a:ext cx="2040466" cy="1557866"/>
+          </a:xfrm>
+          <a:prstGeom prst="line">
+            <a:avLst/>
+          </a:prstGeom>
+          <a:ln>
+            <a:solidFill>
+              <a:srgbClr val="7030A0"/>
+            </a:solidFill>
+          </a:ln>
+        </p:spPr>
+        <p:style>
+          <a:lnRef idx="1">
+            <a:schemeClr val="accent1"/>
+          </a:lnRef>
+          <a:fillRef idx="0">
+            <a:schemeClr val="accent1"/>
+          </a:fillRef>
+          <a:effectRef idx="0">
+            <a:schemeClr val="accent1"/>
+          </a:effectRef>
+          <a:fontRef idx="minor">
+            <a:schemeClr val="tx1"/>
+          </a:fontRef>
+        </p:style>
+      </p:cxnSp>
+      <p:cxnSp>
+        <p:nvCxnSpPr>
+          <p:cNvPr id="14" name="Straight Connector 13">
+            <a:extLst>
+              <a:ext uri="{FF2B5EF4-FFF2-40B4-BE49-F238E27FC236}">
+                <a16:creationId xmlns:a16="http://schemas.microsoft.com/office/drawing/2014/main" id="{F4EC4283-EF1F-6669-412B-8BE1D63543AA}"/>
+              </a:ext>
+            </a:extLst>
+          </p:cNvPr>
+          <p:cNvCxnSpPr>
+            <a:cxnSpLocks/>
+          </p:cNvCxnSpPr>
+          <p:nvPr/>
+        </p:nvCxnSpPr>
+        <p:spPr>
+          <a:xfrm flipH="1" flipV="1">
+            <a:off x="4047068" y="1871133"/>
+            <a:ext cx="2036233" cy="2937934"/>
+          </a:xfrm>
+          <a:prstGeom prst="line">
+            <a:avLst/>
+          </a:prstGeom>
+          <a:ln>
+            <a:solidFill>
+              <a:srgbClr val="7030A0"/>
+            </a:solidFill>
+          </a:ln>
+        </p:spPr>
+        <p:style>
+          <a:lnRef idx="1">
+            <a:schemeClr val="accent1"/>
+          </a:lnRef>
+          <a:fillRef idx="0">
+            <a:schemeClr val="accent1"/>
+          </a:fillRef>
+          <a:effectRef idx="0">
+            <a:schemeClr val="accent1"/>
+          </a:effectRef>
+          <a:fontRef idx="minor">
+            <a:schemeClr val="tx1"/>
+          </a:fontRef>
+        </p:style>
+      </p:cxnSp>
+      <p:cxnSp>
+        <p:nvCxnSpPr>
+          <p:cNvPr id="18" name="Straight Connector 17">
+            <a:extLst>
+              <a:ext uri="{FF2B5EF4-FFF2-40B4-BE49-F238E27FC236}">
+                <a16:creationId xmlns:a16="http://schemas.microsoft.com/office/drawing/2014/main" id="{241B1257-12AD-256A-4DD4-CBD4D2215747}"/>
+              </a:ext>
+            </a:extLst>
+          </p:cNvPr>
+          <p:cNvCxnSpPr>
+            <a:cxnSpLocks/>
+          </p:cNvCxnSpPr>
+          <p:nvPr/>
+        </p:nvCxnSpPr>
+        <p:spPr>
+          <a:xfrm flipH="1" flipV="1">
+            <a:off x="6096000" y="4809067"/>
+            <a:ext cx="2010835" cy="702733"/>
+          </a:xfrm>
+          <a:prstGeom prst="line">
+            <a:avLst/>
+          </a:prstGeom>
+          <a:ln>
+            <a:solidFill>
+              <a:srgbClr val="7030A0"/>
+            </a:solidFill>
+          </a:ln>
+        </p:spPr>
+        <p:style>
+          <a:lnRef idx="1">
+            <a:schemeClr val="accent1"/>
+          </a:lnRef>
+          <a:fillRef idx="0">
+            <a:schemeClr val="accent1"/>
+          </a:fillRef>
+          <a:effectRef idx="0">
+            <a:schemeClr val="accent1"/>
+          </a:effectRef>
+          <a:fontRef idx="minor">
+            <a:schemeClr val="tx1"/>
+          </a:fontRef>
+        </p:style>
+      </p:cxnSp>
+      <p:cxnSp>
+        <p:nvCxnSpPr>
+          <p:cNvPr id="21" name="Straight Connector 20">
+            <a:extLst>
+              <a:ext uri="{FF2B5EF4-FFF2-40B4-BE49-F238E27FC236}">
+                <a16:creationId xmlns:a16="http://schemas.microsoft.com/office/drawing/2014/main" id="{08FEFD02-F0ED-900C-DBED-9E7FD335F239}"/>
+              </a:ext>
+            </a:extLst>
+          </p:cNvPr>
+          <p:cNvCxnSpPr>
+            <a:cxnSpLocks/>
+          </p:cNvCxnSpPr>
+          <p:nvPr/>
+        </p:nvCxnSpPr>
+        <p:spPr>
+          <a:xfrm flipH="1">
+            <a:off x="8106835" y="4428067"/>
+            <a:ext cx="2061632" cy="1083733"/>
+          </a:xfrm>
+          <a:prstGeom prst="line">
+            <a:avLst/>
+          </a:prstGeom>
+          <a:ln>
+            <a:solidFill>
+              <a:srgbClr val="7030A0"/>
+            </a:solidFill>
+          </a:ln>
+        </p:spPr>
+        <p:style>
+          <a:lnRef idx="1">
+            <a:schemeClr val="accent1"/>
+          </a:lnRef>
+          <a:fillRef idx="0">
+            <a:schemeClr val="accent1"/>
+          </a:fillRef>
+          <a:effectRef idx="0">
+            <a:schemeClr val="accent1"/>
+          </a:effectRef>
+          <a:fontRef idx="minor">
+            <a:schemeClr val="tx1"/>
+          </a:fontRef>
+        </p:style>
+      </p:cxnSp>
+      <p:cxnSp>
+        <p:nvCxnSpPr>
+          <p:cNvPr id="23" name="Straight Connector 22">
+            <a:extLst>
+              <a:ext uri="{FF2B5EF4-FFF2-40B4-BE49-F238E27FC236}">
+                <a16:creationId xmlns:a16="http://schemas.microsoft.com/office/drawing/2014/main" id="{93245164-CD47-1BED-0630-EE9D88100A00}"/>
+              </a:ext>
+            </a:extLst>
+          </p:cNvPr>
+          <p:cNvCxnSpPr>
+            <a:cxnSpLocks/>
+          </p:cNvCxnSpPr>
+          <p:nvPr/>
+        </p:nvCxnSpPr>
+        <p:spPr>
+          <a:xfrm flipH="1" flipV="1">
+            <a:off x="4053416" y="1879600"/>
+            <a:ext cx="2042584" cy="2078566"/>
+          </a:xfrm>
+          <a:prstGeom prst="line">
+            <a:avLst/>
+          </a:prstGeom>
+          <a:ln>
+            <a:solidFill>
+              <a:srgbClr val="00B0F0"/>
+            </a:solidFill>
+          </a:ln>
+        </p:spPr>
+        <p:style>
+          <a:lnRef idx="1">
+            <a:schemeClr val="accent1"/>
+          </a:lnRef>
+          <a:fillRef idx="0">
+            <a:schemeClr val="accent1"/>
+          </a:fillRef>
+          <a:effectRef idx="0">
+            <a:schemeClr val="accent1"/>
+          </a:effectRef>
+          <a:fontRef idx="minor">
+            <a:schemeClr val="tx1"/>
+          </a:fontRef>
+        </p:style>
+      </p:cxnSp>
+      <p:cxnSp>
+        <p:nvCxnSpPr>
+          <p:cNvPr id="25" name="Straight Connector 24">
+            <a:extLst>
+              <a:ext uri="{FF2B5EF4-FFF2-40B4-BE49-F238E27FC236}">
+                <a16:creationId xmlns:a16="http://schemas.microsoft.com/office/drawing/2014/main" id="{048E389D-01F1-0A27-DAD8-4D7FE5863D45}"/>
+              </a:ext>
+            </a:extLst>
+          </p:cNvPr>
+          <p:cNvCxnSpPr>
+            <a:cxnSpLocks/>
+          </p:cNvCxnSpPr>
+          <p:nvPr/>
+        </p:nvCxnSpPr>
+        <p:spPr>
+          <a:xfrm flipH="1" flipV="1">
+            <a:off x="6087532" y="3958166"/>
+            <a:ext cx="2044701" cy="702733"/>
+          </a:xfrm>
+          <a:prstGeom prst="line">
+            <a:avLst/>
+          </a:prstGeom>
+          <a:ln>
+            <a:solidFill>
+              <a:srgbClr val="00B0F0"/>
+            </a:solidFill>
+          </a:ln>
+        </p:spPr>
+        <p:style>
+          <a:lnRef idx="1">
+            <a:schemeClr val="accent1"/>
+          </a:lnRef>
+          <a:fillRef idx="0">
+            <a:schemeClr val="accent1"/>
+          </a:fillRef>
+          <a:effectRef idx="0">
+            <a:schemeClr val="accent1"/>
+          </a:effectRef>
+          <a:fontRef idx="minor">
+            <a:schemeClr val="tx1"/>
+          </a:fontRef>
+        </p:style>
+      </p:cxnSp>
+      <p:cxnSp>
+        <p:nvCxnSpPr>
+          <p:cNvPr id="26" name="Straight Connector 25">
+            <a:extLst>
+              <a:ext uri="{FF2B5EF4-FFF2-40B4-BE49-F238E27FC236}">
+                <a16:creationId xmlns:a16="http://schemas.microsoft.com/office/drawing/2014/main" id="{029E7120-12FF-96F8-ACB5-49C4DEC7FAA7}"/>
+              </a:ext>
+            </a:extLst>
+          </p:cNvPr>
+          <p:cNvCxnSpPr>
+            <a:cxnSpLocks/>
+          </p:cNvCxnSpPr>
+          <p:nvPr/>
+        </p:nvCxnSpPr>
+        <p:spPr>
+          <a:xfrm flipH="1">
+            <a:off x="8115303" y="3577166"/>
+            <a:ext cx="2061632" cy="1083733"/>
+          </a:xfrm>
+          <a:prstGeom prst="line">
+            <a:avLst/>
+          </a:prstGeom>
+          <a:ln>
+            <a:solidFill>
+              <a:srgbClr val="00B0F0"/>
+            </a:solidFill>
+          </a:ln>
+        </p:spPr>
+        <p:style>
+          <a:lnRef idx="1">
+            <a:schemeClr val="accent1"/>
+          </a:lnRef>
+          <a:fillRef idx="0">
+            <a:schemeClr val="accent1"/>
+          </a:fillRef>
+          <a:effectRef idx="0">
+            <a:schemeClr val="accent1"/>
+          </a:effectRef>
+          <a:fontRef idx="minor">
+            <a:schemeClr val="tx1"/>
+          </a:fontRef>
+        </p:style>
+      </p:cxnSp>
+      <p:sp>
+        <p:nvSpPr>
+          <p:cNvPr id="28" name="Oval 27">
+            <a:extLst>
+              <a:ext uri="{FF2B5EF4-FFF2-40B4-BE49-F238E27FC236}">
+                <a16:creationId xmlns:a16="http://schemas.microsoft.com/office/drawing/2014/main" id="{DE0E7FEE-2C6F-A5E7-C9DE-F96DB8F5051D}"/>
+              </a:ext>
+            </a:extLst>
+          </p:cNvPr>
+          <p:cNvSpPr/>
+          <p:nvPr/>
+        </p:nvSpPr>
+        <p:spPr>
+          <a:xfrm>
+            <a:off x="3835400" y="1659466"/>
+            <a:ext cx="457200" cy="440267"/>
+          </a:xfrm>
+          <a:prstGeom prst="ellipse">
+            <a:avLst/>
+          </a:prstGeom>
+          <a:noFill/>
+          <a:ln>
+            <a:solidFill>
+              <a:srgbClr val="FF0000"/>
+            </a:solidFill>
+          </a:ln>
+        </p:spPr>
+        <p:style>
+          <a:lnRef idx="2">
+            <a:schemeClr val="accent1">
+              <a:shade val="15000"/>
+            </a:schemeClr>
+          </a:lnRef>
+          <a:fillRef idx="1">
+            <a:schemeClr val="accent1"/>
+          </a:fillRef>
+          <a:effectRef idx="0">
+            <a:schemeClr val="accent1"/>
+          </a:effectRef>
+          <a:fontRef idx="minor">
+            <a:schemeClr val="lt1"/>
+          </a:fontRef>
+        </p:style>
+        <p:txBody>
+          <a:bodyPr rtlCol="0" anchor="ctr"/>
+          <a:lstStyle/>
+          <a:p>
+            <a:pPr algn="ctr"/>
+            <a:endParaRPr lang="en-GB"/>
+          </a:p>
+        </p:txBody>
+      </p:sp>
+      <p:cxnSp>
+        <p:nvCxnSpPr>
+          <p:cNvPr id="29" name="Straight Connector 28">
+            <a:extLst>
+              <a:ext uri="{FF2B5EF4-FFF2-40B4-BE49-F238E27FC236}">
+                <a16:creationId xmlns:a16="http://schemas.microsoft.com/office/drawing/2014/main" id="{2AFE71D7-6877-573C-20F3-FD8189262C43}"/>
+              </a:ext>
+            </a:extLst>
+          </p:cNvPr>
+          <p:cNvCxnSpPr>
+            <a:cxnSpLocks/>
+          </p:cNvCxnSpPr>
+          <p:nvPr/>
+        </p:nvCxnSpPr>
+        <p:spPr>
+          <a:xfrm flipH="1" flipV="1">
+            <a:off x="4055534" y="1879599"/>
+            <a:ext cx="2040466" cy="770467"/>
+          </a:xfrm>
+          <a:prstGeom prst="line">
+            <a:avLst/>
+          </a:prstGeom>
+          <a:ln>
+            <a:solidFill>
+              <a:srgbClr val="92D050"/>
+            </a:solidFill>
+          </a:ln>
+        </p:spPr>
+        <p:style>
+          <a:lnRef idx="1">
+            <a:schemeClr val="accent1"/>
+          </a:lnRef>
+          <a:fillRef idx="0">
+            <a:schemeClr val="accent1"/>
+          </a:fillRef>
+          <a:effectRef idx="0">
+            <a:schemeClr val="accent1"/>
+          </a:effectRef>
+          <a:fontRef idx="minor">
+            <a:schemeClr val="tx1"/>
+          </a:fontRef>
+        </p:style>
+      </p:cxnSp>
+      <p:cxnSp>
+        <p:nvCxnSpPr>
+          <p:cNvPr id="31" name="Straight Connector 30">
+            <a:extLst>
+              <a:ext uri="{FF2B5EF4-FFF2-40B4-BE49-F238E27FC236}">
+                <a16:creationId xmlns:a16="http://schemas.microsoft.com/office/drawing/2014/main" id="{0116CA4E-7BD2-1995-CF76-6D8965ED2757}"/>
+              </a:ext>
+            </a:extLst>
+          </p:cNvPr>
+          <p:cNvCxnSpPr>
+            <a:cxnSpLocks/>
+          </p:cNvCxnSpPr>
+          <p:nvPr/>
+        </p:nvCxnSpPr>
+        <p:spPr>
+          <a:xfrm flipH="1" flipV="1">
+            <a:off x="6095999" y="2650066"/>
+            <a:ext cx="2036234" cy="1557869"/>
+          </a:xfrm>
+          <a:prstGeom prst="line">
+            <a:avLst/>
+          </a:prstGeom>
+          <a:ln>
+            <a:solidFill>
+              <a:srgbClr val="92D050"/>
+            </a:solidFill>
+          </a:ln>
+        </p:spPr>
+        <p:style>
+          <a:lnRef idx="1">
+            <a:schemeClr val="accent1"/>
+          </a:lnRef>
+          <a:fillRef idx="0">
+            <a:schemeClr val="accent1"/>
+          </a:fillRef>
+          <a:effectRef idx="0">
+            <a:schemeClr val="accent1"/>
+          </a:effectRef>
+          <a:fontRef idx="minor">
+            <a:schemeClr val="tx1"/>
+          </a:fontRef>
+        </p:style>
+      </p:cxnSp>
+      <p:cxnSp>
+        <p:nvCxnSpPr>
+          <p:cNvPr id="33" name="Straight Connector 32">
+            <a:extLst>
+              <a:ext uri="{FF2B5EF4-FFF2-40B4-BE49-F238E27FC236}">
+                <a16:creationId xmlns:a16="http://schemas.microsoft.com/office/drawing/2014/main" id="{9381A422-B861-264D-8E19-9E685F64DE70}"/>
+              </a:ext>
+            </a:extLst>
+          </p:cNvPr>
+          <p:cNvCxnSpPr>
+            <a:cxnSpLocks/>
+          </p:cNvCxnSpPr>
+          <p:nvPr/>
+        </p:nvCxnSpPr>
+        <p:spPr>
+          <a:xfrm flipH="1">
+            <a:off x="8115303" y="3115734"/>
+            <a:ext cx="2061632" cy="1083733"/>
+          </a:xfrm>
+          <a:prstGeom prst="line">
+            <a:avLst/>
+          </a:prstGeom>
+          <a:ln>
+            <a:solidFill>
+              <a:srgbClr val="92D050"/>
+            </a:solidFill>
+          </a:ln>
+        </p:spPr>
+        <p:style>
+          <a:lnRef idx="1">
+            <a:schemeClr val="accent1"/>
+          </a:lnRef>
+          <a:fillRef idx="0">
+            <a:schemeClr val="accent1"/>
+          </a:fillRef>
+          <a:effectRef idx="0">
+            <a:schemeClr val="accent1"/>
+          </a:effectRef>
+          <a:fontRef idx="minor">
+            <a:schemeClr val="tx1"/>
+          </a:fontRef>
+        </p:style>
+      </p:cxnSp>
+      <p:sp>
+        <p:nvSpPr>
+          <p:cNvPr id="34" name="Oval 33">
+            <a:extLst>
+              <a:ext uri="{FF2B5EF4-FFF2-40B4-BE49-F238E27FC236}">
+                <a16:creationId xmlns:a16="http://schemas.microsoft.com/office/drawing/2014/main" id="{B6AAD73A-3312-85E7-5536-EE7BFF275CC6}"/>
+              </a:ext>
+            </a:extLst>
+          </p:cNvPr>
+          <p:cNvSpPr/>
+          <p:nvPr/>
+        </p:nvSpPr>
+        <p:spPr>
+          <a:xfrm>
+            <a:off x="5854702" y="2421466"/>
+            <a:ext cx="457200" cy="440267"/>
+          </a:xfrm>
+          <a:prstGeom prst="ellipse">
+            <a:avLst/>
+          </a:prstGeom>
+          <a:noFill/>
+          <a:ln>
+            <a:solidFill>
+              <a:srgbClr val="FF0000"/>
+            </a:solidFill>
+          </a:ln>
+        </p:spPr>
+        <p:style>
+          <a:lnRef idx="2">
+            <a:schemeClr val="accent1">
+              <a:shade val="15000"/>
+            </a:schemeClr>
+          </a:lnRef>
+          <a:fillRef idx="1">
+            <a:schemeClr val="accent1"/>
+          </a:fillRef>
+          <a:effectRef idx="0">
+            <a:schemeClr val="accent1"/>
+          </a:effectRef>
+          <a:fontRef idx="minor">
+            <a:schemeClr val="lt1"/>
+          </a:fontRef>
+        </p:style>
+        <p:txBody>
+          <a:bodyPr rtlCol="0" anchor="ctr"/>
+          <a:lstStyle/>
+          <a:p>
+            <a:pPr algn="ctr"/>
+            <a:endParaRPr lang="en-GB"/>
+          </a:p>
+        </p:txBody>
+      </p:sp>
+      <p:cxnSp>
+        <p:nvCxnSpPr>
+          <p:cNvPr id="35" name="Straight Connector 34">
+            <a:extLst>
+              <a:ext uri="{FF2B5EF4-FFF2-40B4-BE49-F238E27FC236}">
+                <a16:creationId xmlns:a16="http://schemas.microsoft.com/office/drawing/2014/main" id="{D3CC8270-619A-D275-CDBE-06B6BD0C9E3B}"/>
+              </a:ext>
+            </a:extLst>
+          </p:cNvPr>
+          <p:cNvCxnSpPr>
+            <a:cxnSpLocks/>
+          </p:cNvCxnSpPr>
+          <p:nvPr/>
+        </p:nvCxnSpPr>
+        <p:spPr>
+          <a:xfrm flipH="1">
+            <a:off x="4064000" y="1312333"/>
+            <a:ext cx="2019301" cy="586318"/>
+          </a:xfrm>
+          <a:prstGeom prst="line">
+            <a:avLst/>
+          </a:prstGeom>
+          <a:ln>
+            <a:solidFill>
+              <a:schemeClr val="accent2"/>
+            </a:solidFill>
+          </a:ln>
+        </p:spPr>
+        <p:style>
+          <a:lnRef idx="1">
+            <a:schemeClr val="accent1"/>
+          </a:lnRef>
+          <a:fillRef idx="0">
+            <a:schemeClr val="accent1"/>
+          </a:fillRef>
+          <a:effectRef idx="0">
+            <a:schemeClr val="accent1"/>
+          </a:effectRef>
+          <a:fontRef idx="minor">
+            <a:schemeClr val="tx1"/>
+          </a:fontRef>
+        </p:style>
+      </p:cxnSp>
+      <p:cxnSp>
+        <p:nvCxnSpPr>
+          <p:cNvPr id="36" name="Straight Connector 35">
+            <a:extLst>
+              <a:ext uri="{FF2B5EF4-FFF2-40B4-BE49-F238E27FC236}">
+                <a16:creationId xmlns:a16="http://schemas.microsoft.com/office/drawing/2014/main" id="{E1FFC392-362C-A9A8-775F-B092B342C7AA}"/>
+              </a:ext>
+            </a:extLst>
+          </p:cNvPr>
+          <p:cNvCxnSpPr>
+            <a:cxnSpLocks/>
+          </p:cNvCxnSpPr>
+          <p:nvPr/>
+        </p:nvCxnSpPr>
+        <p:spPr>
+          <a:xfrm flipH="1" flipV="1">
+            <a:off x="6074834" y="1312331"/>
+            <a:ext cx="2065866" cy="1020235"/>
+          </a:xfrm>
+          <a:prstGeom prst="line">
+            <a:avLst/>
+          </a:prstGeom>
+          <a:ln>
+            <a:solidFill>
+              <a:schemeClr val="accent2"/>
+            </a:solidFill>
+          </a:ln>
+        </p:spPr>
+        <p:style>
+          <a:lnRef idx="1">
+            <a:schemeClr val="accent1"/>
+          </a:lnRef>
+          <a:fillRef idx="0">
+            <a:schemeClr val="accent1"/>
+          </a:fillRef>
+          <a:effectRef idx="0">
+            <a:schemeClr val="accent1"/>
+          </a:effectRef>
+          <a:fontRef idx="minor">
+            <a:schemeClr val="tx1"/>
+          </a:fontRef>
+        </p:style>
+      </p:cxnSp>
+      <p:cxnSp>
+        <p:nvCxnSpPr>
+          <p:cNvPr id="37" name="Straight Connector 36">
+            <a:extLst>
+              <a:ext uri="{FF2B5EF4-FFF2-40B4-BE49-F238E27FC236}">
+                <a16:creationId xmlns:a16="http://schemas.microsoft.com/office/drawing/2014/main" id="{0E717A40-75A3-4913-EA2D-943EE96D5FE1}"/>
+              </a:ext>
+            </a:extLst>
+          </p:cNvPr>
+          <p:cNvCxnSpPr>
+            <a:cxnSpLocks/>
+          </p:cNvCxnSpPr>
+          <p:nvPr/>
+        </p:nvCxnSpPr>
+        <p:spPr>
+          <a:xfrm flipH="1" flipV="1">
+            <a:off x="8140700" y="2328332"/>
+            <a:ext cx="2027766" cy="321734"/>
+          </a:xfrm>
+          <a:prstGeom prst="line">
+            <a:avLst/>
+          </a:prstGeom>
+          <a:ln>
+            <a:solidFill>
+              <a:schemeClr val="accent2"/>
+            </a:solidFill>
+          </a:ln>
+        </p:spPr>
+        <p:style>
+          <a:lnRef idx="1">
+            <a:schemeClr val="accent1"/>
+          </a:lnRef>
+          <a:fillRef idx="0">
+            <a:schemeClr val="accent1"/>
+          </a:fillRef>
+          <a:effectRef idx="0">
+            <a:schemeClr val="accent1"/>
+          </a:effectRef>
+          <a:fontRef idx="minor">
+            <a:schemeClr val="tx1"/>
+          </a:fontRef>
+        </p:style>
+      </p:cxnSp>
+      <p:sp>
+        <p:nvSpPr>
+          <p:cNvPr id="42" name="Oval 41">
+            <a:extLst>
+              <a:ext uri="{FF2B5EF4-FFF2-40B4-BE49-F238E27FC236}">
+                <a16:creationId xmlns:a16="http://schemas.microsoft.com/office/drawing/2014/main" id="{EC686698-F894-7EDB-4926-3B6D31BF5DD8}"/>
+              </a:ext>
+            </a:extLst>
+          </p:cNvPr>
+          <p:cNvSpPr/>
+          <p:nvPr/>
+        </p:nvSpPr>
+        <p:spPr>
+          <a:xfrm>
+            <a:off x="5880101" y="1109132"/>
+            <a:ext cx="457200" cy="440267"/>
+          </a:xfrm>
+          <a:prstGeom prst="ellipse">
+            <a:avLst/>
+          </a:prstGeom>
+          <a:noFill/>
+          <a:ln>
+            <a:solidFill>
+              <a:srgbClr val="FF0000"/>
+            </a:solidFill>
+          </a:ln>
+        </p:spPr>
+        <p:style>
+          <a:lnRef idx="2">
+            <a:schemeClr val="accent1">
+              <a:shade val="15000"/>
+            </a:schemeClr>
+          </a:lnRef>
+          <a:fillRef idx="1">
+            <a:schemeClr val="accent1"/>
+          </a:fillRef>
+          <a:effectRef idx="0">
+            <a:schemeClr val="accent1"/>
+          </a:effectRef>
+          <a:fontRef idx="minor">
+            <a:schemeClr val="lt1"/>
+          </a:fontRef>
+        </p:style>
+        <p:txBody>
+          <a:bodyPr rtlCol="0" anchor="ctr"/>
+          <a:lstStyle/>
+          <a:p>
+            <a:pPr algn="ctr"/>
+            <a:endParaRPr lang="en-GB"/>
+          </a:p>
+        </p:txBody>
+      </p:sp>
+      <p:sp>
+        <p:nvSpPr>
+          <p:cNvPr id="43" name="Oval 42">
+            <a:extLst>
+              <a:ext uri="{FF2B5EF4-FFF2-40B4-BE49-F238E27FC236}">
+                <a16:creationId xmlns:a16="http://schemas.microsoft.com/office/drawing/2014/main" id="{9E3D34FD-381C-E1D2-5586-03D344F2DE3C}"/>
+              </a:ext>
+            </a:extLst>
+          </p:cNvPr>
+          <p:cNvSpPr/>
+          <p:nvPr/>
+        </p:nvSpPr>
+        <p:spPr>
+          <a:xfrm>
+            <a:off x="7899402" y="2116667"/>
+            <a:ext cx="457200" cy="440267"/>
+          </a:xfrm>
+          <a:prstGeom prst="ellipse">
+            <a:avLst/>
+          </a:prstGeom>
+          <a:noFill/>
+          <a:ln>
+            <a:solidFill>
+              <a:srgbClr val="FF0000"/>
+            </a:solidFill>
+          </a:ln>
+        </p:spPr>
+        <p:style>
+          <a:lnRef idx="2">
+            <a:schemeClr val="accent1">
+              <a:shade val="15000"/>
+            </a:schemeClr>
+          </a:lnRef>
+          <a:fillRef idx="1">
+            <a:schemeClr val="accent1"/>
+          </a:fillRef>
+          <a:effectRef idx="0">
+            <a:schemeClr val="accent1"/>
+          </a:effectRef>
+          <a:fontRef idx="minor">
+            <a:schemeClr val="lt1"/>
+          </a:fontRef>
+        </p:style>
+        <p:txBody>
+          <a:bodyPr rtlCol="0" anchor="ctr"/>
+          <a:lstStyle/>
+          <a:p>
+            <a:pPr algn="ctr"/>
+            <a:endParaRPr lang="en-GB"/>
+          </a:p>
+        </p:txBody>
+      </p:sp>
+      <p:sp>
+        <p:nvSpPr>
+          <p:cNvPr id="44" name="TextBox 43">
+            <a:extLst>
+              <a:ext uri="{FF2B5EF4-FFF2-40B4-BE49-F238E27FC236}">
+                <a16:creationId xmlns:a16="http://schemas.microsoft.com/office/drawing/2014/main" id="{8CB896C4-73B9-96F2-50D7-9C07E5089B94}"/>
+              </a:ext>
+            </a:extLst>
+          </p:cNvPr>
+          <p:cNvSpPr txBox="1"/>
+          <p:nvPr/>
+        </p:nvSpPr>
+        <p:spPr>
+          <a:xfrm>
+            <a:off x="10160000" y="2469634"/>
+            <a:ext cx="1761764" cy="369332"/>
+          </a:xfrm>
+          <a:prstGeom prst="rect">
+            <a:avLst/>
+          </a:prstGeom>
+          <a:noFill/>
+        </p:spPr>
+        <p:txBody>
+          <a:bodyPr wrap="none" rtlCol="0">
+            <a:spAutoFit/>
+          </a:bodyPr>
+          <a:lstStyle/>
+          <a:p>
+            <a:r>
+              <a:rPr lang="en-GB" dirty="0"/>
+              <a:t>3 total ‘mistakes’</a:t>
+            </a:r>
+          </a:p>
+        </p:txBody>
+      </p:sp>
+      <p:sp>
+        <p:nvSpPr>
+          <p:cNvPr id="45" name="TextBox 44">
+            <a:extLst>
+              <a:ext uri="{FF2B5EF4-FFF2-40B4-BE49-F238E27FC236}">
+                <a16:creationId xmlns:a16="http://schemas.microsoft.com/office/drawing/2014/main" id="{5E71C690-25BB-DC15-6E7B-E20DA1E41BF4}"/>
+              </a:ext>
+            </a:extLst>
+          </p:cNvPr>
+          <p:cNvSpPr txBox="1"/>
+          <p:nvPr/>
+        </p:nvSpPr>
+        <p:spPr>
+          <a:xfrm>
+            <a:off x="10160000" y="2943767"/>
+            <a:ext cx="1768176" cy="369332"/>
+          </a:xfrm>
+          <a:prstGeom prst="rect">
+            <a:avLst/>
+          </a:prstGeom>
+          <a:noFill/>
+        </p:spPr>
+        <p:txBody>
+          <a:bodyPr wrap="none" rtlCol="0">
+            <a:spAutoFit/>
+          </a:bodyPr>
+          <a:lstStyle/>
+          <a:p>
+            <a:r>
+              <a:rPr lang="en-GB" dirty="0"/>
+              <a:t>2 total ‘mistakes’</a:t>
+            </a:r>
+          </a:p>
+        </p:txBody>
+      </p:sp>
+      <p:sp>
+        <p:nvSpPr>
+          <p:cNvPr id="46" name="TextBox 45">
+            <a:extLst>
+              <a:ext uri="{FF2B5EF4-FFF2-40B4-BE49-F238E27FC236}">
+                <a16:creationId xmlns:a16="http://schemas.microsoft.com/office/drawing/2014/main" id="{18AE7C1C-AA57-A8F9-0FA8-35307570F0A8}"/>
+              </a:ext>
+            </a:extLst>
+          </p:cNvPr>
+          <p:cNvSpPr txBox="1"/>
+          <p:nvPr/>
+        </p:nvSpPr>
+        <p:spPr>
+          <a:xfrm>
+            <a:off x="10151536" y="3417900"/>
+            <a:ext cx="1678408" cy="369332"/>
+          </a:xfrm>
+          <a:prstGeom prst="rect">
+            <a:avLst/>
+          </a:prstGeom>
+          <a:noFill/>
+        </p:spPr>
+        <p:txBody>
+          <a:bodyPr wrap="none" rtlCol="0">
+            <a:spAutoFit/>
+          </a:bodyPr>
+          <a:lstStyle/>
+          <a:p>
+            <a:r>
+              <a:rPr lang="en-GB" dirty="0"/>
+              <a:t>1 total ‘mistake’</a:t>
+            </a:r>
+          </a:p>
+        </p:txBody>
+      </p:sp>
+      <p:sp>
+        <p:nvSpPr>
+          <p:cNvPr id="47" name="TextBox 46">
+            <a:extLst>
+              <a:ext uri="{FF2B5EF4-FFF2-40B4-BE49-F238E27FC236}">
+                <a16:creationId xmlns:a16="http://schemas.microsoft.com/office/drawing/2014/main" id="{5298AF8E-28E7-6B7F-3CA5-BE1217FDC047}"/>
+              </a:ext>
+            </a:extLst>
+          </p:cNvPr>
+          <p:cNvSpPr txBox="1"/>
+          <p:nvPr/>
+        </p:nvSpPr>
+        <p:spPr>
+          <a:xfrm>
+            <a:off x="10881598" y="4485901"/>
+            <a:ext cx="1297703" cy="1200329"/>
+          </a:xfrm>
+          <a:prstGeom prst="rect">
+            <a:avLst/>
+          </a:prstGeom>
+          <a:noFill/>
+        </p:spPr>
+        <p:txBody>
+          <a:bodyPr wrap="square" rtlCol="0">
+            <a:spAutoFit/>
+          </a:bodyPr>
+          <a:lstStyle/>
+          <a:p>
+            <a:r>
+              <a:rPr lang="en-GB" dirty="0"/>
+              <a:t>Ideal solution</a:t>
+            </a:r>
+          </a:p>
+          <a:p>
+            <a:r>
+              <a:rPr lang="en-GB" dirty="0"/>
+              <a:t>0 total ‘mistakes’</a:t>
+            </a:r>
+          </a:p>
+        </p:txBody>
+      </p:sp>
+      <p:sp>
+        <p:nvSpPr>
+          <p:cNvPr id="48" name="TextBox 47">
+            <a:extLst>
+              <a:ext uri="{FF2B5EF4-FFF2-40B4-BE49-F238E27FC236}">
+                <a16:creationId xmlns:a16="http://schemas.microsoft.com/office/drawing/2014/main" id="{9B65840F-A23D-CDA5-8146-FC08380657DF}"/>
+              </a:ext>
+            </a:extLst>
+          </p:cNvPr>
+          <p:cNvSpPr txBox="1"/>
+          <p:nvPr/>
+        </p:nvSpPr>
+        <p:spPr>
+          <a:xfrm>
+            <a:off x="2023534" y="0"/>
+            <a:ext cx="1239314" cy="369332"/>
+          </a:xfrm>
+          <a:prstGeom prst="rect">
+            <a:avLst/>
+          </a:prstGeom>
+          <a:noFill/>
+        </p:spPr>
+        <p:txBody>
+          <a:bodyPr wrap="none" rtlCol="0">
+            <a:spAutoFit/>
+          </a:bodyPr>
+          <a:lstStyle/>
+          <a:p>
+            <a:r>
+              <a:rPr lang="en-GB" dirty="0"/>
+              <a:t>1</a:t>
+            </a:r>
+            <a:r>
+              <a:rPr lang="en-GB" baseline="30000" dirty="0"/>
+              <a:t>st</a:t>
+            </a:r>
+            <a:r>
+              <a:rPr lang="en-GB" dirty="0"/>
+              <a:t> decision</a:t>
+            </a:r>
+          </a:p>
+        </p:txBody>
+      </p:sp>
+      <p:sp>
+        <p:nvSpPr>
+          <p:cNvPr id="49" name="TextBox 48">
+            <a:extLst>
+              <a:ext uri="{FF2B5EF4-FFF2-40B4-BE49-F238E27FC236}">
+                <a16:creationId xmlns:a16="http://schemas.microsoft.com/office/drawing/2014/main" id="{C1FF7371-076D-1B57-72B6-CE27722CD38A}"/>
+              </a:ext>
+            </a:extLst>
+          </p:cNvPr>
+          <p:cNvSpPr txBox="1"/>
+          <p:nvPr/>
+        </p:nvSpPr>
+        <p:spPr>
+          <a:xfrm>
+            <a:off x="4064002" y="-17968"/>
+            <a:ext cx="1289135" cy="369332"/>
+          </a:xfrm>
+          <a:prstGeom prst="rect">
+            <a:avLst/>
+          </a:prstGeom>
+          <a:noFill/>
+        </p:spPr>
+        <p:txBody>
+          <a:bodyPr wrap="none" rtlCol="0">
+            <a:spAutoFit/>
+          </a:bodyPr>
+          <a:lstStyle/>
+          <a:p>
+            <a:r>
+              <a:rPr lang="en-GB" dirty="0"/>
+              <a:t>2</a:t>
+            </a:r>
+            <a:r>
+              <a:rPr lang="en-GB" baseline="30000" dirty="0"/>
+              <a:t>nd</a:t>
+            </a:r>
+            <a:r>
+              <a:rPr lang="en-GB" dirty="0"/>
+              <a:t> decision</a:t>
+            </a:r>
+          </a:p>
+        </p:txBody>
+      </p:sp>
+      <p:sp>
+        <p:nvSpPr>
+          <p:cNvPr id="50" name="TextBox 49">
+            <a:extLst>
+              <a:ext uri="{FF2B5EF4-FFF2-40B4-BE49-F238E27FC236}">
+                <a16:creationId xmlns:a16="http://schemas.microsoft.com/office/drawing/2014/main" id="{AC35941F-DBBB-DD5C-1DFD-5043350696E1}"/>
+              </a:ext>
+            </a:extLst>
+          </p:cNvPr>
+          <p:cNvSpPr txBox="1"/>
+          <p:nvPr/>
+        </p:nvSpPr>
+        <p:spPr>
+          <a:xfrm>
+            <a:off x="6100234" y="-11615"/>
+            <a:ext cx="1259768" cy="369332"/>
+          </a:xfrm>
+          <a:prstGeom prst="rect">
+            <a:avLst/>
+          </a:prstGeom>
+          <a:noFill/>
+        </p:spPr>
+        <p:txBody>
+          <a:bodyPr wrap="none" rtlCol="0">
+            <a:spAutoFit/>
+          </a:bodyPr>
+          <a:lstStyle/>
+          <a:p>
+            <a:r>
+              <a:rPr lang="en-GB" dirty="0"/>
+              <a:t>3</a:t>
+            </a:r>
+            <a:r>
+              <a:rPr lang="en-GB" baseline="30000" dirty="0"/>
+              <a:t>rd</a:t>
+            </a:r>
+            <a:r>
+              <a:rPr lang="en-GB" dirty="0"/>
+              <a:t> decision</a:t>
+            </a:r>
+          </a:p>
+        </p:txBody>
+      </p:sp>
+      <p:sp>
+        <p:nvSpPr>
+          <p:cNvPr id="51" name="TextBox 50">
+            <a:extLst>
+              <a:ext uri="{FF2B5EF4-FFF2-40B4-BE49-F238E27FC236}">
+                <a16:creationId xmlns:a16="http://schemas.microsoft.com/office/drawing/2014/main" id="{409FD6CF-124D-FC7B-2F6D-C5D854E96269}"/>
+              </a:ext>
+            </a:extLst>
+          </p:cNvPr>
+          <p:cNvSpPr txBox="1"/>
+          <p:nvPr/>
+        </p:nvSpPr>
+        <p:spPr>
+          <a:xfrm>
+            <a:off x="8132236" y="3717"/>
+            <a:ext cx="1260281" cy="369332"/>
+          </a:xfrm>
+          <a:prstGeom prst="rect">
+            <a:avLst/>
+          </a:prstGeom>
+          <a:noFill/>
+        </p:spPr>
+        <p:txBody>
+          <a:bodyPr wrap="none" rtlCol="0">
+            <a:spAutoFit/>
+          </a:bodyPr>
+          <a:lstStyle/>
+          <a:p>
+            <a:r>
+              <a:rPr lang="en-GB" dirty="0"/>
+              <a:t>4</a:t>
+            </a:r>
+            <a:r>
+              <a:rPr lang="en-GB" baseline="30000" dirty="0"/>
+              <a:t>th</a:t>
+            </a:r>
+            <a:r>
+              <a:rPr lang="en-GB" dirty="0"/>
+              <a:t> decision</a:t>
+            </a:r>
+          </a:p>
+        </p:txBody>
+      </p:sp>
+    </p:spTree>
+    <p:extLst>
+      <p:ext uri="{BB962C8B-B14F-4D97-AF65-F5344CB8AC3E}">
+        <p14:creationId xmlns:p14="http://schemas.microsoft.com/office/powerpoint/2010/main" val="2390090695"/>
+      </p:ext>
+    </p:extLst>
+  </p:cSld>
+  <p:clrMapOvr>
+    <a:masterClrMapping/>
+  </p:clrMapOvr>
+</p:sld>
+</file>
+
+<file path=ppt/slides/slide6.xml><?xml version="1.0" encoding="utf-8"?>
+<p:sld xmlns:a="http://schemas.openxmlformats.org/drawingml/2006/main" xmlns:r="http://schemas.openxmlformats.org/officeDocument/2006/relationships" xmlns:p="http://schemas.openxmlformats.org/presentationml/2006/main">
+  <p:cSld>
+    <p:spTree>
+      <p:nvGrpSpPr>
+        <p:cNvPr id="1" name=""/>
+        <p:cNvGrpSpPr/>
+        <p:nvPr/>
+      </p:nvGrpSpPr>
+      <p:grpSpPr>
+        <a:xfrm>
+          <a:off x="0" y="0"/>
+          <a:ext cx="0" cy="0"/>
+          <a:chOff x="0" y="0"/>
+          <a:chExt cx="0" cy="0"/>
+        </a:xfrm>
+      </p:grpSpPr>
       <p:pic>
         <p:nvPicPr>
           <p:cNvPr id="3" name="Picture 2">
@@ -7381,7 +11221,7 @@
 </p:sld>
 </file>
 
-<file path=ppt/slides/slide6.xml><?xml version="1.0" encoding="utf-8"?>
+<file path=ppt/slides/slide7.xml><?xml version="1.0" encoding="utf-8"?>
 <p:sld xmlns:a="http://schemas.openxmlformats.org/drawingml/2006/main" xmlns:r="http://schemas.openxmlformats.org/officeDocument/2006/relationships" xmlns:p="http://schemas.openxmlformats.org/presentationml/2006/main">
   <p:cSld>
     <p:spTree>
@@ -7483,7 +11323,7 @@
 </p:sld>
 </file>
 
-<file path=ppt/slides/slide7.xml><?xml version="1.0" encoding="utf-8"?>
+<file path=ppt/slides/slide8.xml><?xml version="1.0" encoding="utf-8"?>
 <p:sld xmlns:a="http://schemas.openxmlformats.org/drawingml/2006/main" xmlns:r="http://schemas.openxmlformats.org/officeDocument/2006/relationships" xmlns:p="http://schemas.openxmlformats.org/presentationml/2006/main">
   <p:cSld>
     <p:spTree>
@@ -7657,7 +11497,7 @@
 </p:sld>
 </file>
 
-<file path=ppt/slides/slide8.xml><?xml version="1.0" encoding="utf-8"?>
+<file path=ppt/slides/slide9.xml><?xml version="1.0" encoding="utf-8"?>
 <p:sld xmlns:a="http://schemas.openxmlformats.org/drawingml/2006/main" xmlns:r="http://schemas.openxmlformats.org/officeDocument/2006/relationships" xmlns:p="http://schemas.openxmlformats.org/presentationml/2006/main">
   <p:cSld>
     <p:spTree>
@@ -7839,143 +11679,6 @@
     <p:extLst>
       <p:ext uri="{BB962C8B-B14F-4D97-AF65-F5344CB8AC3E}">
         <p14:creationId xmlns:p14="http://schemas.microsoft.com/office/powerpoint/2010/main" val="3130343794"/>
-      </p:ext>
-    </p:extLst>
-  </p:cSld>
-  <p:clrMapOvr>
-    <a:masterClrMapping/>
-  </p:clrMapOvr>
-</p:sld>
-</file>
-
-<file path=ppt/slides/slide9.xml><?xml version="1.0" encoding="utf-8"?>
-<p:sld xmlns:a="http://schemas.openxmlformats.org/drawingml/2006/main" xmlns:r="http://schemas.openxmlformats.org/officeDocument/2006/relationships" xmlns:p="http://schemas.openxmlformats.org/presentationml/2006/main">
-  <p:cSld>
-    <p:spTree>
-      <p:nvGrpSpPr>
-        <p:cNvPr id="1" name=""/>
-        <p:cNvGrpSpPr/>
-        <p:nvPr/>
-      </p:nvGrpSpPr>
-      <p:grpSpPr>
-        <a:xfrm>
-          <a:off x="0" y="0"/>
-          <a:ext cx="0" cy="0"/>
-          <a:chOff x="0" y="0"/>
-          <a:chExt cx="0" cy="0"/>
-        </a:xfrm>
-      </p:grpSpPr>
-      <p:pic>
-        <p:nvPicPr>
-          <p:cNvPr id="3" name="Picture 2">
-            <a:extLst>
-              <a:ext uri="{FF2B5EF4-FFF2-40B4-BE49-F238E27FC236}">
-                <a16:creationId xmlns:a16="http://schemas.microsoft.com/office/drawing/2014/main" id="{48126AE8-085C-558D-694D-DFB2CC1BCA22}"/>
-              </a:ext>
-            </a:extLst>
-          </p:cNvPr>
-          <p:cNvPicPr>
-            <a:picLocks noChangeAspect="1"/>
-          </p:cNvPicPr>
-          <p:nvPr/>
-        </p:nvPicPr>
-        <p:blipFill>
-          <a:blip r:embed="rId2">
-            <a:extLst>
-              <a:ext uri="{28A0092B-C50C-407E-A947-70E740481C1C}">
-                <a14:useLocalDpi xmlns:a14="http://schemas.microsoft.com/office/drawing/2010/main" val="0"/>
-              </a:ext>
-            </a:extLst>
-          </a:blip>
-          <a:stretch>
-            <a:fillRect/>
-          </a:stretch>
-        </p:blipFill>
-        <p:spPr>
-          <a:xfrm>
-            <a:off x="601205" y="911246"/>
-            <a:ext cx="6163590" cy="2444708"/>
-          </a:xfrm>
-          <a:prstGeom prst="rect">
-            <a:avLst/>
-          </a:prstGeom>
-        </p:spPr>
-      </p:pic>
-      <p:sp>
-        <p:nvSpPr>
-          <p:cNvPr id="2" name="Rectangle: Rounded Corners 1">
-            <a:extLst>
-              <a:ext uri="{FF2B5EF4-FFF2-40B4-BE49-F238E27FC236}">
-                <a16:creationId xmlns:a16="http://schemas.microsoft.com/office/drawing/2014/main" id="{9540CC72-A755-FA60-CA60-4B6B14D5396A}"/>
-              </a:ext>
-            </a:extLst>
-          </p:cNvPr>
-          <p:cNvSpPr/>
-          <p:nvPr/>
-        </p:nvSpPr>
-        <p:spPr>
-          <a:xfrm>
-            <a:off x="541867" y="3590713"/>
-            <a:ext cx="6163589" cy="2223726"/>
-          </a:xfrm>
-          <a:prstGeom prst="roundRect">
-            <a:avLst/>
-          </a:prstGeom>
-          <a:solidFill>
-            <a:srgbClr val="1E1E1E"/>
-          </a:solidFill>
-          <a:ln>
-            <a:solidFill>
-              <a:srgbClr val="505050"/>
-            </a:solidFill>
-          </a:ln>
-          <a:scene3d>
-            <a:camera prst="orthographicFront"/>
-            <a:lightRig rig="threePt" dir="t"/>
-          </a:scene3d>
-          <a:sp3d>
-            <a:bevelT w="139700" prst="cross"/>
-          </a:sp3d>
-        </p:spPr>
-        <p:style>
-          <a:lnRef idx="2">
-            <a:schemeClr val="accent1">
-              <a:shade val="15000"/>
-            </a:schemeClr>
-          </a:lnRef>
-          <a:fillRef idx="1">
-            <a:schemeClr val="accent1"/>
-          </a:fillRef>
-          <a:effectRef idx="0">
-            <a:schemeClr val="accent1"/>
-          </a:effectRef>
-          <a:fontRef idx="minor">
-            <a:schemeClr val="lt1"/>
-          </a:fontRef>
-        </p:style>
-        <p:txBody>
-          <a:bodyPr rtlCol="0" anchor="ctr"/>
-          <a:lstStyle/>
-          <a:p>
-            <a:pPr algn="ctr"/>
-            <a:r>
-              <a:rPr lang="en-GB" sz="13000" dirty="0">
-                <a:solidFill>
-                  <a:schemeClr val="bg1"/>
-                </a:solidFill>
-                <a:latin typeface="Noto Serif" panose="02020502060505020204" pitchFamily="18" charset="0"/>
-                <a:ea typeface="Noto Serif" panose="02020502060505020204" pitchFamily="18" charset="0"/>
-                <a:cs typeface="Noto Serif" panose="02020502060505020204" pitchFamily="18" charset="0"/>
-              </a:rPr>
-              <a:t>Pycraft</a:t>
-            </a:r>
-          </a:p>
-        </p:txBody>
-      </p:sp>
-    </p:spTree>
-    <p:extLst>
-      <p:ext uri="{BB962C8B-B14F-4D97-AF65-F5344CB8AC3E}">
-        <p14:creationId xmlns:p14="http://schemas.microsoft.com/office/powerpoint/2010/main" val="3673453931"/>
       </p:ext>
     </p:extLst>
   </p:cSld>

</xml_diff>